<commit_message>
actualizado txt al 30%
</commit_message>
<xml_diff>
--- a/github.pptx
+++ b/github.pptx
@@ -5,7 +5,7 @@
     <p:sldMasterId id="2147483648" r:id="rId1"/>
   </p:sldMasterIdLst>
   <p:notesMasterIdLst>
-    <p:notesMasterId r:id="rId35"/>
+    <p:notesMasterId r:id="rId34"/>
   </p:notesMasterIdLst>
   <p:sldIdLst>
     <p:sldId id="256" r:id="rId2"/>
@@ -22,25 +22,24 @@
     <p:sldId id="266" r:id="rId13"/>
     <p:sldId id="267" r:id="rId14"/>
     <p:sldId id="263" r:id="rId15"/>
-    <p:sldId id="277" r:id="rId16"/>
-    <p:sldId id="280" r:id="rId17"/>
-    <p:sldId id="264" r:id="rId18"/>
-    <p:sldId id="268" r:id="rId19"/>
-    <p:sldId id="278" r:id="rId20"/>
-    <p:sldId id="279" r:id="rId21"/>
-    <p:sldId id="273" r:id="rId22"/>
-    <p:sldId id="275" r:id="rId23"/>
-    <p:sldId id="289" r:id="rId24"/>
-    <p:sldId id="271" r:id="rId25"/>
-    <p:sldId id="281" r:id="rId26"/>
-    <p:sldId id="282" r:id="rId27"/>
-    <p:sldId id="270" r:id="rId28"/>
-    <p:sldId id="283" r:id="rId29"/>
-    <p:sldId id="284" r:id="rId30"/>
-    <p:sldId id="285" r:id="rId31"/>
-    <p:sldId id="286" r:id="rId32"/>
-    <p:sldId id="287" r:id="rId33"/>
-    <p:sldId id="288" r:id="rId34"/>
+    <p:sldId id="280" r:id="rId16"/>
+    <p:sldId id="264" r:id="rId17"/>
+    <p:sldId id="268" r:id="rId18"/>
+    <p:sldId id="278" r:id="rId19"/>
+    <p:sldId id="279" r:id="rId20"/>
+    <p:sldId id="273" r:id="rId21"/>
+    <p:sldId id="275" r:id="rId22"/>
+    <p:sldId id="289" r:id="rId23"/>
+    <p:sldId id="271" r:id="rId24"/>
+    <p:sldId id="281" r:id="rId25"/>
+    <p:sldId id="282" r:id="rId26"/>
+    <p:sldId id="270" r:id="rId27"/>
+    <p:sldId id="283" r:id="rId28"/>
+    <p:sldId id="284" r:id="rId29"/>
+    <p:sldId id="285" r:id="rId30"/>
+    <p:sldId id="286" r:id="rId31"/>
+    <p:sldId id="287" r:id="rId32"/>
+    <p:sldId id="288" r:id="rId33"/>
   </p:sldIdLst>
   <p:sldSz cx="12192000" cy="6858000"/>
   <p:notesSz cx="6858000" cy="9144000"/>
@@ -152,7 +151,7 @@
   <pc:docChgLst>
     <pc:chgData name="daniel arredondo" userId="45f93b1d35ec6ed3" providerId="LiveId" clId="{92A94257-D0AF-4DD3-8E65-51A1BB107D17}"/>
     <pc:docChg chg="undo custSel addSld delSld modSld sldOrd">
-      <pc:chgData name="daniel arredondo" userId="45f93b1d35ec6ed3" providerId="LiveId" clId="{92A94257-D0AF-4DD3-8E65-51A1BB107D17}" dt="2020-10-19T17:29:04.320" v="14027" actId="114"/>
+      <pc:chgData name="daniel arredondo" userId="45f93b1d35ec6ed3" providerId="LiveId" clId="{92A94257-D0AF-4DD3-8E65-51A1BB107D17}" dt="2020-10-19T20:52:00.500" v="14063" actId="114"/>
       <pc:docMkLst>
         <pc:docMk/>
       </pc:docMkLst>
@@ -280,7 +279,7 @@
         </pc:spChg>
       </pc:sldChg>
       <pc:sldChg chg="modSp add">
-        <pc:chgData name="daniel arredondo" userId="45f93b1d35ec6ed3" providerId="LiveId" clId="{92A94257-D0AF-4DD3-8E65-51A1BB107D17}" dt="2020-10-19T02:59:56.502" v="13214" actId="20577"/>
+        <pc:chgData name="daniel arredondo" userId="45f93b1d35ec6ed3" providerId="LiveId" clId="{92A94257-D0AF-4DD3-8E65-51A1BB107D17}" dt="2020-10-19T20:45:12.745" v="14039" actId="20577"/>
         <pc:sldMkLst>
           <pc:docMk/>
           <pc:sldMk cId="2942937772" sldId="261"/>
@@ -294,7 +293,7 @@
           </ac:spMkLst>
         </pc:spChg>
         <pc:spChg chg="mod">
-          <ac:chgData name="daniel arredondo" userId="45f93b1d35ec6ed3" providerId="LiveId" clId="{92A94257-D0AF-4DD3-8E65-51A1BB107D17}" dt="2020-10-19T02:59:56.502" v="13214" actId="20577"/>
+          <ac:chgData name="daniel arredondo" userId="45f93b1d35ec6ed3" providerId="LiveId" clId="{92A94257-D0AF-4DD3-8E65-51A1BB107D17}" dt="2020-10-19T20:45:12.745" v="14039" actId="20577"/>
           <ac:spMkLst>
             <pc:docMk/>
             <pc:sldMk cId="2942937772" sldId="261"/>
@@ -724,8 +723,8 @@
           <pc:sldMk cId="2000008457" sldId="276"/>
         </pc:sldMkLst>
       </pc:sldChg>
-      <pc:sldChg chg="addSp delSp modSp add">
-        <pc:chgData name="daniel arredondo" userId="45f93b1d35ec6ed3" providerId="LiveId" clId="{92A94257-D0AF-4DD3-8E65-51A1BB107D17}" dt="2020-10-10T03:06:29.132" v="4875" actId="20577"/>
+      <pc:sldChg chg="addSp delSp modSp add del">
+        <pc:chgData name="daniel arredondo" userId="45f93b1d35ec6ed3" providerId="LiveId" clId="{92A94257-D0AF-4DD3-8E65-51A1BB107D17}" dt="2020-10-19T20:46:43.900" v="14043" actId="2696"/>
         <pc:sldMkLst>
           <pc:docMk/>
           <pc:sldMk cId="1108225256" sldId="277"/>
@@ -909,7 +908,7 @@
         </pc:spChg>
       </pc:sldChg>
       <pc:sldChg chg="modSp add">
-        <pc:chgData name="daniel arredondo" userId="45f93b1d35ec6ed3" providerId="LiveId" clId="{92A94257-D0AF-4DD3-8E65-51A1BB107D17}" dt="2020-10-10T04:24:54.335" v="9191" actId="20577"/>
+        <pc:chgData name="daniel arredondo" userId="45f93b1d35ec6ed3" providerId="LiveId" clId="{92A94257-D0AF-4DD3-8E65-51A1BB107D17}" dt="2020-10-19T20:50:19.645" v="14052" actId="114"/>
         <pc:sldMkLst>
           <pc:docMk/>
           <pc:sldMk cId="3416937362" sldId="284"/>
@@ -923,7 +922,7 @@
           </ac:spMkLst>
         </pc:spChg>
         <pc:spChg chg="mod">
-          <ac:chgData name="daniel arredondo" userId="45f93b1d35ec6ed3" providerId="LiveId" clId="{92A94257-D0AF-4DD3-8E65-51A1BB107D17}" dt="2020-10-10T04:24:54.335" v="9191" actId="20577"/>
+          <ac:chgData name="daniel arredondo" userId="45f93b1d35ec6ed3" providerId="LiveId" clId="{92A94257-D0AF-4DD3-8E65-51A1BB107D17}" dt="2020-10-19T20:50:19.645" v="14052" actId="114"/>
           <ac:spMkLst>
             <pc:docMk/>
             <pc:sldMk cId="3416937362" sldId="284"/>
@@ -932,7 +931,7 @@
         </pc:spChg>
       </pc:sldChg>
       <pc:sldChg chg="modSp add">
-        <pc:chgData name="daniel arredondo" userId="45f93b1d35ec6ed3" providerId="LiveId" clId="{92A94257-D0AF-4DD3-8E65-51A1BB107D17}" dt="2020-10-10T04:32:25.106" v="9601" actId="20577"/>
+        <pc:chgData name="daniel arredondo" userId="45f93b1d35ec6ed3" providerId="LiveId" clId="{92A94257-D0AF-4DD3-8E65-51A1BB107D17}" dt="2020-10-19T20:51:38.642" v="14062" actId="114"/>
         <pc:sldMkLst>
           <pc:docMk/>
           <pc:sldMk cId="2582780840" sldId="285"/>
@@ -946,7 +945,7 @@
           </ac:spMkLst>
         </pc:spChg>
         <pc:spChg chg="mod">
-          <ac:chgData name="daniel arredondo" userId="45f93b1d35ec6ed3" providerId="LiveId" clId="{92A94257-D0AF-4DD3-8E65-51A1BB107D17}" dt="2020-10-10T04:32:25.106" v="9601" actId="20577"/>
+          <ac:chgData name="daniel arredondo" userId="45f93b1d35ec6ed3" providerId="LiveId" clId="{92A94257-D0AF-4DD3-8E65-51A1BB107D17}" dt="2020-10-19T20:51:38.642" v="14062" actId="114"/>
           <ac:spMkLst>
             <pc:docMk/>
             <pc:sldMk cId="2582780840" sldId="285"/>
@@ -955,7 +954,7 @@
         </pc:spChg>
       </pc:sldChg>
       <pc:sldChg chg="modSp add">
-        <pc:chgData name="daniel arredondo" userId="45f93b1d35ec6ed3" providerId="LiveId" clId="{92A94257-D0AF-4DD3-8E65-51A1BB107D17}" dt="2020-10-10T04:34:51.985" v="9748" actId="20577"/>
+        <pc:chgData name="daniel arredondo" userId="45f93b1d35ec6ed3" providerId="LiveId" clId="{92A94257-D0AF-4DD3-8E65-51A1BB107D17}" dt="2020-10-19T20:51:22.444" v="14058" actId="114"/>
         <pc:sldMkLst>
           <pc:docMk/>
           <pc:sldMk cId="2418268589" sldId="286"/>
@@ -969,7 +968,7 @@
           </ac:spMkLst>
         </pc:spChg>
         <pc:spChg chg="mod">
-          <ac:chgData name="daniel arredondo" userId="45f93b1d35ec6ed3" providerId="LiveId" clId="{92A94257-D0AF-4DD3-8E65-51A1BB107D17}" dt="2020-10-10T04:34:51.985" v="9748" actId="20577"/>
+          <ac:chgData name="daniel arredondo" userId="45f93b1d35ec6ed3" providerId="LiveId" clId="{92A94257-D0AF-4DD3-8E65-51A1BB107D17}" dt="2020-10-19T20:51:22.444" v="14058" actId="114"/>
           <ac:spMkLst>
             <pc:docMk/>
             <pc:sldMk cId="2418268589" sldId="286"/>
@@ -978,7 +977,7 @@
         </pc:spChg>
       </pc:sldChg>
       <pc:sldChg chg="modSp add">
-        <pc:chgData name="daniel arredondo" userId="45f93b1d35ec6ed3" providerId="LiveId" clId="{92A94257-D0AF-4DD3-8E65-51A1BB107D17}" dt="2020-10-10T04:38:52.218" v="9915"/>
+        <pc:chgData name="daniel arredondo" userId="45f93b1d35ec6ed3" providerId="LiveId" clId="{92A94257-D0AF-4DD3-8E65-51A1BB107D17}" dt="2020-10-19T20:51:10.228" v="14056" actId="114"/>
         <pc:sldMkLst>
           <pc:docMk/>
           <pc:sldMk cId="632723813" sldId="287"/>
@@ -992,7 +991,7 @@
           </ac:spMkLst>
         </pc:spChg>
         <pc:spChg chg="mod">
-          <ac:chgData name="daniel arredondo" userId="45f93b1d35ec6ed3" providerId="LiveId" clId="{92A94257-D0AF-4DD3-8E65-51A1BB107D17}" dt="2020-10-10T04:37:38.419" v="9913"/>
+          <ac:chgData name="daniel arredondo" userId="45f93b1d35ec6ed3" providerId="LiveId" clId="{92A94257-D0AF-4DD3-8E65-51A1BB107D17}" dt="2020-10-19T20:51:10.228" v="14056" actId="114"/>
           <ac:spMkLst>
             <pc:docMk/>
             <pc:sldMk cId="632723813" sldId="287"/>
@@ -1001,7 +1000,7 @@
         </pc:spChg>
       </pc:sldChg>
       <pc:sldChg chg="modSp add">
-        <pc:chgData name="daniel arredondo" userId="45f93b1d35ec6ed3" providerId="LiveId" clId="{92A94257-D0AF-4DD3-8E65-51A1BB107D17}" dt="2020-10-10T04:39:29.921" v="9946" actId="20577"/>
+        <pc:chgData name="daniel arredondo" userId="45f93b1d35ec6ed3" providerId="LiveId" clId="{92A94257-D0AF-4DD3-8E65-51A1BB107D17}" dt="2020-10-19T20:52:00.500" v="14063" actId="114"/>
         <pc:sldMkLst>
           <pc:docMk/>
           <pc:sldMk cId="1495899909" sldId="288"/>
@@ -1015,7 +1014,7 @@
           </ac:spMkLst>
         </pc:spChg>
         <pc:spChg chg="mod">
-          <ac:chgData name="daniel arredondo" userId="45f93b1d35ec6ed3" providerId="LiveId" clId="{92A94257-D0AF-4DD3-8E65-51A1BB107D17}" dt="2020-10-10T04:39:29.921" v="9946" actId="20577"/>
+          <ac:chgData name="daniel arredondo" userId="45f93b1d35ec6ed3" providerId="LiveId" clId="{92A94257-D0AF-4DD3-8E65-51A1BB107D17}" dt="2020-10-19T20:52:00.500" v="14063" actId="114"/>
           <ac:spMkLst>
             <pc:docMk/>
             <pc:sldMk cId="1495899909" sldId="288"/>
@@ -1139,7 +1138,7 @@
         </pc:sldMkLst>
       </pc:sldChg>
       <pc:sldChg chg="modSp add">
-        <pc:chgData name="daniel arredondo" userId="45f93b1d35ec6ed3" providerId="LiveId" clId="{92A94257-D0AF-4DD3-8E65-51A1BB107D17}" dt="2020-10-19T02:54:13.115" v="12729" actId="313"/>
+        <pc:chgData name="daniel arredondo" userId="45f93b1d35ec6ed3" providerId="LiveId" clId="{92A94257-D0AF-4DD3-8E65-51A1BB107D17}" dt="2020-10-19T20:45:40.395" v="14040" actId="20577"/>
         <pc:sldMkLst>
           <pc:docMk/>
           <pc:sldMk cId="2945949732" sldId="291"/>
@@ -1153,7 +1152,7 @@
           </ac:spMkLst>
         </pc:spChg>
         <pc:spChg chg="mod">
-          <ac:chgData name="daniel arredondo" userId="45f93b1d35ec6ed3" providerId="LiveId" clId="{92A94257-D0AF-4DD3-8E65-51A1BB107D17}" dt="2020-10-19T02:54:13.115" v="12729" actId="313"/>
+          <ac:chgData name="daniel arredondo" userId="45f93b1d35ec6ed3" providerId="LiveId" clId="{92A94257-D0AF-4DD3-8E65-51A1BB107D17}" dt="2020-10-19T20:45:40.395" v="14040" actId="20577"/>
           <ac:spMkLst>
             <pc:docMk/>
             <pc:sldMk cId="2945949732" sldId="291"/>
@@ -1185,7 +1184,7 @@
         </pc:spChg>
       </pc:sldChg>
       <pc:sldChg chg="modSp add">
-        <pc:chgData name="daniel arredondo" userId="45f93b1d35ec6ed3" providerId="LiveId" clId="{92A94257-D0AF-4DD3-8E65-51A1BB107D17}" dt="2020-10-19T03:09:10.281" v="13799" actId="20577"/>
+        <pc:chgData name="daniel arredondo" userId="45f93b1d35ec6ed3" providerId="LiveId" clId="{92A94257-D0AF-4DD3-8E65-51A1BB107D17}" dt="2020-10-19T20:46:02.182" v="14042" actId="20577"/>
         <pc:sldMkLst>
           <pc:docMk/>
           <pc:sldMk cId="2401562031" sldId="293"/>
@@ -1199,7 +1198,7 @@
           </ac:spMkLst>
         </pc:spChg>
         <pc:spChg chg="mod">
-          <ac:chgData name="daniel arredondo" userId="45f93b1d35ec6ed3" providerId="LiveId" clId="{92A94257-D0AF-4DD3-8E65-51A1BB107D17}" dt="2020-10-19T03:09:10.281" v="13799" actId="20577"/>
+          <ac:chgData name="daniel arredondo" userId="45f93b1d35ec6ed3" providerId="LiveId" clId="{92A94257-D0AF-4DD3-8E65-51A1BB107D17}" dt="2020-10-19T20:46:02.182" v="14042" actId="20577"/>
           <ac:spMkLst>
             <pc:docMk/>
             <pc:sldMk cId="2401562031" sldId="293"/>
@@ -5225,7 +5224,7 @@
           <a:p>
             <a:r>
               <a:rPr lang="es-CL" dirty="0"/>
-              <a:t>Actualizar tu repositorio a la versión mas actualizada (ultimo </a:t>
+              <a:t>Actualizar tu repositorio a la versión mas actualizada (último </a:t>
             </a:r>
             <a:r>
               <a:rPr lang="es-CL" dirty="0" err="1"/>
@@ -5780,10 +5779,10 @@
       </p:grpSpPr>
       <p:sp>
         <p:nvSpPr>
-          <p:cNvPr id="4" name="Título 3">
-            <a:extLst>
-              <a:ext uri="{FF2B5EF4-FFF2-40B4-BE49-F238E27FC236}">
-                <a16:creationId xmlns:a16="http://schemas.microsoft.com/office/drawing/2014/main" id="{1771C179-F912-4C9C-AF1D-1B661BAC463B}"/>
+          <p:cNvPr id="2" name="Título 1">
+            <a:extLst>
+              <a:ext uri="{FF2B5EF4-FFF2-40B4-BE49-F238E27FC236}">
+                <a16:creationId xmlns:a16="http://schemas.microsoft.com/office/drawing/2014/main" id="{8409E709-8A8B-4AE5-8EA4-0A4338E78FC5}"/>
               </a:ext>
             </a:extLst>
           </p:cNvPr>
@@ -5802,25 +5801,22 @@
             <a:pPr algn="ctr"/>
             <a:r>
               <a:rPr lang="es-CL" dirty="0"/>
-              <a:t>¿Qué es </a:t>
+              <a:t>Entendiendo </a:t>
             </a:r>
             <a:r>
               <a:rPr lang="es-CL" dirty="0" err="1"/>
               <a:t>Github</a:t>
             </a:r>
-            <a:r>
-              <a:rPr lang="es-CL" dirty="0"/>
-              <a:t>?</a:t>
-            </a:r>
-          </a:p>
-        </p:txBody>
-      </p:sp>
-      <p:sp>
-        <p:nvSpPr>
-          <p:cNvPr id="5" name="Marcador de contenido 4">
-            <a:extLst>
-              <a:ext uri="{FF2B5EF4-FFF2-40B4-BE49-F238E27FC236}">
-                <a16:creationId xmlns:a16="http://schemas.microsoft.com/office/drawing/2014/main" id="{7F3DC108-AFDD-4EBD-86E3-A83C3985BD50}"/>
+            <a:endParaRPr lang="es-CL" dirty="0"/>
+          </a:p>
+        </p:txBody>
+      </p:sp>
+      <p:sp>
+        <p:nvSpPr>
+          <p:cNvPr id="3" name="Marcador de contenido 2">
+            <a:extLst>
+              <a:ext uri="{FF2B5EF4-FFF2-40B4-BE49-F238E27FC236}">
+                <a16:creationId xmlns:a16="http://schemas.microsoft.com/office/drawing/2014/main" id="{89637390-1CBC-47C8-AA4D-504926A4CF1F}"/>
               </a:ext>
             </a:extLst>
           </p:cNvPr>
@@ -5836,14 +5832,113 @@
           <a:bodyPr/>
           <a:lstStyle/>
           <a:p>
-            <a:endParaRPr lang="es-CL" dirty="0"/>
+            <a:r>
+              <a:rPr lang="es-CL" dirty="0" err="1"/>
+              <a:t>Pull</a:t>
+            </a:r>
+            <a:r>
+              <a:rPr lang="es-CL" dirty="0"/>
+              <a:t> </a:t>
+            </a:r>
+            <a:r>
+              <a:rPr lang="es-CL" dirty="0" err="1"/>
+              <a:t>request</a:t>
+            </a:r>
+            <a:r>
+              <a:rPr lang="es-CL" dirty="0"/>
+              <a:t>: Devuelve una lista de </a:t>
+            </a:r>
+            <a:r>
+              <a:rPr lang="es-CL" dirty="0" err="1"/>
+              <a:t>pull</a:t>
+            </a:r>
+            <a:r>
+              <a:rPr lang="es-CL" dirty="0"/>
+              <a:t> </a:t>
+            </a:r>
+            <a:r>
+              <a:rPr lang="es-CL" dirty="0" err="1"/>
+              <a:t>request</a:t>
+            </a:r>
+            <a:r>
+              <a:rPr lang="es-CL" dirty="0"/>
+              <a:t> que han sido creados.</a:t>
+            </a:r>
+          </a:p>
+          <a:p>
+            <a:r>
+              <a:rPr lang="es-CL" dirty="0"/>
+              <a:t>Issues: La lista de asuntos o </a:t>
+            </a:r>
+            <a:r>
+              <a:rPr lang="es-CL" dirty="0" err="1"/>
+              <a:t>issues</a:t>
+            </a:r>
+            <a:r>
+              <a:rPr lang="es-CL" dirty="0"/>
+              <a:t> es casi lo mismo que </a:t>
+            </a:r>
+            <a:r>
+              <a:rPr lang="es-CL" dirty="0" err="1"/>
+              <a:t>pull</a:t>
+            </a:r>
+            <a:r>
+              <a:rPr lang="es-CL" dirty="0"/>
+              <a:t> </a:t>
+            </a:r>
+            <a:r>
+              <a:rPr lang="es-CL" dirty="0" err="1"/>
+              <a:t>request</a:t>
+            </a:r>
+            <a:r>
+              <a:rPr lang="es-CL" dirty="0"/>
+              <a:t>, un asunto es algo reportado que debe ser solucionado.</a:t>
+            </a:r>
+          </a:p>
+          <a:p>
+            <a:r>
+              <a:rPr lang="es-CL" dirty="0"/>
+              <a:t>Marketplace: Tienda de app de </a:t>
+            </a:r>
+            <a:r>
+              <a:rPr lang="es-CL" dirty="0" err="1"/>
+              <a:t>github</a:t>
+            </a:r>
+            <a:r>
+              <a:rPr lang="es-CL" dirty="0"/>
+              <a:t>.</a:t>
+            </a:r>
+          </a:p>
+          <a:p>
+            <a:r>
+              <a:rPr lang="es-CL" dirty="0"/>
+              <a:t>Explore: Toma tus intereses y encuentra eventos y oportunidades de otros hosts.</a:t>
+            </a:r>
+          </a:p>
+          <a:p>
+            <a:r>
+              <a:rPr lang="es-CL" dirty="0"/>
+              <a:t>Notificaciones.</a:t>
+            </a:r>
+          </a:p>
+          <a:p>
+            <a:r>
+              <a:rPr lang="es-CL" dirty="0"/>
+              <a:t>Quick Pick: con el signo + ofrece áreas rápidas.</a:t>
+            </a:r>
+          </a:p>
+          <a:p>
+            <a:r>
+              <a:rPr lang="es-CL" dirty="0"/>
+              <a:t>Menú de cuenta.</a:t>
+            </a:r>
           </a:p>
         </p:txBody>
       </p:sp>
     </p:spTree>
     <p:extLst>
       <p:ext uri="{BB962C8B-B14F-4D97-AF65-F5344CB8AC3E}">
-        <p14:creationId xmlns:p14="http://schemas.microsoft.com/office/powerpoint/2010/main" val="1108225256"/>
+        <p14:creationId xmlns:p14="http://schemas.microsoft.com/office/powerpoint/2010/main" val="3076644608"/>
       </p:ext>
     </p:extLst>
   </p:cSld>
@@ -5872,10 +5967,10 @@
       </p:grpSpPr>
       <p:sp>
         <p:nvSpPr>
-          <p:cNvPr id="2" name="Título 1">
-            <a:extLst>
-              <a:ext uri="{FF2B5EF4-FFF2-40B4-BE49-F238E27FC236}">
-                <a16:creationId xmlns:a16="http://schemas.microsoft.com/office/drawing/2014/main" id="{8409E709-8A8B-4AE5-8EA4-0A4338E78FC5}"/>
+          <p:cNvPr id="4" name="Título 3">
+            <a:extLst>
+              <a:ext uri="{FF2B5EF4-FFF2-40B4-BE49-F238E27FC236}">
+                <a16:creationId xmlns:a16="http://schemas.microsoft.com/office/drawing/2014/main" id="{ED4462E5-E376-4778-8C41-4A784CC8B691}"/>
               </a:ext>
             </a:extLst>
           </p:cNvPr>
@@ -5894,7 +5989,7 @@
             <a:pPr algn="ctr"/>
             <a:r>
               <a:rPr lang="es-CL" dirty="0"/>
-              <a:t>Entendiendo </a:t>
+              <a:t>Configurando </a:t>
             </a:r>
             <a:r>
               <a:rPr lang="es-CL" dirty="0" err="1"/>
@@ -5906,10 +6001,10 @@
       </p:sp>
       <p:sp>
         <p:nvSpPr>
-          <p:cNvPr id="3" name="Marcador de contenido 2">
-            <a:extLst>
-              <a:ext uri="{FF2B5EF4-FFF2-40B4-BE49-F238E27FC236}">
-                <a16:creationId xmlns:a16="http://schemas.microsoft.com/office/drawing/2014/main" id="{89637390-1CBC-47C8-AA4D-504926A4CF1F}"/>
+          <p:cNvPr id="5" name="Marcador de contenido 4">
+            <a:extLst>
+              <a:ext uri="{FF2B5EF4-FFF2-40B4-BE49-F238E27FC236}">
+                <a16:creationId xmlns:a16="http://schemas.microsoft.com/office/drawing/2014/main" id="{D52BA78C-3C82-46AD-B5D5-90A20D6D435F}"/>
               </a:ext>
             </a:extLst>
           </p:cNvPr>
@@ -5922,12 +6017,34 @@
         </p:nvSpPr>
         <p:spPr/>
         <p:txBody>
-          <a:bodyPr/>
+          <a:bodyPr>
+            <a:normAutofit lnSpcReduction="10000"/>
+          </a:bodyPr>
           <a:lstStyle/>
           <a:p>
             <a:r>
-              <a:rPr lang="es-CL" dirty="0" err="1"/>
-              <a:t>Pull</a:t>
+              <a:rPr lang="es-CL" dirty="0"/>
+              <a:t>Crear usuario en </a:t>
+            </a:r>
+            <a:r>
+              <a:rPr lang="es-CL" dirty="0" err="1"/>
+              <a:t>Github</a:t>
+            </a:r>
+            <a:r>
+              <a:rPr lang="es-CL" dirty="0"/>
+              <a:t>.</a:t>
+            </a:r>
+          </a:p>
+          <a:p>
+            <a:r>
+              <a:rPr lang="es-CL" dirty="0"/>
+              <a:t>Personalizar Cuenta.</a:t>
+            </a:r>
+          </a:p>
+          <a:p>
+            <a:r>
+              <a:rPr lang="es-CL" dirty="0" err="1"/>
+              <a:t>Account</a:t>
             </a:r>
             <a:r>
               <a:rPr lang="es-CL" dirty="0"/>
@@ -5935,15 +6052,41 @@
             </a:r>
             <a:r>
               <a:rPr lang="es-CL" dirty="0" err="1"/>
-              <a:t>request</a:t>
-            </a:r>
-            <a:r>
-              <a:rPr lang="es-CL" dirty="0"/>
-              <a:t>: Devuelve una lista de </a:t>
-            </a:r>
-            <a:r>
-              <a:rPr lang="es-CL" dirty="0" err="1"/>
-              <a:t>pull</a:t>
+              <a:t>Settings</a:t>
+            </a:r>
+            <a:r>
+              <a:rPr lang="es-CL" dirty="0"/>
+              <a:t>.</a:t>
+            </a:r>
+          </a:p>
+          <a:p>
+            <a:r>
+              <a:rPr lang="es-CL" dirty="0"/>
+              <a:t>Emails.</a:t>
+            </a:r>
+          </a:p>
+          <a:p>
+            <a:r>
+              <a:rPr lang="es-CL" dirty="0"/>
+              <a:t>Notificaciones.</a:t>
+            </a:r>
+          </a:p>
+          <a:p>
+            <a:r>
+              <a:rPr lang="es-CL" dirty="0"/>
+              <a:t>Plan de pago.</a:t>
+            </a:r>
+          </a:p>
+          <a:p>
+            <a:r>
+              <a:rPr lang="es-CL" dirty="0"/>
+              <a:t>Claves SSH y GPG</a:t>
+            </a:r>
+          </a:p>
+          <a:p>
+            <a:r>
+              <a:rPr lang="es-CL" dirty="0" err="1"/>
+              <a:t>Saved</a:t>
             </a:r>
             <a:r>
               <a:rPr lang="es-CL" dirty="0"/>
@@ -5951,51 +6094,7 @@
             </a:r>
             <a:r>
               <a:rPr lang="es-CL" dirty="0" err="1"/>
-              <a:t>request</a:t>
-            </a:r>
-            <a:r>
-              <a:rPr lang="es-CL" dirty="0"/>
-              <a:t> que han sido creados.</a:t>
-            </a:r>
-          </a:p>
-          <a:p>
-            <a:r>
-              <a:rPr lang="es-CL" dirty="0"/>
-              <a:t>Issues: La lista de asuntos o </a:t>
-            </a:r>
-            <a:r>
-              <a:rPr lang="es-CL" dirty="0" err="1"/>
-              <a:t>issues</a:t>
-            </a:r>
-            <a:r>
-              <a:rPr lang="es-CL" dirty="0"/>
-              <a:t> es casi lo mismo que </a:t>
-            </a:r>
-            <a:r>
-              <a:rPr lang="es-CL" dirty="0" err="1"/>
-              <a:t>pull</a:t>
-            </a:r>
-            <a:r>
-              <a:rPr lang="es-CL" dirty="0"/>
-              <a:t> </a:t>
-            </a:r>
-            <a:r>
-              <a:rPr lang="es-CL" dirty="0" err="1"/>
-              <a:t>request</a:t>
-            </a:r>
-            <a:r>
-              <a:rPr lang="es-CL" dirty="0"/>
-              <a:t>, un asunto es algo reportado que debe ser solucionado.</a:t>
-            </a:r>
-          </a:p>
-          <a:p>
-            <a:r>
-              <a:rPr lang="es-CL" dirty="0"/>
-              <a:t>Marketplace: Tienda de app de </a:t>
-            </a:r>
-            <a:r>
-              <a:rPr lang="es-CL" dirty="0" err="1"/>
-              <a:t>github</a:t>
+              <a:t>replies</a:t>
             </a:r>
             <a:r>
               <a:rPr lang="es-CL" dirty="0"/>
@@ -6005,25 +6104,7 @@
           <a:p>
             <a:r>
               <a:rPr lang="es-CL" dirty="0"/>
-              <a:t>Explore: Toma tus intereses y encuentra eventos y oportunidades de otros hosts.</a:t>
-            </a:r>
-          </a:p>
-          <a:p>
-            <a:r>
-              <a:rPr lang="es-CL" dirty="0"/>
-              <a:t>Notificaciones.</a:t>
-            </a:r>
-          </a:p>
-          <a:p>
-            <a:r>
-              <a:rPr lang="es-CL" dirty="0"/>
-              <a:t>Quick Pick: con el signo + ofrece áreas rápidas.</a:t>
-            </a:r>
-          </a:p>
-          <a:p>
-            <a:r>
-              <a:rPr lang="es-CL" dirty="0"/>
-              <a:t>Menú de cuenta.</a:t>
+              <a:t>Apps.</a:t>
             </a:r>
           </a:p>
         </p:txBody>
@@ -6031,7 +6112,7 @@
     </p:spTree>
     <p:extLst>
       <p:ext uri="{BB962C8B-B14F-4D97-AF65-F5344CB8AC3E}">
-        <p14:creationId xmlns:p14="http://schemas.microsoft.com/office/powerpoint/2010/main" val="3076644608"/>
+        <p14:creationId xmlns:p14="http://schemas.microsoft.com/office/powerpoint/2010/main" val="2820960484"/>
       </p:ext>
     </p:extLst>
   </p:cSld>
@@ -6060,10 +6141,10 @@
       </p:grpSpPr>
       <p:sp>
         <p:nvSpPr>
-          <p:cNvPr id="4" name="Título 3">
-            <a:extLst>
-              <a:ext uri="{FF2B5EF4-FFF2-40B4-BE49-F238E27FC236}">
-                <a16:creationId xmlns:a16="http://schemas.microsoft.com/office/drawing/2014/main" id="{ED4462E5-E376-4778-8C41-4A784CC8B691}"/>
+          <p:cNvPr id="2" name="Título 1">
+            <a:extLst>
+              <a:ext uri="{FF2B5EF4-FFF2-40B4-BE49-F238E27FC236}">
+                <a16:creationId xmlns:a16="http://schemas.microsoft.com/office/drawing/2014/main" id="{81003492-542C-4154-89C1-6450C4A7542F}"/>
               </a:ext>
             </a:extLst>
           </p:cNvPr>
@@ -6088,16 +6169,19 @@
               <a:rPr lang="es-CL" dirty="0" err="1"/>
               <a:t>Github</a:t>
             </a:r>
-            <a:endParaRPr lang="es-CL" dirty="0"/>
-          </a:p>
-        </p:txBody>
-      </p:sp>
-      <p:sp>
-        <p:nvSpPr>
-          <p:cNvPr id="5" name="Marcador de contenido 4">
-            <a:extLst>
-              <a:ext uri="{FF2B5EF4-FFF2-40B4-BE49-F238E27FC236}">
-                <a16:creationId xmlns:a16="http://schemas.microsoft.com/office/drawing/2014/main" id="{D52BA78C-3C82-46AD-B5D5-90A20D6D435F}"/>
+            <a:r>
+              <a:rPr lang="es-CL" dirty="0"/>
+              <a:t> con RStudio</a:t>
+            </a:r>
+          </a:p>
+        </p:txBody>
+      </p:sp>
+      <p:sp>
+        <p:nvSpPr>
+          <p:cNvPr id="3" name="Marcador de contenido 2">
+            <a:extLst>
+              <a:ext uri="{FF2B5EF4-FFF2-40B4-BE49-F238E27FC236}">
+                <a16:creationId xmlns:a16="http://schemas.microsoft.com/office/drawing/2014/main" id="{5414C937-79D9-4171-BCA7-69417EEA85BB}"/>
               </a:ext>
             </a:extLst>
           </p:cNvPr>
@@ -6111,17 +6195,17 @@
         <p:spPr/>
         <p:txBody>
           <a:bodyPr>
-            <a:normAutofit lnSpcReduction="10000"/>
+            <a:normAutofit fontScale="92500" lnSpcReduction="20000"/>
           </a:bodyPr>
           <a:lstStyle/>
           <a:p>
             <a:r>
               <a:rPr lang="es-CL" dirty="0"/>
-              <a:t>Crear usuario en </a:t>
-            </a:r>
-            <a:r>
-              <a:rPr lang="es-CL" dirty="0" err="1"/>
-              <a:t>Github</a:t>
+              <a:t>Abrir </a:t>
+            </a:r>
+            <a:r>
+              <a:rPr lang="es-CL" dirty="0" err="1"/>
+              <a:t>Rstudio</a:t>
             </a:r>
             <a:r>
               <a:rPr lang="es-CL" dirty="0"/>
@@ -6129,15 +6213,48 @@
             </a:r>
           </a:p>
           <a:p>
-            <a:r>
-              <a:rPr lang="es-CL" dirty="0"/>
-              <a:t>Personalizar Cuenta.</a:t>
-            </a:r>
-          </a:p>
-          <a:p>
-            <a:r>
-              <a:rPr lang="es-CL" dirty="0" err="1"/>
-              <a:t>Account</a:t>
+            <a:pPr lvl="1"/>
+            <a:r>
+              <a:rPr lang="es-CL" dirty="0"/>
+              <a:t>Tools&gt;</a:t>
+            </a:r>
+          </a:p>
+          <a:p>
+            <a:pPr lvl="2"/>
+            <a:r>
+              <a:rPr lang="es-CL" dirty="0"/>
+              <a:t>Global </a:t>
+            </a:r>
+            <a:r>
+              <a:rPr lang="es-CL" dirty="0" err="1"/>
+              <a:t>Options</a:t>
+            </a:r>
+            <a:r>
+              <a:rPr lang="es-CL" dirty="0"/>
+              <a:t>&gt;</a:t>
+            </a:r>
+          </a:p>
+          <a:p>
+            <a:pPr lvl="3"/>
+            <a:r>
+              <a:rPr lang="es-CL" dirty="0"/>
+              <a:t>Git/SVN</a:t>
+            </a:r>
+          </a:p>
+          <a:p>
+            <a:r>
+              <a:rPr lang="es-CL" dirty="0"/>
+              <a:t>Crear RSA Key.</a:t>
+            </a:r>
+          </a:p>
+          <a:p>
+            <a:r>
+              <a:rPr lang="es-CL" dirty="0"/>
+              <a:t>Copiar la “</a:t>
+            </a:r>
+            <a:r>
+              <a:rPr lang="es-CL" dirty="0" err="1"/>
+              <a:t>public</a:t>
             </a:r>
             <a:r>
               <a:rPr lang="es-CL" dirty="0"/>
@@ -6145,41 +6262,62 @@
             </a:r>
             <a:r>
               <a:rPr lang="es-CL" dirty="0" err="1"/>
+              <a:t>key</a:t>
+            </a:r>
+            <a:r>
+              <a:rPr lang="es-CL" dirty="0"/>
+              <a:t>”.</a:t>
+            </a:r>
+          </a:p>
+          <a:p>
+            <a:r>
+              <a:rPr lang="es-CL" dirty="0"/>
+              <a:t>Github.com&gt;</a:t>
+            </a:r>
+          </a:p>
+          <a:p>
+            <a:pPr lvl="1"/>
+            <a:r>
+              <a:rPr lang="es-CL" dirty="0" err="1"/>
+              <a:t>Profile</a:t>
+            </a:r>
+            <a:r>
+              <a:rPr lang="es-CL" dirty="0"/>
+              <a:t>&gt;</a:t>
+            </a:r>
+          </a:p>
+          <a:p>
+            <a:pPr lvl="2"/>
+            <a:r>
+              <a:rPr lang="es-CL" dirty="0" err="1"/>
               <a:t>Settings</a:t>
             </a:r>
             <a:r>
               <a:rPr lang="es-CL" dirty="0"/>
-              <a:t>.</a:t>
-            </a:r>
-          </a:p>
-          <a:p>
-            <a:r>
-              <a:rPr lang="es-CL" dirty="0"/>
-              <a:t>Emails.</a:t>
-            </a:r>
-          </a:p>
-          <a:p>
-            <a:r>
-              <a:rPr lang="es-CL" dirty="0"/>
-              <a:t>Notificaciones.</a:t>
-            </a:r>
-          </a:p>
-          <a:p>
-            <a:r>
-              <a:rPr lang="es-CL" dirty="0"/>
-              <a:t>Plan de pago.</a:t>
-            </a:r>
-          </a:p>
-          <a:p>
-            <a:r>
-              <a:rPr lang="es-CL" dirty="0"/>
-              <a:t>Claves SSH y GPG</a:t>
-            </a:r>
-          </a:p>
-          <a:p>
-            <a:r>
-              <a:rPr lang="es-CL" dirty="0" err="1"/>
-              <a:t>Saved</a:t>
+              <a:t>&gt;</a:t>
+            </a:r>
+          </a:p>
+          <a:p>
+            <a:pPr lvl="3"/>
+            <a:r>
+              <a:rPr lang="es-CL" dirty="0"/>
+              <a:t>SSH y GPG Key.</a:t>
+            </a:r>
+          </a:p>
+          <a:p>
+            <a:r>
+              <a:rPr lang="es-CL" dirty="0"/>
+              <a:t>Seleccionar “New SSH Key”.</a:t>
+            </a:r>
+          </a:p>
+          <a:p>
+            <a:r>
+              <a:rPr lang="es-CL" dirty="0"/>
+              <a:t>Pegar “</a:t>
+            </a:r>
+            <a:r>
+              <a:rPr lang="es-CL" dirty="0" err="1"/>
+              <a:t>public</a:t>
             </a:r>
             <a:r>
               <a:rPr lang="es-CL" dirty="0"/>
@@ -6187,17 +6325,11 @@
             </a:r>
             <a:r>
               <a:rPr lang="es-CL" dirty="0" err="1"/>
-              <a:t>replies</a:t>
-            </a:r>
-            <a:r>
-              <a:rPr lang="es-CL" dirty="0"/>
-              <a:t>.</a:t>
-            </a:r>
-          </a:p>
-          <a:p>
-            <a:r>
-              <a:rPr lang="es-CL" dirty="0"/>
-              <a:t>Apps.</a:t>
+              <a:t>key</a:t>
+            </a:r>
+            <a:r>
+              <a:rPr lang="es-CL" dirty="0"/>
+              <a:t>” y aceptar.</a:t>
             </a:r>
           </a:p>
         </p:txBody>
@@ -6205,7 +6337,7 @@
     </p:spTree>
     <p:extLst>
       <p:ext uri="{BB962C8B-B14F-4D97-AF65-F5344CB8AC3E}">
-        <p14:creationId xmlns:p14="http://schemas.microsoft.com/office/powerpoint/2010/main" val="2820960484"/>
+        <p14:creationId xmlns:p14="http://schemas.microsoft.com/office/powerpoint/2010/main" val="2147767534"/>
       </p:ext>
     </p:extLst>
   </p:cSld>
@@ -6237,7 +6369,7 @@
           <p:cNvPr id="2" name="Título 1">
             <a:extLst>
               <a:ext uri="{FF2B5EF4-FFF2-40B4-BE49-F238E27FC236}">
-                <a16:creationId xmlns:a16="http://schemas.microsoft.com/office/drawing/2014/main" id="{81003492-542C-4154-89C1-6450C4A7542F}"/>
+                <a16:creationId xmlns:a16="http://schemas.microsoft.com/office/drawing/2014/main" id="{0E591149-7580-4448-8F27-3B641E7B110B}"/>
               </a:ext>
             </a:extLst>
           </p:cNvPr>
@@ -6274,7 +6406,7 @@
           <p:cNvPr id="3" name="Marcador de contenido 2">
             <a:extLst>
               <a:ext uri="{FF2B5EF4-FFF2-40B4-BE49-F238E27FC236}">
-                <a16:creationId xmlns:a16="http://schemas.microsoft.com/office/drawing/2014/main" id="{5414C937-79D9-4171-BCA7-69417EEA85BB}"/>
+                <a16:creationId xmlns:a16="http://schemas.microsoft.com/office/drawing/2014/main" id="{9508D361-D4E0-4832-AB41-33D3A791AFF0}"/>
               </a:ext>
             </a:extLst>
           </p:cNvPr>
@@ -6287,142 +6419,57 @@
         </p:nvSpPr>
         <p:spPr/>
         <p:txBody>
-          <a:bodyPr>
-            <a:normAutofit fontScale="92500" lnSpcReduction="20000"/>
-          </a:bodyPr>
+          <a:bodyPr/>
           <a:lstStyle/>
           <a:p>
             <a:r>
               <a:rPr lang="es-CL" dirty="0"/>
-              <a:t>Abrir </a:t>
-            </a:r>
-            <a:r>
-              <a:rPr lang="es-CL" dirty="0" err="1"/>
-              <a:t>Rstudio</a:t>
-            </a:r>
-            <a:r>
-              <a:rPr lang="es-CL" dirty="0"/>
-              <a:t>.</a:t>
+              <a:t>Crear Nuevo Repositorio en Github.com</a:t>
+            </a:r>
+          </a:p>
+          <a:p>
+            <a:r>
+              <a:rPr lang="es-CL" dirty="0"/>
+              <a:t>Nombrar y Copiar URL HTTP o SSH.</a:t>
+            </a:r>
+          </a:p>
+          <a:p>
+            <a:r>
+              <a:rPr lang="es-CL" dirty="0"/>
+              <a:t>En RStudio:</a:t>
             </a:r>
           </a:p>
           <a:p>
             <a:pPr lvl="1"/>
             <a:r>
               <a:rPr lang="es-CL" dirty="0"/>
-              <a:t>Tools&gt;</a:t>
+              <a:t>Nuevo Proyecto &gt;</a:t>
             </a:r>
           </a:p>
           <a:p>
             <a:pPr lvl="2"/>
             <a:r>
               <a:rPr lang="es-CL" dirty="0"/>
-              <a:t>Global </a:t>
-            </a:r>
-            <a:r>
-              <a:rPr lang="es-CL" dirty="0" err="1"/>
-              <a:t>Options</a:t>
-            </a:r>
-            <a:r>
-              <a:rPr lang="es-CL" dirty="0"/>
-              <a:t>&gt;</a:t>
+              <a:t>Control de Versiones &gt;</a:t>
             </a:r>
           </a:p>
           <a:p>
             <a:pPr lvl="3"/>
             <a:r>
               <a:rPr lang="es-CL" dirty="0"/>
-              <a:t>Git/SVN</a:t>
-            </a:r>
-          </a:p>
-          <a:p>
-            <a:r>
-              <a:rPr lang="es-CL" dirty="0"/>
-              <a:t>Crear RSA Key.</a:t>
-            </a:r>
-          </a:p>
-          <a:p>
-            <a:r>
-              <a:rPr lang="es-CL" dirty="0"/>
-              <a:t>Copiar la “</a:t>
-            </a:r>
-            <a:r>
-              <a:rPr lang="es-CL" dirty="0" err="1"/>
-              <a:t>public</a:t>
-            </a:r>
-            <a:r>
-              <a:rPr lang="es-CL" dirty="0"/>
-              <a:t> </a:t>
-            </a:r>
-            <a:r>
-              <a:rPr lang="es-CL" dirty="0" err="1"/>
-              <a:t>key</a:t>
-            </a:r>
-            <a:r>
-              <a:rPr lang="es-CL" dirty="0"/>
-              <a:t>”.</a:t>
-            </a:r>
-          </a:p>
-          <a:p>
-            <a:r>
-              <a:rPr lang="es-CL" dirty="0"/>
-              <a:t>Github.com&gt;</a:t>
-            </a:r>
-          </a:p>
-          <a:p>
-            <a:pPr lvl="1"/>
-            <a:r>
-              <a:rPr lang="es-CL" dirty="0" err="1"/>
-              <a:t>Profile</a:t>
-            </a:r>
-            <a:r>
-              <a:rPr lang="es-CL" dirty="0"/>
-              <a:t>&gt;</a:t>
-            </a:r>
-          </a:p>
-          <a:p>
-            <a:pPr lvl="2"/>
-            <a:r>
-              <a:rPr lang="es-CL" dirty="0" err="1"/>
-              <a:t>Settings</a:t>
-            </a:r>
-            <a:r>
-              <a:rPr lang="es-CL" dirty="0"/>
-              <a:t>&gt;</a:t>
-            </a:r>
-          </a:p>
-          <a:p>
-            <a:pPr lvl="3"/>
-            <a:r>
-              <a:rPr lang="es-CL" dirty="0"/>
-              <a:t>SSH y GPG Key.</a:t>
-            </a:r>
-          </a:p>
-          <a:p>
-            <a:r>
-              <a:rPr lang="es-CL" dirty="0"/>
-              <a:t>Seleccionar “New SSH Key”.</a:t>
-            </a:r>
-          </a:p>
-          <a:p>
-            <a:r>
-              <a:rPr lang="es-CL" dirty="0"/>
-              <a:t>Pegar “</a:t>
-            </a:r>
-            <a:r>
-              <a:rPr lang="es-CL" dirty="0" err="1"/>
-              <a:t>public</a:t>
-            </a:r>
-            <a:r>
-              <a:rPr lang="es-CL" dirty="0"/>
-              <a:t> </a:t>
-            </a:r>
-            <a:r>
-              <a:rPr lang="es-CL" dirty="0" err="1"/>
-              <a:t>key</a:t>
-            </a:r>
-            <a:r>
-              <a:rPr lang="es-CL" dirty="0"/>
-              <a:t>” y aceptar.</a:t>
+              <a:t>Git</a:t>
+            </a:r>
+          </a:p>
+          <a:p>
+            <a:r>
+              <a:rPr lang="es-CL" dirty="0"/>
+              <a:t>Pegar URL y elegir donde guardar</a:t>
+            </a:r>
+          </a:p>
+          <a:p>
+            <a:r>
+              <a:rPr lang="es-CL" dirty="0"/>
+              <a:t>Se creara una directorio para el proyecto con el mismo nombre que el repo en github.com</a:t>
             </a:r>
           </a:p>
         </p:txBody>
@@ -6430,7 +6477,7 @@
     </p:spTree>
     <p:extLst>
       <p:ext uri="{BB962C8B-B14F-4D97-AF65-F5344CB8AC3E}">
-        <p14:creationId xmlns:p14="http://schemas.microsoft.com/office/powerpoint/2010/main" val="2147767534"/>
+        <p14:creationId xmlns:p14="http://schemas.microsoft.com/office/powerpoint/2010/main" val="1811592140"/>
       </p:ext>
     </p:extLst>
   </p:cSld>
@@ -6462,7 +6509,7 @@
           <p:cNvPr id="2" name="Título 1">
             <a:extLst>
               <a:ext uri="{FF2B5EF4-FFF2-40B4-BE49-F238E27FC236}">
-                <a16:creationId xmlns:a16="http://schemas.microsoft.com/office/drawing/2014/main" id="{0E591149-7580-4448-8F27-3B641E7B110B}"/>
+                <a16:creationId xmlns:a16="http://schemas.microsoft.com/office/drawing/2014/main" id="{A0BDDBAC-F74E-4152-A5E7-02C1A205A308}"/>
               </a:ext>
             </a:extLst>
           </p:cNvPr>
@@ -6480,10 +6527,6 @@
           <a:p>
             <a:pPr algn="ctr"/>
             <a:r>
-              <a:rPr lang="es-CL" dirty="0"/>
-              <a:t>Configurando </a:t>
-            </a:r>
-            <a:r>
               <a:rPr lang="es-CL" dirty="0" err="1"/>
               <a:t>Github</a:t>
             </a:r>
@@ -6499,7 +6542,7 @@
           <p:cNvPr id="3" name="Marcador de contenido 2">
             <a:extLst>
               <a:ext uri="{FF2B5EF4-FFF2-40B4-BE49-F238E27FC236}">
-                <a16:creationId xmlns:a16="http://schemas.microsoft.com/office/drawing/2014/main" id="{9508D361-D4E0-4832-AB41-33D3A791AFF0}"/>
+                <a16:creationId xmlns:a16="http://schemas.microsoft.com/office/drawing/2014/main" id="{129FA0CD-1CED-4D3C-A252-003727FA327B}"/>
               </a:ext>
             </a:extLst>
           </p:cNvPr>
@@ -6517,33 +6560,33 @@
           <a:p>
             <a:r>
               <a:rPr lang="es-CL" dirty="0"/>
-              <a:t>Crear Nuevo Repositorio en Github.com</a:t>
-            </a:r>
-          </a:p>
-          <a:p>
-            <a:r>
-              <a:rPr lang="es-CL" dirty="0"/>
-              <a:t>Nombrar y Copiar URL HTTP o SSH.</a:t>
-            </a:r>
-          </a:p>
-          <a:p>
-            <a:r>
-              <a:rPr lang="es-CL" dirty="0"/>
-              <a:t>En RStudio:</a:t>
+              <a:t>Para guardar </a:t>
+            </a:r>
+            <a:r>
+              <a:rPr lang="es-CL" dirty="0" err="1"/>
+              <a:t>commit</a:t>
+            </a:r>
+            <a:r>
+              <a:rPr lang="es-CL" dirty="0"/>
+              <a:t>:</a:t>
             </a:r>
           </a:p>
           <a:p>
             <a:pPr lvl="1"/>
             <a:r>
-              <a:rPr lang="es-CL" dirty="0"/>
-              <a:t>Nuevo Proyecto &gt;</a:t>
+              <a:rPr lang="es-CL" dirty="0" err="1"/>
+              <a:t>Rstudio</a:t>
+            </a:r>
+            <a:r>
+              <a:rPr lang="es-CL" dirty="0"/>
+              <a:t>&gt;</a:t>
             </a:r>
           </a:p>
           <a:p>
             <a:pPr lvl="2"/>
             <a:r>
               <a:rPr lang="es-CL" dirty="0"/>
-              <a:t>Control de Versiones &gt;</a:t>
+              <a:t>Entorno&gt;</a:t>
             </a:r>
           </a:p>
           <a:p>
@@ -6556,21 +6599,92 @@
           <a:p>
             <a:r>
               <a:rPr lang="es-CL" dirty="0"/>
-              <a:t>Pegar URL y elegir donde guardar</a:t>
-            </a:r>
-          </a:p>
-          <a:p>
-            <a:r>
-              <a:rPr lang="es-CL" dirty="0"/>
-              <a:t>Se creara una directorio para el proyecto con el mismo nombre que el repo en github.com</a:t>
-            </a:r>
+              <a:t>Se elige el cuadro bajo </a:t>
+            </a:r>
+            <a:r>
+              <a:rPr lang="es-CL" dirty="0" err="1"/>
+              <a:t>staged</a:t>
+            </a:r>
+            <a:r>
+              <a:rPr lang="es-CL" dirty="0"/>
+              <a:t> para seleccionar archivos a guardar.</a:t>
+            </a:r>
+          </a:p>
+          <a:p>
+            <a:r>
+              <a:rPr lang="es-CL" dirty="0" err="1"/>
+              <a:t>Click</a:t>
+            </a:r>
+            <a:r>
+              <a:rPr lang="es-CL" dirty="0"/>
+              <a:t> en </a:t>
+            </a:r>
+            <a:r>
+              <a:rPr lang="es-CL" dirty="0" err="1"/>
+              <a:t>Diff</a:t>
+            </a:r>
+            <a:endParaRPr lang="es-CL" dirty="0"/>
+          </a:p>
+          <a:p>
+            <a:pPr lvl="1"/>
+            <a:r>
+              <a:rPr lang="es-CL" dirty="0"/>
+              <a:t>Se visualizan cambios realizados desde el ultimo </a:t>
+            </a:r>
+            <a:r>
+              <a:rPr lang="es-CL" dirty="0" err="1"/>
+              <a:t>commit</a:t>
+            </a:r>
+            <a:r>
+              <a:rPr lang="es-CL" dirty="0"/>
+              <a:t>.</a:t>
+            </a:r>
+          </a:p>
+          <a:p>
+            <a:r>
+              <a:rPr lang="es-CL" dirty="0" err="1"/>
+              <a:t>Pull</a:t>
+            </a:r>
+            <a:r>
+              <a:rPr lang="es-CL" dirty="0"/>
+              <a:t>: Actualiza entorno en nuestro RStudio.</a:t>
+            </a:r>
+          </a:p>
+          <a:p>
+            <a:r>
+              <a:rPr lang="es-CL" dirty="0" err="1"/>
+              <a:t>Push</a:t>
+            </a:r>
+            <a:r>
+              <a:rPr lang="es-CL" dirty="0"/>
+              <a:t>: Actualiza repositorio </a:t>
+            </a:r>
+            <a:r>
+              <a:rPr lang="es-CL" dirty="0" err="1"/>
+              <a:t>git</a:t>
+            </a:r>
+            <a:r>
+              <a:rPr lang="es-CL" dirty="0"/>
+              <a:t> con cambios y </a:t>
+            </a:r>
+            <a:r>
+              <a:rPr lang="es-CL" dirty="0" err="1"/>
+              <a:t>commit</a:t>
+            </a:r>
+            <a:r>
+              <a:rPr lang="es-CL" dirty="0"/>
+              <a:t>.</a:t>
+            </a:r>
+          </a:p>
+          <a:p>
+            <a:endParaRPr lang="es-CL" dirty="0"/>
           </a:p>
         </p:txBody>
       </p:sp>
     </p:spTree>
     <p:extLst>
       <p:ext uri="{BB962C8B-B14F-4D97-AF65-F5344CB8AC3E}">
-        <p14:creationId xmlns:p14="http://schemas.microsoft.com/office/powerpoint/2010/main" val="1811592140"/>
+        <p14:creationId xmlns:p14="http://schemas.microsoft.com/office/powerpoint/2010/main" val="1950553402"/>
       </p:ext>
     </p:extLst>
   </p:cSld>
@@ -6685,7 +6799,7 @@
           <p:cNvPr id="2" name="Título 1">
             <a:extLst>
               <a:ext uri="{FF2B5EF4-FFF2-40B4-BE49-F238E27FC236}">
-                <a16:creationId xmlns:a16="http://schemas.microsoft.com/office/drawing/2014/main" id="{A0BDDBAC-F74E-4152-A5E7-02C1A205A308}"/>
+                <a16:creationId xmlns:a16="http://schemas.microsoft.com/office/drawing/2014/main" id="{B21FCB88-C320-4EF6-82A9-FAEAD8A21CEE}"/>
               </a:ext>
             </a:extLst>
           </p:cNvPr>
@@ -6703,12 +6817,16 @@
           <a:p>
             <a:pPr algn="ctr"/>
             <a:r>
-              <a:rPr lang="es-CL" dirty="0" err="1"/>
-              <a:t>Github</a:t>
-            </a:r>
-            <a:r>
-              <a:rPr lang="es-CL" dirty="0"/>
-              <a:t> con RStudio</a:t>
+              <a:rPr lang="es-CL" dirty="0"/>
+              <a:t>¿Cómo escribir un buen </a:t>
+            </a:r>
+            <a:r>
+              <a:rPr lang="es-CL" dirty="0" err="1"/>
+              <a:t>commit</a:t>
+            </a:r>
+            <a:r>
+              <a:rPr lang="es-CL" dirty="0"/>
+              <a:t>?</a:t>
             </a:r>
           </a:p>
         </p:txBody>
@@ -6718,7 +6836,7 @@
           <p:cNvPr id="3" name="Marcador de contenido 2">
             <a:extLst>
               <a:ext uri="{FF2B5EF4-FFF2-40B4-BE49-F238E27FC236}">
-                <a16:creationId xmlns:a16="http://schemas.microsoft.com/office/drawing/2014/main" id="{129FA0CD-1CED-4D3C-A252-003727FA327B}"/>
+                <a16:creationId xmlns:a16="http://schemas.microsoft.com/office/drawing/2014/main" id="{65F31FC8-15A9-4047-9233-E5CCACA179E5}"/>
               </a:ext>
             </a:extLst>
           </p:cNvPr>
@@ -6734,9 +6852,35 @@
           <a:bodyPr/>
           <a:lstStyle/>
           <a:p>
-            <a:r>
-              <a:rPr lang="es-CL" dirty="0"/>
-              <a:t>Para guardar </a:t>
+            <a:pPr marL="514350" indent="-514350">
+              <a:buFont typeface="+mj-lt"/>
+              <a:buAutoNum type="arabicPeriod"/>
+            </a:pPr>
+            <a:r>
+              <a:rPr lang="es-CL" dirty="0" err="1"/>
+              <a:t>Staging</a:t>
+            </a:r>
+            <a:r>
+              <a:rPr lang="es-CL" dirty="0"/>
+              <a:t>: Prepara los cambios que quieres “</a:t>
+            </a:r>
+            <a:r>
+              <a:rPr lang="es-CL" dirty="0" err="1"/>
+              <a:t>commitear</a:t>
+            </a:r>
+            <a:r>
+              <a:rPr lang="es-CL" dirty="0"/>
+              <a:t>”.</a:t>
+            </a:r>
+          </a:p>
+          <a:p>
+            <a:pPr marL="514350" indent="-514350">
+              <a:buFont typeface="+mj-lt"/>
+              <a:buAutoNum type="arabicPeriod"/>
+            </a:pPr>
+            <a:r>
+              <a:rPr lang="es-CL" dirty="0"/>
+              <a:t>Crea el </a:t>
             </a:r>
             <a:r>
               <a:rPr lang="es-CL" dirty="0" err="1"/>
@@ -6744,123 +6888,74 @@
             </a:r>
             <a:r>
               <a:rPr lang="es-CL" dirty="0"/>
-              <a:t>:</a:t>
+              <a:t> con un mensaje.</a:t>
+            </a:r>
+          </a:p>
+          <a:p>
+            <a:pPr marL="0" indent="0">
+              <a:buNone/>
+            </a:pPr>
+            <a:r>
+              <a:rPr lang="es-CL" dirty="0" err="1"/>
+              <a:t>Staging</a:t>
+            </a:r>
+            <a:r>
+              <a:rPr lang="es-CL" dirty="0"/>
+              <a:t>: Es un paso intermedio donde puedes ver los cambios y asegurarte que están correctos antes del “</a:t>
+            </a:r>
+            <a:r>
+              <a:rPr lang="es-CL" dirty="0" err="1"/>
+              <a:t>commit</a:t>
+            </a:r>
+            <a:r>
+              <a:rPr lang="es-CL" dirty="0"/>
+              <a:t>”.</a:t>
+            </a:r>
+          </a:p>
+          <a:p>
+            <a:r>
+              <a:rPr lang="es-CL" dirty="0" err="1"/>
+              <a:t>Commitear</a:t>
+            </a:r>
+            <a:r>
+              <a:rPr lang="es-CL" dirty="0"/>
+              <a:t> muchos cambios pocas veces es una mala idea.</a:t>
+            </a:r>
+          </a:p>
+          <a:p>
+            <a:r>
+              <a:rPr lang="es-CL" dirty="0"/>
+              <a:t>El </a:t>
+            </a:r>
+            <a:r>
+              <a:rPr lang="es-CL" dirty="0" err="1"/>
+              <a:t>commit</a:t>
+            </a:r>
+            <a:r>
+              <a:rPr lang="es-CL" dirty="0"/>
+              <a:t> debe tener un orden lógico sobre los cambios. Generalmente tiene 2 partes:</a:t>
             </a:r>
           </a:p>
           <a:p>
             <a:pPr lvl="1"/>
             <a:r>
-              <a:rPr lang="es-CL" dirty="0" err="1"/>
-              <a:t>Rstudio</a:t>
-            </a:r>
-            <a:r>
-              <a:rPr lang="es-CL" dirty="0"/>
-              <a:t>&gt;</a:t>
-            </a:r>
-          </a:p>
-          <a:p>
-            <a:pPr lvl="2"/>
-            <a:r>
-              <a:rPr lang="es-CL" dirty="0"/>
-              <a:t>Entorno&gt;</a:t>
-            </a:r>
-          </a:p>
-          <a:p>
-            <a:pPr lvl="3"/>
-            <a:r>
-              <a:rPr lang="es-CL" dirty="0"/>
-              <a:t>Git</a:t>
-            </a:r>
-          </a:p>
-          <a:p>
-            <a:r>
-              <a:rPr lang="es-CL" dirty="0"/>
-              <a:t>Se elige el cuadro bajo </a:t>
-            </a:r>
-            <a:r>
-              <a:rPr lang="es-CL" dirty="0" err="1"/>
-              <a:t>staged</a:t>
-            </a:r>
-            <a:r>
-              <a:rPr lang="es-CL" dirty="0"/>
-              <a:t> para seleccionar archivos a guardar.</a:t>
-            </a:r>
-          </a:p>
-          <a:p>
-            <a:r>
-              <a:rPr lang="es-CL" dirty="0" err="1"/>
-              <a:t>Click</a:t>
-            </a:r>
-            <a:r>
-              <a:rPr lang="es-CL" dirty="0"/>
-              <a:t> en </a:t>
-            </a:r>
-            <a:r>
-              <a:rPr lang="es-CL" dirty="0" err="1"/>
-              <a:t>Diff</a:t>
-            </a:r>
-            <a:endParaRPr lang="es-CL" dirty="0"/>
+              <a:rPr lang="es-CL" dirty="0"/>
+              <a:t>El resumen.</a:t>
+            </a:r>
           </a:p>
           <a:p>
             <a:pPr lvl="1"/>
             <a:r>
               <a:rPr lang="es-CL" dirty="0"/>
-              <a:t>Se visualizan cambios realizados desde el ultimo </a:t>
-            </a:r>
-            <a:r>
-              <a:rPr lang="es-CL" dirty="0" err="1"/>
-              <a:t>commit</a:t>
-            </a:r>
-            <a:r>
-              <a:rPr lang="es-CL" dirty="0"/>
-              <a:t>.</a:t>
-            </a:r>
-          </a:p>
-          <a:p>
-            <a:r>
-              <a:rPr lang="es-CL" dirty="0" err="1"/>
-              <a:t>Pull</a:t>
-            </a:r>
-            <a:r>
-              <a:rPr lang="es-CL" dirty="0"/>
-              <a:t>: Actualiza entorno en nuestro RStudio.</a:t>
-            </a:r>
-          </a:p>
-          <a:p>
-            <a:r>
-              <a:rPr lang="es-CL" dirty="0" err="1"/>
-              <a:t>Push</a:t>
-            </a:r>
-            <a:r>
-              <a:rPr lang="es-CL" dirty="0"/>
-              <a:t>: Actualiza repositorio </a:t>
-            </a:r>
-            <a:r>
-              <a:rPr lang="es-CL" dirty="0" err="1"/>
-              <a:t>git</a:t>
-            </a:r>
-            <a:r>
-              <a:rPr lang="es-CL" dirty="0"/>
-              <a:t> con cambios y </a:t>
-            </a:r>
-            <a:r>
-              <a:rPr lang="es-CL" dirty="0" err="1"/>
-              <a:t>commit</a:t>
-            </a:r>
-            <a:r>
-              <a:rPr lang="es-CL" dirty="0"/>
-              <a:t>.</a:t>
-            </a:r>
-          </a:p>
-          <a:p>
-            <a:endParaRPr lang="es-CL" dirty="0"/>
+              <a:t>La descripción (solo si es necesaria).</a:t>
+            </a:r>
           </a:p>
         </p:txBody>
       </p:sp>
     </p:spTree>
     <p:extLst>
       <p:ext uri="{BB962C8B-B14F-4D97-AF65-F5344CB8AC3E}">
-        <p14:creationId xmlns:p14="http://schemas.microsoft.com/office/powerpoint/2010/main" val="1950553402"/>
+        <p14:creationId xmlns:p14="http://schemas.microsoft.com/office/powerpoint/2010/main" val="2102571293"/>
       </p:ext>
     </p:extLst>
   </p:cSld>
@@ -6892,7 +6987,7 @@
           <p:cNvPr id="2" name="Título 1">
             <a:extLst>
               <a:ext uri="{FF2B5EF4-FFF2-40B4-BE49-F238E27FC236}">
-                <a16:creationId xmlns:a16="http://schemas.microsoft.com/office/drawing/2014/main" id="{B21FCB88-C320-4EF6-82A9-FAEAD8A21CEE}"/>
+                <a16:creationId xmlns:a16="http://schemas.microsoft.com/office/drawing/2014/main" id="{5C02F8C3-A4B6-4235-90CF-2E04A9B015D5}"/>
               </a:ext>
             </a:extLst>
           </p:cNvPr>
@@ -6915,7 +7010,15 @@
             </a:r>
             <a:r>
               <a:rPr lang="es-CL" dirty="0" err="1"/>
-              <a:t>commit</a:t>
+              <a:t>Pull</a:t>
+            </a:r>
+            <a:r>
+              <a:rPr lang="es-CL" dirty="0"/>
+              <a:t> </a:t>
+            </a:r>
+            <a:r>
+              <a:rPr lang="es-CL" dirty="0" err="1"/>
+              <a:t>Request</a:t>
             </a:r>
             <a:r>
               <a:rPr lang="es-CL" dirty="0"/>
@@ -6929,7 +7032,7 @@
           <p:cNvPr id="3" name="Marcador de contenido 2">
             <a:extLst>
               <a:ext uri="{FF2B5EF4-FFF2-40B4-BE49-F238E27FC236}">
-                <a16:creationId xmlns:a16="http://schemas.microsoft.com/office/drawing/2014/main" id="{65F31FC8-15A9-4047-9233-E5CCACA179E5}"/>
+                <a16:creationId xmlns:a16="http://schemas.microsoft.com/office/drawing/2014/main" id="{6ADE9049-C39D-4A26-9E2A-57D8733B8E20}"/>
               </a:ext>
             </a:extLst>
           </p:cNvPr>
@@ -6945,110 +7048,51 @@
           <a:bodyPr/>
           <a:lstStyle/>
           <a:p>
-            <a:pPr marL="514350" indent="-514350">
-              <a:buFont typeface="+mj-lt"/>
-              <a:buAutoNum type="arabicPeriod"/>
-            </a:pPr>
-            <a:r>
-              <a:rPr lang="es-CL" dirty="0" err="1"/>
-              <a:t>Staging</a:t>
-            </a:r>
-            <a:r>
-              <a:rPr lang="es-CL" dirty="0"/>
-              <a:t>: Prepara los cambios que quieres “</a:t>
-            </a:r>
-            <a:r>
-              <a:rPr lang="es-CL" dirty="0" err="1"/>
-              <a:t>commitear</a:t>
-            </a:r>
-            <a:r>
-              <a:rPr lang="es-CL" dirty="0"/>
-              <a:t>”.</a:t>
-            </a:r>
-          </a:p>
-          <a:p>
-            <a:pPr marL="514350" indent="-514350">
-              <a:buFont typeface="+mj-lt"/>
-              <a:buAutoNum type="arabicPeriod"/>
-            </a:pPr>
-            <a:r>
-              <a:rPr lang="es-CL" dirty="0"/>
-              <a:t>Crea el </a:t>
-            </a:r>
-            <a:r>
-              <a:rPr lang="es-CL" dirty="0" err="1"/>
-              <a:t>commit</a:t>
-            </a:r>
-            <a:r>
-              <a:rPr lang="es-CL" dirty="0"/>
-              <a:t> con un mensaje.</a:t>
-            </a:r>
-          </a:p>
-          <a:p>
-            <a:pPr marL="0" indent="0">
-              <a:buNone/>
-            </a:pPr>
-            <a:r>
-              <a:rPr lang="es-CL" dirty="0" err="1"/>
-              <a:t>Staging</a:t>
-            </a:r>
-            <a:r>
-              <a:rPr lang="es-CL" dirty="0"/>
-              <a:t>: Es un paso intermedio donde puedes ver los cambios y asegurarte que están correctos antes del “</a:t>
-            </a:r>
-            <a:r>
-              <a:rPr lang="es-CL" dirty="0" err="1"/>
-              <a:t>commit</a:t>
-            </a:r>
-            <a:r>
-              <a:rPr lang="es-CL" dirty="0"/>
-              <a:t>”.</a:t>
-            </a:r>
-          </a:p>
-          <a:p>
-            <a:r>
-              <a:rPr lang="es-CL" dirty="0" err="1"/>
-              <a:t>Commitear</a:t>
-            </a:r>
-            <a:r>
-              <a:rPr lang="es-CL" dirty="0"/>
-              <a:t> muchos cambios pocas veces es una mala idea.</a:t>
-            </a:r>
-          </a:p>
-          <a:p>
-            <a:r>
-              <a:rPr lang="es-CL" dirty="0"/>
-              <a:t>El </a:t>
-            </a:r>
-            <a:r>
-              <a:rPr lang="es-CL" dirty="0" err="1"/>
-              <a:t>commit</a:t>
-            </a:r>
-            <a:r>
-              <a:rPr lang="es-CL" dirty="0"/>
-              <a:t> debe tener un orden lógico sobre los cambios. Generalmente tiene 2 partes:</a:t>
-            </a:r>
-          </a:p>
-          <a:p>
-            <a:pPr lvl="1"/>
-            <a:r>
-              <a:rPr lang="es-CL" dirty="0"/>
-              <a:t>El resumen.</a:t>
-            </a:r>
-          </a:p>
-          <a:p>
-            <a:pPr lvl="1"/>
-            <a:r>
-              <a:rPr lang="es-CL" dirty="0"/>
-              <a:t>La descripción (solo si es necesaria).</a:t>
-            </a:r>
+            <a:endParaRPr lang="es-CL" dirty="0"/>
+          </a:p>
+          <a:p>
+            <a:r>
+              <a:rPr lang="es-CL" dirty="0"/>
+              <a:t>Conoce a tu audiencia.</a:t>
+            </a:r>
+          </a:p>
+          <a:p>
+            <a:r>
+              <a:rPr lang="es-CL" dirty="0"/>
+              <a:t>Mantén el propósito claro.</a:t>
+            </a:r>
+          </a:p>
+          <a:p>
+            <a:r>
+              <a:rPr lang="es-CL" dirty="0" err="1"/>
+              <a:t>Enfocate</a:t>
+            </a:r>
+            <a:r>
+              <a:rPr lang="es-CL" dirty="0"/>
+              <a:t>!</a:t>
+            </a:r>
+          </a:p>
+          <a:p>
+            <a:r>
+              <a:rPr lang="es-CL" dirty="0"/>
+              <a:t>Explica el por qué.</a:t>
+            </a:r>
+          </a:p>
+          <a:p>
+            <a:r>
+              <a:rPr lang="es-CL" dirty="0"/>
+              <a:t>Una imagen vale más que mil palabras.</a:t>
+            </a:r>
+          </a:p>
+          <a:p>
+            <a:endParaRPr lang="es-CL" dirty="0"/>
           </a:p>
         </p:txBody>
       </p:sp>
     </p:spTree>
     <p:extLst>
       <p:ext uri="{BB962C8B-B14F-4D97-AF65-F5344CB8AC3E}">
-        <p14:creationId xmlns:p14="http://schemas.microsoft.com/office/powerpoint/2010/main" val="2102571293"/>
+        <p14:creationId xmlns:p14="http://schemas.microsoft.com/office/powerpoint/2010/main" val="1719612569"/>
       </p:ext>
     </p:extLst>
   </p:cSld>
@@ -7080,7 +7124,7 @@
           <p:cNvPr id="2" name="Título 1">
             <a:extLst>
               <a:ext uri="{FF2B5EF4-FFF2-40B4-BE49-F238E27FC236}">
-                <a16:creationId xmlns:a16="http://schemas.microsoft.com/office/drawing/2014/main" id="{5C02F8C3-A4B6-4235-90CF-2E04A9B015D5}"/>
+                <a16:creationId xmlns:a16="http://schemas.microsoft.com/office/drawing/2014/main" id="{9169AE03-0154-451F-B61C-9D01E9F5BF0C}"/>
               </a:ext>
             </a:extLst>
           </p:cNvPr>
@@ -7096,10 +7140,9 @@
           <a:bodyPr/>
           <a:lstStyle/>
           <a:p>
-            <a:pPr algn="ctr"/>
-            <a:r>
-              <a:rPr lang="es-CL" dirty="0"/>
-              <a:t>¿Cómo escribir un buen </a:t>
+            <a:r>
+              <a:rPr lang="es-CL" dirty="0"/>
+              <a:t>Revisar un </a:t>
             </a:r>
             <a:r>
               <a:rPr lang="es-CL" dirty="0" err="1"/>
@@ -7113,10 +7156,7 @@
               <a:rPr lang="es-CL" dirty="0" err="1"/>
               <a:t>Request</a:t>
             </a:r>
-            <a:r>
-              <a:rPr lang="es-CL" dirty="0"/>
-              <a:t>?</a:t>
-            </a:r>
+            <a:endParaRPr lang="es-CL" dirty="0"/>
           </a:p>
         </p:txBody>
       </p:sp>
@@ -7125,7 +7165,7 @@
           <p:cNvPr id="3" name="Marcador de contenido 2">
             <a:extLst>
               <a:ext uri="{FF2B5EF4-FFF2-40B4-BE49-F238E27FC236}">
-                <a16:creationId xmlns:a16="http://schemas.microsoft.com/office/drawing/2014/main" id="{6ADE9049-C39D-4A26-9E2A-57D8733B8E20}"/>
+                <a16:creationId xmlns:a16="http://schemas.microsoft.com/office/drawing/2014/main" id="{F9D03117-FB9F-44BB-9647-0C9138035596}"/>
               </a:ext>
             </a:extLst>
           </p:cNvPr>
@@ -7141,51 +7181,121 @@
           <a:bodyPr/>
           <a:lstStyle/>
           <a:p>
-            <a:endParaRPr lang="es-CL" dirty="0"/>
-          </a:p>
-          <a:p>
-            <a:r>
-              <a:rPr lang="es-CL" dirty="0"/>
-              <a:t>Conoce a tu audiencia.</a:t>
-            </a:r>
-          </a:p>
-          <a:p>
-            <a:r>
-              <a:rPr lang="es-CL" dirty="0"/>
-              <a:t>Mantén el propósito claro.</a:t>
-            </a:r>
-          </a:p>
-          <a:p>
-            <a:r>
-              <a:rPr lang="es-CL" dirty="0" err="1"/>
-              <a:t>Enfocate</a:t>
-            </a:r>
-            <a:r>
-              <a:rPr lang="es-CL" dirty="0"/>
-              <a:t>!</a:t>
-            </a:r>
-          </a:p>
-          <a:p>
-            <a:r>
-              <a:rPr lang="es-CL" dirty="0"/>
-              <a:t>Explica el por qué.</a:t>
-            </a:r>
-          </a:p>
-          <a:p>
-            <a:r>
-              <a:rPr lang="es-CL" dirty="0"/>
-              <a:t>Una imagen vale más que mil palabras.</a:t>
-            </a:r>
-          </a:p>
-          <a:p>
-            <a:endParaRPr lang="es-CL" dirty="0"/>
+            <a:pPr marL="514350" indent="-514350">
+              <a:buFont typeface="+mj-lt"/>
+              <a:buAutoNum type="arabicPeriod"/>
+            </a:pPr>
+            <a:r>
+              <a:rPr lang="es-CL" dirty="0"/>
+              <a:t>Leer contenido de pestaña </a:t>
+            </a:r>
+            <a:r>
+              <a:rPr lang="es-CL" dirty="0" err="1"/>
+              <a:t>Conversation</a:t>
+            </a:r>
+            <a:r>
+              <a:rPr lang="es-CL" dirty="0"/>
+              <a:t>.</a:t>
+            </a:r>
+          </a:p>
+          <a:p>
+            <a:pPr marL="514350" indent="-514350">
+              <a:buFont typeface="+mj-lt"/>
+              <a:buAutoNum type="arabicPeriod"/>
+            </a:pPr>
+            <a:r>
+              <a:rPr lang="es-CL" dirty="0"/>
+              <a:t>Leer </a:t>
+            </a:r>
+            <a:r>
+              <a:rPr lang="es-CL" dirty="0" err="1"/>
+              <a:t>checkeo</a:t>
+            </a:r>
+            <a:r>
+              <a:rPr lang="es-CL" dirty="0"/>
+              <a:t> que realiza </a:t>
+            </a:r>
+            <a:r>
+              <a:rPr lang="es-CL" dirty="0" err="1"/>
+              <a:t>github</a:t>
+            </a:r>
+            <a:r>
+              <a:rPr lang="es-CL" dirty="0"/>
+              <a:t> a repositorio. Si alguno de los test falla es un indicador que el autor del </a:t>
+            </a:r>
+            <a:r>
+              <a:rPr lang="es-CL" dirty="0" err="1"/>
+              <a:t>pull</a:t>
+            </a:r>
+            <a:r>
+              <a:rPr lang="es-CL" dirty="0"/>
+              <a:t> </a:t>
+            </a:r>
+            <a:r>
+              <a:rPr lang="es-CL" dirty="0" err="1"/>
+              <a:t>request</a:t>
+            </a:r>
+            <a:r>
+              <a:rPr lang="es-CL" dirty="0"/>
+              <a:t> no paso la prueba y debe reparar el código.</a:t>
+            </a:r>
+          </a:p>
+          <a:p>
+            <a:pPr marL="514350" indent="-514350">
+              <a:buFont typeface="+mj-lt"/>
+              <a:buAutoNum type="arabicPeriod"/>
+            </a:pPr>
+            <a:r>
+              <a:rPr lang="es-CL" dirty="0"/>
+              <a:t>Revisa el código:</a:t>
+            </a:r>
+          </a:p>
+          <a:p>
+            <a:pPr marL="971550" lvl="1" indent="-514350">
+              <a:buFont typeface="+mj-lt"/>
+              <a:buAutoNum type="alphaLcParenR"/>
+            </a:pPr>
+            <a:r>
+              <a:rPr lang="es-CL" dirty="0"/>
+              <a:t>Es claro?</a:t>
+            </a:r>
+          </a:p>
+          <a:p>
+            <a:pPr marL="971550" lvl="1" indent="-514350">
+              <a:buFont typeface="+mj-lt"/>
+              <a:buAutoNum type="alphaLcParenR"/>
+            </a:pPr>
+            <a:r>
+              <a:rPr lang="es-CL" dirty="0"/>
+              <a:t>Esta correcto?</a:t>
+            </a:r>
+          </a:p>
+          <a:p>
+            <a:pPr marL="971550" lvl="1" indent="-514350">
+              <a:buFont typeface="+mj-lt"/>
+              <a:buAutoNum type="alphaLcParenR"/>
+            </a:pPr>
+            <a:r>
+              <a:rPr lang="es-CL" dirty="0"/>
+              <a:t>Es seguro?</a:t>
+            </a:r>
+          </a:p>
+          <a:p>
+            <a:pPr marL="971550" lvl="1" indent="-514350">
+              <a:buFont typeface="+mj-lt"/>
+              <a:buAutoNum type="alphaLcParenR"/>
+            </a:pPr>
+            <a:r>
+              <a:rPr lang="es-CL" dirty="0"/>
+              <a:t>Tiene un lenguaje amplio?</a:t>
+            </a:r>
           </a:p>
         </p:txBody>
       </p:sp>
     </p:spTree>
     <p:extLst>
       <p:ext uri="{BB962C8B-B14F-4D97-AF65-F5344CB8AC3E}">
-        <p14:creationId xmlns:p14="http://schemas.microsoft.com/office/powerpoint/2010/main" val="1719612569"/>
+        <p14:creationId xmlns:p14="http://schemas.microsoft.com/office/powerpoint/2010/main" val="3465848147"/>
       </p:ext>
     </p:extLst>
   </p:cSld>
@@ -7217,7 +7327,7 @@
           <p:cNvPr id="2" name="Título 1">
             <a:extLst>
               <a:ext uri="{FF2B5EF4-FFF2-40B4-BE49-F238E27FC236}">
-                <a16:creationId xmlns:a16="http://schemas.microsoft.com/office/drawing/2014/main" id="{9169AE03-0154-451F-B61C-9D01E9F5BF0C}"/>
+                <a16:creationId xmlns:a16="http://schemas.microsoft.com/office/drawing/2014/main" id="{F02BDCC8-F0D0-42D6-9644-160E52933512}"/>
               </a:ext>
             </a:extLst>
           </p:cNvPr>
@@ -7233,21 +7343,14 @@
           <a:bodyPr/>
           <a:lstStyle/>
           <a:p>
-            <a:r>
-              <a:rPr lang="es-CL" dirty="0"/>
-              <a:t>Revisar un </a:t>
-            </a:r>
-            <a:r>
-              <a:rPr lang="es-CL" dirty="0" err="1"/>
-              <a:t>Pull</a:t>
-            </a:r>
-            <a:r>
-              <a:rPr lang="es-CL" dirty="0"/>
-              <a:t> </a:t>
-            </a:r>
-            <a:r>
-              <a:rPr lang="es-CL" dirty="0" err="1"/>
-              <a:t>Request</a:t>
+            <a:pPr algn="ctr"/>
+            <a:r>
+              <a:rPr lang="es-CL" dirty="0"/>
+              <a:t>Proyecto </a:t>
+            </a:r>
+            <a:r>
+              <a:rPr lang="es-CL" dirty="0" err="1"/>
+              <a:t>Github</a:t>
             </a:r>
             <a:endParaRPr lang="es-CL" dirty="0"/>
           </a:p>
@@ -7258,7 +7361,7 @@
           <p:cNvPr id="3" name="Marcador de contenido 2">
             <a:extLst>
               <a:ext uri="{FF2B5EF4-FFF2-40B4-BE49-F238E27FC236}">
-                <a16:creationId xmlns:a16="http://schemas.microsoft.com/office/drawing/2014/main" id="{F9D03117-FB9F-44BB-9647-0C9138035596}"/>
+                <a16:creationId xmlns:a16="http://schemas.microsoft.com/office/drawing/2014/main" id="{0E7F86D4-A1C1-4A2D-979D-664A5B4EDD7F}"/>
               </a:ext>
             </a:extLst>
           </p:cNvPr>
@@ -7274,121 +7377,120 @@
           <a:bodyPr/>
           <a:lstStyle/>
           <a:p>
-            <a:pPr marL="514350" indent="-514350">
-              <a:buFont typeface="+mj-lt"/>
-              <a:buAutoNum type="arabicPeriod"/>
-            </a:pPr>
-            <a:r>
-              <a:rPr lang="es-CL" dirty="0"/>
-              <a:t>Leer contenido de pestaña </a:t>
-            </a:r>
-            <a:r>
-              <a:rPr lang="es-CL" dirty="0" err="1"/>
-              <a:t>Conversation</a:t>
-            </a:r>
-            <a:r>
-              <a:rPr lang="es-CL" dirty="0"/>
-              <a:t>.</a:t>
-            </a:r>
-          </a:p>
-          <a:p>
-            <a:pPr marL="514350" indent="-514350">
-              <a:buFont typeface="+mj-lt"/>
-              <a:buAutoNum type="arabicPeriod"/>
-            </a:pPr>
-            <a:r>
-              <a:rPr lang="es-CL" dirty="0"/>
-              <a:t>Leer </a:t>
-            </a:r>
-            <a:r>
-              <a:rPr lang="es-CL" dirty="0" err="1"/>
-              <a:t>checkeo</a:t>
-            </a:r>
-            <a:r>
-              <a:rPr lang="es-CL" dirty="0"/>
-              <a:t> que realiza </a:t>
-            </a:r>
-            <a:r>
-              <a:rPr lang="es-CL" dirty="0" err="1"/>
-              <a:t>github</a:t>
-            </a:r>
-            <a:r>
-              <a:rPr lang="es-CL" dirty="0"/>
-              <a:t> a repositorio. Si alguno de los test falla es un indicador que el autor del </a:t>
-            </a:r>
-            <a:r>
-              <a:rPr lang="es-CL" dirty="0" err="1"/>
-              <a:t>pull</a:t>
-            </a:r>
-            <a:r>
-              <a:rPr lang="es-CL" dirty="0"/>
-              <a:t> </a:t>
-            </a:r>
-            <a:r>
-              <a:rPr lang="es-CL" dirty="0" err="1"/>
-              <a:t>request</a:t>
-            </a:r>
-            <a:r>
-              <a:rPr lang="es-CL" dirty="0"/>
-              <a:t> no paso la prueba y debe reparar el código.</a:t>
-            </a:r>
-          </a:p>
-          <a:p>
-            <a:pPr marL="514350" indent="-514350">
-              <a:buFont typeface="+mj-lt"/>
-              <a:buAutoNum type="arabicPeriod"/>
-            </a:pPr>
-            <a:r>
-              <a:rPr lang="es-CL" dirty="0"/>
-              <a:t>Revisa el código:</a:t>
-            </a:r>
-          </a:p>
-          <a:p>
-            <a:pPr marL="971550" lvl="1" indent="-514350">
-              <a:buFont typeface="+mj-lt"/>
-              <a:buAutoNum type="alphaLcParenR"/>
-            </a:pPr>
-            <a:r>
-              <a:rPr lang="es-CL" dirty="0"/>
-              <a:t>Es claro?</a:t>
-            </a:r>
-          </a:p>
-          <a:p>
-            <a:pPr marL="971550" lvl="1" indent="-514350">
-              <a:buFont typeface="+mj-lt"/>
-              <a:buAutoNum type="alphaLcParenR"/>
-            </a:pPr>
-            <a:r>
-              <a:rPr lang="es-CL" dirty="0"/>
-              <a:t>Esta correcto?</a:t>
-            </a:r>
-          </a:p>
-          <a:p>
-            <a:pPr marL="971550" lvl="1" indent="-514350">
-              <a:buFont typeface="+mj-lt"/>
-              <a:buAutoNum type="alphaLcParenR"/>
-            </a:pPr>
-            <a:r>
-              <a:rPr lang="es-CL" dirty="0"/>
-              <a:t>Es seguro?</a:t>
-            </a:r>
-          </a:p>
-          <a:p>
-            <a:pPr marL="971550" lvl="1" indent="-514350">
-              <a:buFont typeface="+mj-lt"/>
-              <a:buAutoNum type="alphaLcParenR"/>
-            </a:pPr>
-            <a:r>
-              <a:rPr lang="es-CL" dirty="0"/>
-              <a:t>Tiene un lenguaje amplio?</a:t>
-            </a:r>
+            <a:r>
+              <a:rPr lang="es-CL" dirty="0"/>
+              <a:t>Crear tablero de proyecto:</a:t>
+            </a:r>
+          </a:p>
+          <a:p>
+            <a:pPr lvl="1"/>
+            <a:r>
+              <a:rPr lang="es-CL" dirty="0"/>
+              <a:t>Pestaña </a:t>
+            </a:r>
+            <a:r>
+              <a:rPr lang="es-CL" dirty="0" err="1"/>
+              <a:t>Projects</a:t>
+            </a:r>
+            <a:r>
+              <a:rPr lang="es-CL" dirty="0"/>
+              <a:t> en github.com haz </a:t>
+            </a:r>
+            <a:r>
+              <a:rPr lang="es-CL" dirty="0" err="1"/>
+              <a:t>click</a:t>
+            </a:r>
+            <a:r>
+              <a:rPr lang="es-CL" dirty="0"/>
+              <a:t> en Crear Proyecto.</a:t>
+            </a:r>
+          </a:p>
+          <a:p>
+            <a:pPr lvl="1"/>
+            <a:r>
+              <a:rPr lang="es-CL" dirty="0"/>
+              <a:t>Añade un nombre y descripción.</a:t>
+            </a:r>
+          </a:p>
+          <a:p>
+            <a:pPr lvl="1"/>
+            <a:r>
+              <a:rPr lang="es-CL" dirty="0"/>
+              <a:t>Selecciona una capa o </a:t>
+            </a:r>
+            <a:r>
+              <a:rPr lang="es-CL" dirty="0" err="1"/>
+              <a:t>template</a:t>
+            </a:r>
+            <a:r>
+              <a:rPr lang="es-CL" dirty="0"/>
+              <a:t> y crea el proyecto.</a:t>
+            </a:r>
+          </a:p>
+          <a:p>
+            <a:r>
+              <a:rPr lang="es-CL" dirty="0"/>
+              <a:t>Editar automatizaciones en columna </a:t>
+            </a:r>
+            <a:r>
+              <a:rPr lang="es-CL" dirty="0" err="1"/>
+              <a:t>To</a:t>
+            </a:r>
+            <a:r>
+              <a:rPr lang="es-CL" dirty="0"/>
+              <a:t> do:</a:t>
+            </a:r>
+          </a:p>
+          <a:p>
+            <a:pPr lvl="1"/>
+            <a:r>
+              <a:rPr lang="es-CL" dirty="0" err="1"/>
+              <a:t>Click</a:t>
+            </a:r>
+            <a:r>
+              <a:rPr lang="es-CL" dirty="0"/>
+              <a:t> en botón </a:t>
+            </a:r>
+            <a:r>
+              <a:rPr lang="es-CL" dirty="0" err="1"/>
+              <a:t>Manage</a:t>
+            </a:r>
+            <a:r>
+              <a:rPr lang="es-CL" dirty="0"/>
+              <a:t> al fondo de la columna </a:t>
+            </a:r>
+            <a:r>
+              <a:rPr lang="es-CL" dirty="0" err="1"/>
+              <a:t>To</a:t>
+            </a:r>
+            <a:r>
+              <a:rPr lang="es-CL" dirty="0"/>
+              <a:t> do en el tablero de proyecto.</a:t>
+            </a:r>
+          </a:p>
+          <a:p>
+            <a:r>
+              <a:rPr lang="es-CL" dirty="0"/>
+              <a:t>Lo mismo para las columnas </a:t>
+            </a:r>
+            <a:r>
+              <a:rPr lang="es-CL" dirty="0" err="1"/>
+              <a:t>Progress</a:t>
+            </a:r>
+            <a:r>
+              <a:rPr lang="es-CL" dirty="0"/>
+              <a:t> y Done.</a:t>
+            </a:r>
+          </a:p>
+          <a:p>
+            <a:endParaRPr lang="es-CL" dirty="0"/>
           </a:p>
         </p:txBody>
       </p:sp>
     </p:spTree>
     <p:extLst>
       <p:ext uri="{BB962C8B-B14F-4D97-AF65-F5344CB8AC3E}">
-        <p14:creationId xmlns:p14="http://schemas.microsoft.com/office/powerpoint/2010/main" val="3465848147"/>
+        <p14:creationId xmlns:p14="http://schemas.microsoft.com/office/powerpoint/2010/main" val="2856285003"/>
       </p:ext>
     </p:extLst>
   </p:cSld>
@@ -7420,7 +7522,7 @@
           <p:cNvPr id="2" name="Título 1">
             <a:extLst>
               <a:ext uri="{FF2B5EF4-FFF2-40B4-BE49-F238E27FC236}">
-                <a16:creationId xmlns:a16="http://schemas.microsoft.com/office/drawing/2014/main" id="{F02BDCC8-F0D0-42D6-9644-160E52933512}"/>
+                <a16:creationId xmlns:a16="http://schemas.microsoft.com/office/drawing/2014/main" id="{823B6965-7C2F-46E3-BB22-383839D0F72E}"/>
               </a:ext>
             </a:extLst>
           </p:cNvPr>
@@ -7454,7 +7556,7 @@
           <p:cNvPr id="3" name="Marcador de contenido 2">
             <a:extLst>
               <a:ext uri="{FF2B5EF4-FFF2-40B4-BE49-F238E27FC236}">
-                <a16:creationId xmlns:a16="http://schemas.microsoft.com/office/drawing/2014/main" id="{0E7F86D4-A1C1-4A2D-979D-664A5B4EDD7F}"/>
+                <a16:creationId xmlns:a16="http://schemas.microsoft.com/office/drawing/2014/main" id="{310BE4E6-3A6E-450E-A425-99E54BE525AC}"/>
               </a:ext>
             </a:extLst>
           </p:cNvPr>
@@ -7472,22 +7574,30 @@
           <a:p>
             <a:r>
               <a:rPr lang="es-CL" dirty="0"/>
-              <a:t>Crear tablero de proyecto:</a:t>
+              <a:t>Crear un asunto o </a:t>
+            </a:r>
+            <a:r>
+              <a:rPr lang="es-CL" dirty="0" err="1"/>
+              <a:t>Issue</a:t>
+            </a:r>
+            <a:r>
+              <a:rPr lang="es-CL" dirty="0"/>
+              <a:t>:</a:t>
             </a:r>
           </a:p>
           <a:p>
             <a:pPr lvl="1"/>
             <a:r>
               <a:rPr lang="es-CL" dirty="0"/>
-              <a:t>Pestaña </a:t>
-            </a:r>
-            <a:r>
-              <a:rPr lang="es-CL" dirty="0" err="1"/>
-              <a:t>Projects</a:t>
-            </a:r>
-            <a:r>
-              <a:rPr lang="es-CL" dirty="0"/>
-              <a:t> en github.com haz </a:t>
+              <a:t>En la pestaña </a:t>
+            </a:r>
+            <a:r>
+              <a:rPr lang="es-CL" dirty="0" err="1"/>
+              <a:t>Issue</a:t>
+            </a:r>
+            <a:r>
+              <a:rPr lang="es-CL" dirty="0"/>
+              <a:t>, </a:t>
             </a:r>
             <a:r>
               <a:rPr lang="es-CL" dirty="0" err="1"/>
@@ -7495,35 +7605,70 @@
             </a:r>
             <a:r>
               <a:rPr lang="es-CL" dirty="0"/>
-              <a:t> en Crear Proyecto.</a:t>
+              <a:t> en New </a:t>
+            </a:r>
+            <a:r>
+              <a:rPr lang="es-CL" dirty="0" err="1"/>
+              <a:t>Issue</a:t>
+            </a:r>
+            <a:r>
+              <a:rPr lang="es-CL" dirty="0"/>
+              <a:t>.</a:t>
             </a:r>
           </a:p>
           <a:p>
             <a:pPr lvl="1"/>
             <a:r>
               <a:rPr lang="es-CL" dirty="0"/>
-              <a:t>Añade un nombre y descripción.</a:t>
+              <a:t>Añade titulo y descripción del asunto.</a:t>
             </a:r>
           </a:p>
           <a:p>
             <a:pPr lvl="1"/>
             <a:r>
               <a:rPr lang="es-CL" dirty="0"/>
-              <a:t>Selecciona una capa o </a:t>
-            </a:r>
-            <a:r>
-              <a:rPr lang="es-CL" dirty="0" err="1"/>
-              <a:t>template</a:t>
-            </a:r>
-            <a:r>
-              <a:rPr lang="es-CL" dirty="0"/>
-              <a:t> y crea el proyecto.</a:t>
-            </a:r>
-          </a:p>
-          <a:p>
-            <a:r>
-              <a:rPr lang="es-CL" dirty="0"/>
-              <a:t>Editar automatizaciones en columna </a:t>
+              <a:t>Enlaza el asunto con el proyecto eligiendo “Tracking </a:t>
+            </a:r>
+            <a:r>
+              <a:rPr lang="es-CL" dirty="0" err="1"/>
+              <a:t>changes</a:t>
+            </a:r>
+            <a:r>
+              <a:rPr lang="es-CL" dirty="0"/>
+              <a:t> </a:t>
+            </a:r>
+            <a:r>
+              <a:rPr lang="es-CL" dirty="0" err="1"/>
+              <a:t>to</a:t>
+            </a:r>
+            <a:r>
+              <a:rPr lang="es-CL" dirty="0"/>
+              <a:t> (nombre proyecto)”.</a:t>
+            </a:r>
+          </a:p>
+          <a:p>
+            <a:pPr lvl="1"/>
+            <a:r>
+              <a:rPr lang="es-CL" dirty="0" err="1"/>
+              <a:t>Click</a:t>
+            </a:r>
+            <a:r>
+              <a:rPr lang="es-CL" dirty="0"/>
+              <a:t> en </a:t>
+            </a:r>
+            <a:r>
+              <a:rPr lang="es-CL" dirty="0" err="1"/>
+              <a:t>submit</a:t>
+            </a:r>
+            <a:r>
+              <a:rPr lang="es-CL" dirty="0"/>
+              <a:t>.</a:t>
+            </a:r>
+          </a:p>
+          <a:p>
+            <a:r>
+              <a:rPr lang="es-CL" dirty="0"/>
+              <a:t>Luego de crear un asunto, aparecerá una tarjeta en la columna </a:t>
             </a:r>
             <a:r>
               <a:rPr lang="es-CL" dirty="0" err="1"/>
@@ -7531,59 +7676,15 @@
             </a:r>
             <a:r>
               <a:rPr lang="es-CL" dirty="0"/>
-              <a:t> do:</a:t>
-            </a:r>
-          </a:p>
-          <a:p>
-            <a:pPr lvl="1"/>
-            <a:r>
-              <a:rPr lang="es-CL" dirty="0" err="1"/>
-              <a:t>Click</a:t>
-            </a:r>
-            <a:r>
-              <a:rPr lang="es-CL" dirty="0"/>
-              <a:t> en botón </a:t>
-            </a:r>
-            <a:r>
-              <a:rPr lang="es-CL" dirty="0" err="1"/>
-              <a:t>Manage</a:t>
-            </a:r>
-            <a:r>
-              <a:rPr lang="es-CL" dirty="0"/>
-              <a:t> al fondo de la columna </a:t>
-            </a:r>
-            <a:r>
-              <a:rPr lang="es-CL" dirty="0" err="1"/>
-              <a:t>To</a:t>
-            </a:r>
-            <a:r>
-              <a:rPr lang="es-CL" dirty="0"/>
-              <a:t> do en el tablero de proyecto.</a:t>
-            </a:r>
-          </a:p>
-          <a:p>
-            <a:r>
-              <a:rPr lang="es-CL" dirty="0"/>
-              <a:t>Lo mismo para las columnas </a:t>
-            </a:r>
-            <a:r>
-              <a:rPr lang="es-CL" dirty="0" err="1"/>
-              <a:t>Progress</a:t>
-            </a:r>
-            <a:r>
-              <a:rPr lang="es-CL" dirty="0"/>
-              <a:t> y Done.</a:t>
-            </a:r>
-          </a:p>
-          <a:p>
-            <a:endParaRPr lang="es-CL" dirty="0"/>
+              <a:t> do.</a:t>
+            </a:r>
           </a:p>
         </p:txBody>
       </p:sp>
     </p:spTree>
     <p:extLst>
       <p:ext uri="{BB962C8B-B14F-4D97-AF65-F5344CB8AC3E}">
-        <p14:creationId xmlns:p14="http://schemas.microsoft.com/office/powerpoint/2010/main" val="2856285003"/>
+        <p14:creationId xmlns:p14="http://schemas.microsoft.com/office/powerpoint/2010/main" val="2026976686"/>
       </p:ext>
     </p:extLst>
   </p:cSld>
@@ -7615,7 +7716,7 @@
           <p:cNvPr id="2" name="Título 1">
             <a:extLst>
               <a:ext uri="{FF2B5EF4-FFF2-40B4-BE49-F238E27FC236}">
-                <a16:creationId xmlns:a16="http://schemas.microsoft.com/office/drawing/2014/main" id="{823B6965-7C2F-46E3-BB22-383839D0F72E}"/>
+                <a16:creationId xmlns:a16="http://schemas.microsoft.com/office/drawing/2014/main" id="{39082C3A-EE2D-4E3D-AA3D-0120B810A77E}"/>
               </a:ext>
             </a:extLst>
           </p:cNvPr>
@@ -7649,7 +7750,7 @@
           <p:cNvPr id="3" name="Marcador de contenido 2">
             <a:extLst>
               <a:ext uri="{FF2B5EF4-FFF2-40B4-BE49-F238E27FC236}">
-                <a16:creationId xmlns:a16="http://schemas.microsoft.com/office/drawing/2014/main" id="{310BE4E6-3A6E-450E-A425-99E54BE525AC}"/>
+                <a16:creationId xmlns:a16="http://schemas.microsoft.com/office/drawing/2014/main" id="{BE23FA41-293F-4312-9A0A-5C0C570A82FE}"/>
               </a:ext>
             </a:extLst>
           </p:cNvPr>
@@ -7665,119 +7766,258 @@
           <a:bodyPr/>
           <a:lstStyle/>
           <a:p>
-            <a:r>
-              <a:rPr lang="es-CL" dirty="0"/>
-              <a:t>Crear un asunto o </a:t>
-            </a:r>
-            <a:r>
-              <a:rPr lang="es-CL" dirty="0" err="1"/>
-              <a:t>Issue</a:t>
-            </a:r>
-            <a:r>
-              <a:rPr lang="es-CL" dirty="0"/>
-              <a:t>:</a:t>
-            </a:r>
+            <a:pPr marL="0" indent="0">
+              <a:buNone/>
+            </a:pPr>
+            <a:r>
+              <a:rPr lang="es-CL" dirty="0"/>
+              <a:t>Cerrar un asunto:</a:t>
+            </a:r>
+          </a:p>
+          <a:p>
+            <a:pPr marL="457200" lvl="1" indent="0">
+              <a:buNone/>
+            </a:pPr>
+            <a:r>
+              <a:rPr lang="es-CL" dirty="0"/>
+              <a:t>La mejor manera es crear un </a:t>
+            </a:r>
+            <a:r>
+              <a:rPr lang="es-CL" dirty="0" err="1"/>
+              <a:t>Pull</a:t>
+            </a:r>
+            <a:r>
+              <a:rPr lang="es-CL" dirty="0"/>
+              <a:t> </a:t>
+            </a:r>
+            <a:r>
+              <a:rPr lang="es-CL" dirty="0" err="1"/>
+              <a:t>Request</a:t>
+            </a:r>
+            <a:r>
+              <a:rPr lang="es-CL" dirty="0"/>
+              <a:t> con cambios señalando el asunto que esta resolviendo.</a:t>
+            </a:r>
+          </a:p>
+          <a:p>
+            <a:pPr marL="914400" lvl="1" indent="-457200">
+              <a:buFont typeface="+mj-lt"/>
+              <a:buAutoNum type="arabicPeriod"/>
+            </a:pPr>
+            <a:r>
+              <a:rPr lang="es-CL" dirty="0"/>
+              <a:t>Luego de “</a:t>
+            </a:r>
+            <a:r>
+              <a:rPr lang="es-CL" dirty="0" err="1"/>
+              <a:t>Commitear</a:t>
+            </a:r>
+            <a:r>
+              <a:rPr lang="es-CL" dirty="0"/>
+              <a:t>” los cambios, añade una descripción del </a:t>
+            </a:r>
+            <a:r>
+              <a:rPr lang="es-CL" dirty="0" err="1"/>
+              <a:t>pull</a:t>
+            </a:r>
+            <a:r>
+              <a:rPr lang="es-CL" dirty="0"/>
+              <a:t> </a:t>
+            </a:r>
+            <a:r>
+              <a:rPr lang="es-CL" dirty="0" err="1"/>
+              <a:t>request</a:t>
+            </a:r>
+            <a:r>
+              <a:rPr lang="es-CL" dirty="0"/>
+              <a:t>.</a:t>
+            </a:r>
+          </a:p>
+          <a:p>
+            <a:pPr marL="914400" lvl="1" indent="-457200">
+              <a:buFont typeface="+mj-lt"/>
+              <a:buAutoNum type="arabicPeriod"/>
+            </a:pPr>
+            <a:r>
+              <a:rPr lang="es-CL" dirty="0"/>
+              <a:t>Enlaza el proyecto con el </a:t>
+            </a:r>
+            <a:r>
+              <a:rPr lang="es-CL" dirty="0" err="1"/>
+              <a:t>pull</a:t>
+            </a:r>
+            <a:r>
+              <a:rPr lang="es-CL" dirty="0"/>
+              <a:t> </a:t>
+            </a:r>
+            <a:r>
+              <a:rPr lang="es-CL" dirty="0" err="1"/>
+              <a:t>request</a:t>
+            </a:r>
+            <a:r>
+              <a:rPr lang="es-CL" dirty="0"/>
+              <a:t>.</a:t>
+            </a:r>
+          </a:p>
+          <a:p>
+            <a:pPr marL="914400" lvl="1" indent="-457200">
+              <a:buFont typeface="+mj-lt"/>
+              <a:buAutoNum type="arabicPeriod"/>
+            </a:pPr>
+            <a:r>
+              <a:rPr lang="es-CL" dirty="0" err="1"/>
+              <a:t>Click</a:t>
+            </a:r>
+            <a:r>
+              <a:rPr lang="es-CL" dirty="0"/>
+              <a:t> en “</a:t>
+            </a:r>
+            <a:r>
+              <a:rPr lang="es-CL" dirty="0" err="1"/>
+              <a:t>Pull</a:t>
+            </a:r>
+            <a:r>
+              <a:rPr lang="es-CL" dirty="0"/>
+              <a:t> </a:t>
+            </a:r>
+            <a:r>
+              <a:rPr lang="es-CL" dirty="0" err="1"/>
+              <a:t>Request</a:t>
+            </a:r>
+            <a:r>
+              <a:rPr lang="es-CL" dirty="0"/>
+              <a:t>”.</a:t>
+            </a:r>
+          </a:p>
+          <a:p>
+            <a:pPr marL="914400" lvl="1" indent="-457200">
+              <a:buFont typeface="+mj-lt"/>
+              <a:buAutoNum type="arabicPeriod"/>
+            </a:pPr>
+            <a:r>
+              <a:rPr lang="es-CL" dirty="0"/>
+              <a:t>Observa el tablero de proyectos.</a:t>
+            </a:r>
+          </a:p>
+          <a:p>
+            <a:pPr marL="914400" lvl="1" indent="-457200">
+              <a:buFont typeface="+mj-lt"/>
+              <a:buAutoNum type="arabicPeriod"/>
+            </a:pPr>
+            <a:r>
+              <a:rPr lang="es-CL" dirty="0" err="1"/>
+              <a:t>Click</a:t>
+            </a:r>
+            <a:r>
+              <a:rPr lang="es-CL" dirty="0"/>
+              <a:t> en la tarjeta de nuestro </a:t>
+            </a:r>
+            <a:r>
+              <a:rPr lang="es-CL" dirty="0" err="1"/>
+              <a:t>Pull</a:t>
+            </a:r>
+            <a:r>
+              <a:rPr lang="es-CL" dirty="0"/>
+              <a:t> </a:t>
+            </a:r>
+            <a:r>
+              <a:rPr lang="es-CL" dirty="0" err="1"/>
+              <a:t>request</a:t>
+            </a:r>
+            <a:r>
+              <a:rPr lang="es-CL" dirty="0"/>
+              <a:t>.</a:t>
+            </a:r>
+          </a:p>
+          <a:p>
+            <a:pPr marL="914400" lvl="1" indent="-457200">
+              <a:buFont typeface="+mj-lt"/>
+              <a:buAutoNum type="arabicPeriod"/>
+            </a:pPr>
+            <a:r>
+              <a:rPr lang="es-CL" dirty="0" err="1"/>
+              <a:t>Click</a:t>
+            </a:r>
+            <a:r>
+              <a:rPr lang="es-CL" dirty="0"/>
+              <a:t> en la pestaña Archivos Cambiados y luego en Ver Archivo.</a:t>
+            </a:r>
+          </a:p>
+          <a:p>
+            <a:pPr marL="914400" lvl="1" indent="-457200">
+              <a:buFont typeface="+mj-lt"/>
+              <a:buAutoNum type="arabicPeriod"/>
+            </a:pPr>
+            <a:r>
+              <a:rPr lang="es-CL" dirty="0"/>
+              <a:t>Si estas satisfecho con los cambios, </a:t>
+            </a:r>
+            <a:r>
+              <a:rPr lang="es-CL" dirty="0" err="1"/>
+              <a:t>click</a:t>
+            </a:r>
+            <a:r>
+              <a:rPr lang="es-CL" dirty="0"/>
+              <a:t> en la pestaña </a:t>
+            </a:r>
+            <a:r>
+              <a:rPr lang="es-CL" dirty="0" err="1"/>
+              <a:t>Conversation</a:t>
+            </a:r>
+            <a:r>
+              <a:rPr lang="es-CL" dirty="0"/>
+              <a:t>, </a:t>
+            </a:r>
+            <a:r>
+              <a:rPr lang="es-CL" dirty="0" err="1"/>
+              <a:t>click</a:t>
+            </a:r>
+            <a:r>
+              <a:rPr lang="es-CL" dirty="0"/>
+              <a:t> en </a:t>
+            </a:r>
+            <a:r>
+              <a:rPr lang="es-CL" dirty="0" err="1"/>
+              <a:t>Merge</a:t>
+            </a:r>
+            <a:r>
+              <a:rPr lang="es-CL" dirty="0"/>
+              <a:t> </a:t>
+            </a:r>
+            <a:r>
+              <a:rPr lang="es-CL" dirty="0" err="1"/>
+              <a:t>pull</a:t>
+            </a:r>
+            <a:r>
+              <a:rPr lang="es-CL" dirty="0"/>
+              <a:t> </a:t>
+            </a:r>
+            <a:r>
+              <a:rPr lang="es-CL" dirty="0" err="1"/>
+              <a:t>request</a:t>
+            </a:r>
+            <a:r>
+              <a:rPr lang="es-CL" dirty="0"/>
+              <a:t>, confirma y borra la rama utilizada.</a:t>
+            </a:r>
+          </a:p>
+          <a:p>
+            <a:pPr marL="914400" lvl="1" indent="-457200">
+              <a:buFont typeface="+mj-lt"/>
+              <a:buAutoNum type="arabicPeriod"/>
+            </a:pPr>
+            <a:endParaRPr lang="es-CL" dirty="0"/>
           </a:p>
           <a:p>
             <a:pPr lvl="1"/>
-            <a:r>
-              <a:rPr lang="es-CL" dirty="0"/>
-              <a:t>En la pestaña </a:t>
-            </a:r>
-            <a:r>
-              <a:rPr lang="es-CL" dirty="0" err="1"/>
-              <a:t>Issue</a:t>
-            </a:r>
-            <a:r>
-              <a:rPr lang="es-CL" dirty="0"/>
-              <a:t>, </a:t>
-            </a:r>
-            <a:r>
-              <a:rPr lang="es-CL" dirty="0" err="1"/>
-              <a:t>click</a:t>
-            </a:r>
-            <a:r>
-              <a:rPr lang="es-CL" dirty="0"/>
-              <a:t> en New </a:t>
-            </a:r>
-            <a:r>
-              <a:rPr lang="es-CL" dirty="0" err="1"/>
-              <a:t>Issue</a:t>
-            </a:r>
-            <a:r>
-              <a:rPr lang="es-CL" dirty="0"/>
-              <a:t>.</a:t>
-            </a:r>
-          </a:p>
-          <a:p>
-            <a:pPr lvl="1"/>
-            <a:r>
-              <a:rPr lang="es-CL" dirty="0"/>
-              <a:t>Añade titulo y descripción del asunto.</a:t>
-            </a:r>
-          </a:p>
-          <a:p>
-            <a:pPr lvl="1"/>
-            <a:r>
-              <a:rPr lang="es-CL" dirty="0"/>
-              <a:t>Enlaza el asunto con el proyecto eligiendo “Tracking </a:t>
-            </a:r>
-            <a:r>
-              <a:rPr lang="es-CL" dirty="0" err="1"/>
-              <a:t>changes</a:t>
-            </a:r>
-            <a:r>
-              <a:rPr lang="es-CL" dirty="0"/>
-              <a:t> </a:t>
-            </a:r>
-            <a:r>
-              <a:rPr lang="es-CL" dirty="0" err="1"/>
-              <a:t>to</a:t>
-            </a:r>
-            <a:r>
-              <a:rPr lang="es-CL" dirty="0"/>
-              <a:t> (nombre proyecto)”.</a:t>
-            </a:r>
-          </a:p>
-          <a:p>
-            <a:pPr lvl="1"/>
-            <a:r>
-              <a:rPr lang="es-CL" dirty="0" err="1"/>
-              <a:t>Click</a:t>
-            </a:r>
-            <a:r>
-              <a:rPr lang="es-CL" dirty="0"/>
-              <a:t> en </a:t>
-            </a:r>
-            <a:r>
-              <a:rPr lang="es-CL" dirty="0" err="1"/>
-              <a:t>submit</a:t>
-            </a:r>
-            <a:r>
-              <a:rPr lang="es-CL" dirty="0"/>
-              <a:t>.</a:t>
-            </a:r>
-          </a:p>
-          <a:p>
-            <a:r>
-              <a:rPr lang="es-CL" dirty="0"/>
-              <a:t>Luego de crear un asunto, aparecerá una tarjeta en la columna </a:t>
-            </a:r>
-            <a:r>
-              <a:rPr lang="es-CL" dirty="0" err="1"/>
-              <a:t>To</a:t>
-            </a:r>
-            <a:r>
-              <a:rPr lang="es-CL" dirty="0"/>
-              <a:t> do.</a:t>
-            </a:r>
+            <a:endParaRPr lang="es-CL" dirty="0"/>
           </a:p>
         </p:txBody>
       </p:sp>
     </p:spTree>
     <p:extLst>
       <p:ext uri="{BB962C8B-B14F-4D97-AF65-F5344CB8AC3E}">
-        <p14:creationId xmlns:p14="http://schemas.microsoft.com/office/powerpoint/2010/main" val="2026976686"/>
+        <p14:creationId xmlns:p14="http://schemas.microsoft.com/office/powerpoint/2010/main" val="305773084"/>
       </p:ext>
     </p:extLst>
   </p:cSld>
@@ -7809,7 +8049,7 @@
           <p:cNvPr id="2" name="Título 1">
             <a:extLst>
               <a:ext uri="{FF2B5EF4-FFF2-40B4-BE49-F238E27FC236}">
-                <a16:creationId xmlns:a16="http://schemas.microsoft.com/office/drawing/2014/main" id="{39082C3A-EE2D-4E3D-AA3D-0120B810A77E}"/>
+                <a16:creationId xmlns:a16="http://schemas.microsoft.com/office/drawing/2014/main" id="{FC262B0C-4C89-425B-8262-E31E33FD7784}"/>
               </a:ext>
             </a:extLst>
           </p:cNvPr>
@@ -7834,7 +8074,10 @@
               <a:rPr lang="es-CL" dirty="0" err="1"/>
               <a:t>Github</a:t>
             </a:r>
-            <a:endParaRPr lang="es-CL" dirty="0"/>
+            <a:r>
+              <a:rPr lang="es-CL" dirty="0"/>
+              <a:t> Existente</a:t>
+            </a:r>
           </a:p>
         </p:txBody>
       </p:sp>
@@ -7843,7 +8086,7 @@
           <p:cNvPr id="3" name="Marcador de contenido 2">
             <a:extLst>
               <a:ext uri="{FF2B5EF4-FFF2-40B4-BE49-F238E27FC236}">
-                <a16:creationId xmlns:a16="http://schemas.microsoft.com/office/drawing/2014/main" id="{BE23FA41-293F-4312-9A0A-5C0C570A82FE}"/>
+                <a16:creationId xmlns:a16="http://schemas.microsoft.com/office/drawing/2014/main" id="{70272081-AA81-4C53-80CC-21496CE168EF}"/>
               </a:ext>
             </a:extLst>
           </p:cNvPr>
@@ -7859,21 +8102,13 @@
           <a:bodyPr/>
           <a:lstStyle/>
           <a:p>
-            <a:pPr marL="0" indent="0">
-              <a:buNone/>
-            </a:pPr>
-            <a:r>
-              <a:rPr lang="es-CL" dirty="0"/>
-              <a:t>Cerrar un asunto:</a:t>
-            </a:r>
-          </a:p>
-          <a:p>
-            <a:pPr marL="457200" lvl="1" indent="0">
-              <a:buNone/>
-            </a:pPr>
-            <a:r>
-              <a:rPr lang="es-CL" dirty="0"/>
-              <a:t>La mejor manera es crear un </a:t>
+            <a:r>
+              <a:rPr lang="es-CL" dirty="0" err="1"/>
+              <a:t>Merging</a:t>
+            </a:r>
+            <a:r>
+              <a:rPr lang="es-CL" dirty="0"/>
+              <a:t> a </a:t>
             </a:r>
             <a:r>
               <a:rPr lang="es-CL" dirty="0" err="1"/>
@@ -7889,29 +8124,48 @@
             </a:r>
             <a:r>
               <a:rPr lang="es-CL" dirty="0"/>
-              <a:t> con cambios señalando el asunto que esta resolviendo.</a:t>
-            </a:r>
-          </a:p>
-          <a:p>
-            <a:pPr marL="914400" lvl="1" indent="-457200">
-              <a:buFont typeface="+mj-lt"/>
-              <a:buAutoNum type="arabicPeriod"/>
-            </a:pPr>
-            <a:r>
-              <a:rPr lang="es-CL" dirty="0"/>
-              <a:t>Luego de “</a:t>
-            </a:r>
-            <a:r>
-              <a:rPr lang="es-CL" dirty="0" err="1"/>
-              <a:t>Commitear</a:t>
-            </a:r>
-            <a:r>
-              <a:rPr lang="es-CL" dirty="0"/>
-              <a:t>” los cambios, añade una descripción del </a:t>
-            </a:r>
-            <a:r>
-              <a:rPr lang="es-CL" dirty="0" err="1"/>
-              <a:t>pull</a:t>
+              <a:t> (Unir cambios a repo)</a:t>
+            </a:r>
+          </a:p>
+          <a:p>
+            <a:pPr lvl="1"/>
+            <a:r>
+              <a:rPr lang="es-CL" dirty="0"/>
+              <a:t>En la pestaña “</a:t>
+            </a:r>
+            <a:r>
+              <a:rPr lang="es-CL" dirty="0" err="1"/>
+              <a:t>Code</a:t>
+            </a:r>
+            <a:r>
+              <a:rPr lang="es-CL" dirty="0"/>
+              <a:t>” de github.com, </a:t>
+            </a:r>
+            <a:r>
+              <a:rPr lang="es-CL" dirty="0" err="1"/>
+              <a:t>click</a:t>
+            </a:r>
+            <a:r>
+              <a:rPr lang="es-CL" dirty="0"/>
+              <a:t> en vista #1.</a:t>
+            </a:r>
+          </a:p>
+          <a:p>
+            <a:pPr lvl="1"/>
+            <a:r>
+              <a:rPr lang="es-CL" dirty="0" err="1"/>
+              <a:t>Click</a:t>
+            </a:r>
+            <a:r>
+              <a:rPr lang="es-CL" dirty="0"/>
+              <a:t> en los archivos para ver cambios realizados.</a:t>
+            </a:r>
+          </a:p>
+          <a:p>
+            <a:pPr lvl="1"/>
+            <a:r>
+              <a:rPr lang="es-CL" dirty="0" err="1"/>
+              <a:t>Diff</a:t>
             </a:r>
             <a:r>
               <a:rPr lang="es-CL" dirty="0"/>
@@ -7919,7 +8173,38 @@
             </a:r>
             <a:r>
               <a:rPr lang="es-CL" dirty="0" err="1"/>
-              <a:t>request</a:t>
+              <a:t>settings</a:t>
+            </a:r>
+            <a:r>
+              <a:rPr lang="es-CL" dirty="0"/>
+              <a:t> para cambiar la forma de ver las diferencias.</a:t>
+            </a:r>
+          </a:p>
+          <a:p>
+            <a:pPr lvl="1"/>
+            <a:r>
+              <a:rPr lang="es-CL" dirty="0"/>
+              <a:t>En la pestaña “</a:t>
+            </a:r>
+            <a:r>
+              <a:rPr lang="es-CL" dirty="0" err="1"/>
+              <a:t>Conversation</a:t>
+            </a:r>
+            <a:r>
+              <a:rPr lang="es-CL" dirty="0"/>
+              <a:t>” ve al fondo y haz </a:t>
+            </a:r>
+            <a:r>
+              <a:rPr lang="es-CL" dirty="0" err="1"/>
+              <a:t>click</a:t>
+            </a:r>
+            <a:r>
+              <a:rPr lang="es-CL" dirty="0"/>
+              <a:t> en </a:t>
+            </a:r>
+            <a:r>
+              <a:rPr lang="es-CL" dirty="0" err="1"/>
+              <a:t>Merge</a:t>
             </a:r>
             <a:r>
               <a:rPr lang="es-CL" dirty="0"/>
@@ -7927,25 +8212,14 @@
             </a:r>
           </a:p>
           <a:p>
-            <a:pPr marL="914400" lvl="1" indent="-457200">
-              <a:buFont typeface="+mj-lt"/>
-              <a:buAutoNum type="arabicPeriod"/>
-            </a:pPr>
-            <a:r>
-              <a:rPr lang="es-CL" dirty="0"/>
-              <a:t>Enlaza el proyecto con el </a:t>
-            </a:r>
-            <a:r>
-              <a:rPr lang="es-CL" dirty="0" err="1"/>
-              <a:t>pull</a:t>
-            </a:r>
-            <a:r>
-              <a:rPr lang="es-CL" dirty="0"/>
-              <a:t> </a:t>
-            </a:r>
-            <a:r>
-              <a:rPr lang="es-CL" dirty="0" err="1"/>
-              <a:t>request</a:t>
+            <a:pPr lvl="1"/>
+            <a:r>
+              <a:rPr lang="es-CL" dirty="0"/>
+              <a:t>Confirma </a:t>
+            </a:r>
+            <a:r>
+              <a:rPr lang="es-CL" dirty="0" err="1"/>
+              <a:t>Merge</a:t>
             </a:r>
             <a:r>
               <a:rPr lang="es-CL" dirty="0"/>
@@ -7953,156 +8227,13 @@
             </a:r>
           </a:p>
           <a:p>
-            <a:pPr marL="914400" lvl="1" indent="-457200">
-              <a:buFont typeface="+mj-lt"/>
-              <a:buAutoNum type="arabicPeriod"/>
-            </a:pPr>
-            <a:r>
-              <a:rPr lang="es-CL" dirty="0" err="1"/>
-              <a:t>Click</a:t>
-            </a:r>
-            <a:r>
-              <a:rPr lang="es-CL" dirty="0"/>
-              <a:t> en “</a:t>
-            </a:r>
-            <a:r>
-              <a:rPr lang="es-CL" dirty="0" err="1"/>
-              <a:t>Pull</a:t>
-            </a:r>
-            <a:r>
-              <a:rPr lang="es-CL" dirty="0"/>
-              <a:t> </a:t>
-            </a:r>
-            <a:r>
-              <a:rPr lang="es-CL" dirty="0" err="1"/>
-              <a:t>Request</a:t>
-            </a:r>
-            <a:r>
-              <a:rPr lang="es-CL" dirty="0"/>
-              <a:t>”.</a:t>
-            </a:r>
-          </a:p>
-          <a:p>
-            <a:pPr marL="914400" lvl="1" indent="-457200">
-              <a:buFont typeface="+mj-lt"/>
-              <a:buAutoNum type="arabicPeriod"/>
-            </a:pPr>
-            <a:r>
-              <a:rPr lang="es-CL" dirty="0"/>
-              <a:t>Observa el tablero de proyectos.</a:t>
-            </a:r>
-          </a:p>
-          <a:p>
-            <a:pPr marL="914400" lvl="1" indent="-457200">
-              <a:buFont typeface="+mj-lt"/>
-              <a:buAutoNum type="arabicPeriod"/>
-            </a:pPr>
-            <a:r>
-              <a:rPr lang="es-CL" dirty="0" err="1"/>
-              <a:t>Click</a:t>
-            </a:r>
-            <a:r>
-              <a:rPr lang="es-CL" dirty="0"/>
-              <a:t> en la tarjeta de nuestro </a:t>
-            </a:r>
-            <a:r>
-              <a:rPr lang="es-CL" dirty="0" err="1"/>
-              <a:t>Pull</a:t>
-            </a:r>
-            <a:r>
-              <a:rPr lang="es-CL" dirty="0"/>
-              <a:t> </a:t>
-            </a:r>
-            <a:r>
-              <a:rPr lang="es-CL" dirty="0" err="1"/>
-              <a:t>request</a:t>
-            </a:r>
-            <a:r>
-              <a:rPr lang="es-CL" dirty="0"/>
-              <a:t>.</a:t>
-            </a:r>
-          </a:p>
-          <a:p>
-            <a:pPr marL="914400" lvl="1" indent="-457200">
-              <a:buFont typeface="+mj-lt"/>
-              <a:buAutoNum type="arabicPeriod"/>
-            </a:pPr>
-            <a:r>
-              <a:rPr lang="es-CL" dirty="0" err="1"/>
-              <a:t>Click</a:t>
-            </a:r>
-            <a:r>
-              <a:rPr lang="es-CL" dirty="0"/>
-              <a:t> en la pestaña Archivos Cambiados y luego en Ver Archivo.</a:t>
-            </a:r>
-          </a:p>
-          <a:p>
-            <a:pPr marL="914400" lvl="1" indent="-457200">
-              <a:buFont typeface="+mj-lt"/>
-              <a:buAutoNum type="arabicPeriod"/>
-            </a:pPr>
-            <a:r>
-              <a:rPr lang="es-CL" dirty="0"/>
-              <a:t>Si estas satisfecho con los cambios, </a:t>
-            </a:r>
-            <a:r>
-              <a:rPr lang="es-CL" dirty="0" err="1"/>
-              <a:t>click</a:t>
-            </a:r>
-            <a:r>
-              <a:rPr lang="es-CL" dirty="0"/>
-              <a:t> en la pestaña </a:t>
-            </a:r>
-            <a:r>
-              <a:rPr lang="es-CL" dirty="0" err="1"/>
-              <a:t>Conversation</a:t>
-            </a:r>
-            <a:r>
-              <a:rPr lang="es-CL" dirty="0"/>
-              <a:t>, </a:t>
-            </a:r>
-            <a:r>
-              <a:rPr lang="es-CL" dirty="0" err="1"/>
-              <a:t>click</a:t>
-            </a:r>
-            <a:r>
-              <a:rPr lang="es-CL" dirty="0"/>
-              <a:t> en </a:t>
-            </a:r>
-            <a:r>
-              <a:rPr lang="es-CL" dirty="0" err="1"/>
-              <a:t>Merge</a:t>
-            </a:r>
-            <a:r>
-              <a:rPr lang="es-CL" dirty="0"/>
-              <a:t> </a:t>
-            </a:r>
-            <a:r>
-              <a:rPr lang="es-CL" dirty="0" err="1"/>
-              <a:t>pull</a:t>
-            </a:r>
-            <a:r>
-              <a:rPr lang="es-CL" dirty="0"/>
-              <a:t> </a:t>
-            </a:r>
-            <a:r>
-              <a:rPr lang="es-CL" dirty="0" err="1"/>
-              <a:t>request</a:t>
-            </a:r>
-            <a:r>
-              <a:rPr lang="es-CL" dirty="0"/>
-              <a:t>, confirma y borra la rama utilizada.</a:t>
-            </a:r>
-          </a:p>
-          <a:p>
-            <a:pPr marL="914400" lvl="1" indent="-457200">
-              <a:buFont typeface="+mj-lt"/>
-              <a:buAutoNum type="arabicPeriod"/>
-            </a:pPr>
-            <a:endParaRPr lang="es-CL" dirty="0"/>
-          </a:p>
-          <a:p>
             <a:pPr lvl="1"/>
+            <a:r>
+              <a:rPr lang="es-CL" dirty="0"/>
+              <a:t>Borra la “rama”.</a:t>
+            </a:r>
+          </a:p>
+          <a:p>
             <a:endParaRPr lang="es-CL" dirty="0"/>
           </a:p>
         </p:txBody>
@@ -8110,7 +8241,7 @@
     </p:spTree>
     <p:extLst>
       <p:ext uri="{BB962C8B-B14F-4D97-AF65-F5344CB8AC3E}">
-        <p14:creationId xmlns:p14="http://schemas.microsoft.com/office/powerpoint/2010/main" val="305773084"/>
+        <p14:creationId xmlns:p14="http://schemas.microsoft.com/office/powerpoint/2010/main" val="2541693525"/>
       </p:ext>
     </p:extLst>
   </p:cSld>
@@ -8142,7 +8273,7 @@
           <p:cNvPr id="2" name="Título 1">
             <a:extLst>
               <a:ext uri="{FF2B5EF4-FFF2-40B4-BE49-F238E27FC236}">
-                <a16:creationId xmlns:a16="http://schemas.microsoft.com/office/drawing/2014/main" id="{FC262B0C-4C89-425B-8262-E31E33FD7784}"/>
+                <a16:creationId xmlns:a16="http://schemas.microsoft.com/office/drawing/2014/main" id="{C81C01DB-0242-4E9A-A3B9-8A0770391087}"/>
               </a:ext>
             </a:extLst>
           </p:cNvPr>
@@ -8179,7 +8310,7 @@
           <p:cNvPr id="3" name="Marcador de contenido 2">
             <a:extLst>
               <a:ext uri="{FF2B5EF4-FFF2-40B4-BE49-F238E27FC236}">
-                <a16:creationId xmlns:a16="http://schemas.microsoft.com/office/drawing/2014/main" id="{70272081-AA81-4C53-80CC-21496CE168EF}"/>
+                <a16:creationId xmlns:a16="http://schemas.microsoft.com/office/drawing/2014/main" id="{7D0B1307-BABC-4516-A894-2B5FA0A38AEA}"/>
               </a:ext>
             </a:extLst>
           </p:cNvPr>
@@ -8197,15 +8328,33 @@
           <a:p>
             <a:r>
               <a:rPr lang="es-CL" dirty="0" err="1"/>
-              <a:t>Merging</a:t>
-            </a:r>
-            <a:r>
-              <a:rPr lang="es-CL" dirty="0"/>
-              <a:t> a </a:t>
-            </a:r>
-            <a:r>
-              <a:rPr lang="es-CL" dirty="0" err="1"/>
-              <a:t>Pull</a:t>
+              <a:t>Forking</a:t>
+            </a:r>
+            <a:r>
+              <a:rPr lang="es-CL" dirty="0"/>
+              <a:t>: Es cuando copias un repositorio público a tu cuenta en </a:t>
+            </a:r>
+            <a:r>
+              <a:rPr lang="es-CL" dirty="0" err="1"/>
+              <a:t>github</a:t>
+            </a:r>
+            <a:r>
+              <a:rPr lang="es-CL" dirty="0"/>
+              <a:t>. </a:t>
+            </a:r>
+          </a:p>
+          <a:p>
+            <a:r>
+              <a:rPr lang="es-CL" dirty="0" err="1"/>
+              <a:t>Cloning</a:t>
+            </a:r>
+            <a:r>
+              <a:rPr lang="es-CL" dirty="0"/>
+              <a:t>: Es cuando copias un repositorio en tu computador, y puedes editarlo pero solo puedes hacer un </a:t>
+            </a:r>
+            <a:r>
+              <a:rPr lang="es-CL" dirty="0" err="1"/>
+              <a:t>pull</a:t>
             </a:r>
             <a:r>
               <a:rPr lang="es-CL" dirty="0"/>
@@ -8213,52 +8362,25 @@
             </a:r>
             <a:r>
               <a:rPr lang="es-CL" dirty="0" err="1"/>
-              <a:t>Request</a:t>
-            </a:r>
-            <a:r>
-              <a:rPr lang="es-CL" dirty="0"/>
-              <a:t> (Unir cambios a repo)</a:t>
-            </a:r>
-          </a:p>
-          <a:p>
-            <a:pPr lvl="1"/>
-            <a:r>
-              <a:rPr lang="es-CL" dirty="0"/>
-              <a:t>En la pestaña “</a:t>
-            </a:r>
-            <a:r>
-              <a:rPr lang="es-CL" dirty="0" err="1"/>
-              <a:t>Code</a:t>
-            </a:r>
-            <a:r>
-              <a:rPr lang="es-CL" dirty="0"/>
-              <a:t>” de github.com, </a:t>
-            </a:r>
-            <a:r>
-              <a:rPr lang="es-CL" dirty="0" err="1"/>
-              <a:t>click</a:t>
-            </a:r>
-            <a:r>
-              <a:rPr lang="es-CL" dirty="0"/>
-              <a:t> en vista #1.</a:t>
-            </a:r>
-          </a:p>
-          <a:p>
-            <a:pPr lvl="1"/>
-            <a:r>
-              <a:rPr lang="es-CL" dirty="0" err="1"/>
-              <a:t>Click</a:t>
-            </a:r>
-            <a:r>
-              <a:rPr lang="es-CL" dirty="0"/>
-              <a:t> en los archivos para ver cambios realizados.</a:t>
-            </a:r>
-          </a:p>
-          <a:p>
-            <a:pPr lvl="1"/>
-            <a:r>
-              <a:rPr lang="es-CL" dirty="0" err="1"/>
-              <a:t>Diff</a:t>
+              <a:t>request</a:t>
+            </a:r>
+            <a:r>
+              <a:rPr lang="es-CL" dirty="0"/>
+              <a:t> si tienes permisos para editar el conjunto original de datos.</a:t>
+            </a:r>
+          </a:p>
+          <a:p>
+            <a:r>
+              <a:rPr lang="es-CL" dirty="0" err="1"/>
+              <a:t>Fetching</a:t>
+            </a:r>
+            <a:r>
+              <a:rPr lang="es-CL" dirty="0"/>
+              <a:t>: Luego de clonar un repositorio y pasar tiempo editándolo, puede que alguien mas haya editado los datos originales, por lo que necesitas actualizar tu repositorio para verificar que los cambios realizados en tu </a:t>
+            </a:r>
+            <a:r>
+              <a:rPr lang="es-CL" dirty="0" err="1"/>
+              <a:t>pull</a:t>
             </a:r>
             <a:r>
               <a:rPr lang="es-CL" dirty="0"/>
@@ -8266,64 +8388,19 @@
             </a:r>
             <a:r>
               <a:rPr lang="es-CL" dirty="0" err="1"/>
-              <a:t>settings</a:t>
-            </a:r>
-            <a:r>
-              <a:rPr lang="es-CL" dirty="0"/>
-              <a:t> para cambiar la forma de ver las diferencias.</a:t>
-            </a:r>
-          </a:p>
-          <a:p>
-            <a:pPr lvl="1"/>
-            <a:r>
-              <a:rPr lang="es-CL" dirty="0"/>
-              <a:t>En la pestaña “</a:t>
-            </a:r>
-            <a:r>
-              <a:rPr lang="es-CL" dirty="0" err="1"/>
-              <a:t>Conversation</a:t>
-            </a:r>
-            <a:r>
-              <a:rPr lang="es-CL" dirty="0"/>
-              <a:t>” ve al fondo y haz </a:t>
-            </a:r>
-            <a:r>
-              <a:rPr lang="es-CL" dirty="0" err="1"/>
-              <a:t>click</a:t>
-            </a:r>
-            <a:r>
-              <a:rPr lang="es-CL" dirty="0"/>
-              <a:t> en </a:t>
-            </a:r>
-            <a:r>
-              <a:rPr lang="es-CL" dirty="0" err="1"/>
-              <a:t>Merge</a:t>
-            </a:r>
-            <a:r>
-              <a:rPr lang="es-CL" dirty="0"/>
-              <a:t>.</a:t>
-            </a:r>
-          </a:p>
-          <a:p>
-            <a:pPr lvl="1"/>
-            <a:r>
-              <a:rPr lang="es-CL" dirty="0"/>
-              <a:t>Confirma </a:t>
-            </a:r>
-            <a:r>
-              <a:rPr lang="es-CL" dirty="0" err="1"/>
-              <a:t>Merge</a:t>
-            </a:r>
-            <a:r>
-              <a:rPr lang="es-CL" dirty="0"/>
-              <a:t>.</a:t>
-            </a:r>
-          </a:p>
-          <a:p>
-            <a:pPr lvl="1"/>
-            <a:r>
-              <a:rPr lang="es-CL" dirty="0"/>
-              <a:t>Borra la “rama”.</a:t>
+              <a:t>request</a:t>
+            </a:r>
+            <a:r>
+              <a:rPr lang="es-CL" dirty="0"/>
+              <a:t> no causaran conflicto al ser unidos (</a:t>
+            </a:r>
+            <a:r>
+              <a:rPr lang="es-CL" dirty="0" err="1"/>
+              <a:t>merge</a:t>
+            </a:r>
+            <a:r>
+              <a:rPr lang="es-CL" dirty="0"/>
+              <a:t>).</a:t>
             </a:r>
           </a:p>
           <a:p>
@@ -8334,7 +8411,7 @@
     </p:spTree>
     <p:extLst>
       <p:ext uri="{BB962C8B-B14F-4D97-AF65-F5344CB8AC3E}">
-        <p14:creationId xmlns:p14="http://schemas.microsoft.com/office/powerpoint/2010/main" val="2541693525"/>
+        <p14:creationId xmlns:p14="http://schemas.microsoft.com/office/powerpoint/2010/main" val="3875383177"/>
       </p:ext>
     </p:extLst>
   </p:cSld>
@@ -8366,7 +8443,7 @@
           <p:cNvPr id="2" name="Título 1">
             <a:extLst>
               <a:ext uri="{FF2B5EF4-FFF2-40B4-BE49-F238E27FC236}">
-                <a16:creationId xmlns:a16="http://schemas.microsoft.com/office/drawing/2014/main" id="{C81C01DB-0242-4E9A-A3B9-8A0770391087}"/>
+                <a16:creationId xmlns:a16="http://schemas.microsoft.com/office/drawing/2014/main" id="{D0A474C0-783E-4C67-A7E6-87AB30865092}"/>
               </a:ext>
             </a:extLst>
           </p:cNvPr>
@@ -8403,7 +8480,7 @@
           <p:cNvPr id="3" name="Marcador de contenido 2">
             <a:extLst>
               <a:ext uri="{FF2B5EF4-FFF2-40B4-BE49-F238E27FC236}">
-                <a16:creationId xmlns:a16="http://schemas.microsoft.com/office/drawing/2014/main" id="{7D0B1307-BABC-4516-A894-2B5FA0A38AEA}"/>
+                <a16:creationId xmlns:a16="http://schemas.microsoft.com/office/drawing/2014/main" id="{94B775CE-E26A-4CEA-BC4D-303AEC621911}"/>
               </a:ext>
             </a:extLst>
           </p:cNvPr>
@@ -8416,16 +8493,27 @@
         </p:nvSpPr>
         <p:spPr/>
         <p:txBody>
-          <a:bodyPr/>
+          <a:bodyPr>
+            <a:normAutofit lnSpcReduction="10000"/>
+          </a:bodyPr>
           <a:lstStyle/>
           <a:p>
-            <a:r>
-              <a:rPr lang="es-CL" dirty="0" err="1"/>
-              <a:t>Forking</a:t>
-            </a:r>
-            <a:r>
-              <a:rPr lang="es-CL" dirty="0"/>
-              <a:t>: Es cuando copias un repositorio público a tu cuenta en </a:t>
+            <a:pPr marL="0" indent="0">
+              <a:buNone/>
+            </a:pPr>
+            <a:r>
+              <a:rPr lang="es-CL" dirty="0" err="1"/>
+              <a:t>Fetching</a:t>
+            </a:r>
+            <a:r>
+              <a:rPr lang="es-CL" dirty="0"/>
+              <a:t> en Git:</a:t>
+            </a:r>
+          </a:p>
+          <a:p>
+            <a:r>
+              <a:rPr lang="es-CL" dirty="0"/>
+              <a:t>Ir al directorio donde se copiaron o clonaron los datos de </a:t>
             </a:r>
             <a:r>
               <a:rPr lang="es-CL" dirty="0" err="1"/>
@@ -8433,78 +8521,149 @@
             </a:r>
             <a:r>
               <a:rPr lang="es-CL" dirty="0"/>
-              <a:t>. </a:t>
-            </a:r>
-          </a:p>
-          <a:p>
+              <a:t>.</a:t>
+            </a:r>
+          </a:p>
+          <a:p>
+            <a:r>
+              <a:rPr lang="es-CL" i="1" dirty="0"/>
+              <a:t>$ </a:t>
+            </a:r>
+            <a:r>
+              <a:rPr lang="es-CL" i="1" dirty="0" err="1"/>
+              <a:t>git</a:t>
+            </a:r>
+            <a:r>
+              <a:rPr lang="es-CL" i="1" dirty="0"/>
+              <a:t> </a:t>
+            </a:r>
+            <a:r>
+              <a:rPr lang="es-CL" i="1" dirty="0" err="1"/>
+              <a:t>fetch</a:t>
+            </a:r>
+            <a:r>
+              <a:rPr lang="es-CL" i="1" dirty="0"/>
+              <a:t> </a:t>
+            </a:r>
+            <a:r>
+              <a:rPr lang="es-CL" i="1" dirty="0" err="1"/>
+              <a:t>upstream</a:t>
+            </a:r>
+            <a:endParaRPr lang="es-CL" i="1" dirty="0"/>
+          </a:p>
+          <a:p>
+            <a:r>
+              <a:rPr lang="es-CL" i="1" dirty="0"/>
+              <a:t>$ </a:t>
+            </a:r>
+            <a:r>
+              <a:rPr lang="es-CL" i="1" dirty="0" err="1"/>
+              <a:t>git</a:t>
+            </a:r>
+            <a:r>
+              <a:rPr lang="es-CL" i="1" dirty="0"/>
+              <a:t> </a:t>
+            </a:r>
+            <a:r>
+              <a:rPr lang="es-CL" i="1" dirty="0" err="1"/>
+              <a:t>checkout</a:t>
+            </a:r>
+            <a:r>
+              <a:rPr lang="es-CL" i="1" dirty="0"/>
+              <a:t> –b new-Branch</a:t>
+            </a:r>
+          </a:p>
+          <a:p>
+            <a:r>
+              <a:rPr lang="es-CL" i="1" dirty="0"/>
+              <a:t>$ </a:t>
+            </a:r>
+            <a:r>
+              <a:rPr lang="es-CL" i="1" dirty="0" err="1"/>
+              <a:t>git</a:t>
+            </a:r>
+            <a:r>
+              <a:rPr lang="es-CL" i="1" dirty="0"/>
+              <a:t> </a:t>
+            </a:r>
+            <a:r>
+              <a:rPr lang="es-CL" i="1" dirty="0" err="1"/>
+              <a:t>merge</a:t>
+            </a:r>
+            <a:r>
+              <a:rPr lang="es-CL" i="1" dirty="0"/>
+              <a:t> </a:t>
+            </a:r>
+            <a:r>
+              <a:rPr lang="es-CL" i="1" dirty="0" err="1"/>
+              <a:t>upstream</a:t>
+            </a:r>
+            <a:r>
+              <a:rPr lang="es-CL" i="1" dirty="0"/>
+              <a:t>/master</a:t>
+            </a:r>
+          </a:p>
+          <a:p>
+            <a:pPr marL="0" indent="0">
+              <a:buNone/>
+            </a:pPr>
             <a:r>
               <a:rPr lang="es-CL" dirty="0" err="1"/>
               <a:t>Cloning</a:t>
             </a:r>
             <a:r>
               <a:rPr lang="es-CL" dirty="0"/>
-              <a:t>: Es cuando copias un repositorio en tu computador, y puedes editarlo pero solo puedes hacer un </a:t>
-            </a:r>
-            <a:r>
-              <a:rPr lang="es-CL" dirty="0" err="1"/>
-              <a:t>pull</a:t>
-            </a:r>
-            <a:r>
-              <a:rPr lang="es-CL" dirty="0"/>
+              <a:t> en Git:</a:t>
+            </a:r>
+          </a:p>
+          <a:p>
+            <a:r>
+              <a:rPr lang="es-CL" i="1" dirty="0"/>
+              <a:t>$ </a:t>
+            </a:r>
+            <a:r>
+              <a:rPr lang="es-CL" i="1" dirty="0" err="1"/>
+              <a:t>git</a:t>
+            </a:r>
+            <a:r>
+              <a:rPr lang="es-CL" i="1" dirty="0"/>
+              <a:t> clone https://github.com/usuario/repositorio</a:t>
+            </a:r>
+          </a:p>
+          <a:p>
+            <a:r>
+              <a:rPr lang="es-CL" i="1" dirty="0"/>
+              <a:t>$ cd repositorio</a:t>
+            </a:r>
+          </a:p>
+          <a:p>
+            <a:r>
+              <a:rPr lang="es-CL" i="1" dirty="0"/>
+              <a:t>$ </a:t>
+            </a:r>
+            <a:r>
+              <a:rPr lang="es-CL" i="1" dirty="0" err="1"/>
+              <a:t>git</a:t>
+            </a:r>
+            <a:r>
+              <a:rPr lang="es-CL" i="1" dirty="0"/>
               <a:t> </a:t>
             </a:r>
             <a:r>
-              <a:rPr lang="es-CL" dirty="0" err="1"/>
-              <a:t>request</a:t>
-            </a:r>
-            <a:r>
-              <a:rPr lang="es-CL" dirty="0"/>
-              <a:t> si tienes permisos para editar el conjunto original de datos.</a:t>
-            </a:r>
-          </a:p>
-          <a:p>
-            <a:r>
-              <a:rPr lang="es-CL" dirty="0" err="1"/>
-              <a:t>Fetching</a:t>
-            </a:r>
-            <a:r>
-              <a:rPr lang="es-CL" dirty="0"/>
-              <a:t>: Luego de clonar un repositorio y pasar tiempo editándolo, puede que alguien mas haya editado los datos originales, por lo que necesitas actualizar tu repositorio para verificar que los cambios realizados en tu </a:t>
-            </a:r>
-            <a:r>
-              <a:rPr lang="es-CL" dirty="0" err="1"/>
-              <a:t>pull</a:t>
-            </a:r>
-            <a:r>
-              <a:rPr lang="es-CL" dirty="0"/>
-              <a:t> </a:t>
-            </a:r>
-            <a:r>
-              <a:rPr lang="es-CL" dirty="0" err="1"/>
-              <a:t>request</a:t>
-            </a:r>
-            <a:r>
-              <a:rPr lang="es-CL" dirty="0"/>
-              <a:t> no causaran conflicto al ser unidos (</a:t>
-            </a:r>
-            <a:r>
-              <a:rPr lang="es-CL" dirty="0" err="1"/>
-              <a:t>merge</a:t>
-            </a:r>
-            <a:r>
-              <a:rPr lang="es-CL" dirty="0"/>
-              <a:t>).</a:t>
-            </a:r>
-          </a:p>
-          <a:p>
-            <a:endParaRPr lang="es-CL" dirty="0"/>
+              <a:rPr lang="es-CL" i="1" dirty="0" err="1"/>
+              <a:t>remote</a:t>
+            </a:r>
+            <a:r>
+              <a:rPr lang="es-CL" i="1" dirty="0"/>
+              <a:t> -v</a:t>
+            </a:r>
           </a:p>
         </p:txBody>
       </p:sp>
     </p:spTree>
     <p:extLst>
       <p:ext uri="{BB962C8B-B14F-4D97-AF65-F5344CB8AC3E}">
-        <p14:creationId xmlns:p14="http://schemas.microsoft.com/office/powerpoint/2010/main" val="3875383177"/>
+        <p14:creationId xmlns:p14="http://schemas.microsoft.com/office/powerpoint/2010/main" val="3416937362"/>
       </p:ext>
     </p:extLst>
   </p:cSld>
@@ -8536,7 +8695,7 @@
           <p:cNvPr id="2" name="Título 1">
             <a:extLst>
               <a:ext uri="{FF2B5EF4-FFF2-40B4-BE49-F238E27FC236}">
-                <a16:creationId xmlns:a16="http://schemas.microsoft.com/office/drawing/2014/main" id="{D0A474C0-783E-4C67-A7E6-87AB30865092}"/>
+                <a16:creationId xmlns:a16="http://schemas.microsoft.com/office/drawing/2014/main" id="{54B5AB5C-6AB3-4481-A4CC-3E7CA01AF769}"/>
               </a:ext>
             </a:extLst>
           </p:cNvPr>
@@ -8573,7 +8732,7 @@
           <p:cNvPr id="3" name="Marcador de contenido 2">
             <a:extLst>
               <a:ext uri="{FF2B5EF4-FFF2-40B4-BE49-F238E27FC236}">
-                <a16:creationId xmlns:a16="http://schemas.microsoft.com/office/drawing/2014/main" id="{94B775CE-E26A-4CEA-BC4D-303AEC621911}"/>
+                <a16:creationId xmlns:a16="http://schemas.microsoft.com/office/drawing/2014/main" id="{FF5F421F-79D1-41B8-866A-C1FCDA37B491}"/>
               </a:ext>
             </a:extLst>
           </p:cNvPr>
@@ -8595,105 +8754,43 @@
               <a:buNone/>
             </a:pPr>
             <a:r>
-              <a:rPr lang="es-CL" dirty="0" err="1"/>
-              <a:t>Fetching</a:t>
-            </a:r>
-            <a:r>
-              <a:rPr lang="es-CL" dirty="0"/>
-              <a:t> en Git:</a:t>
-            </a:r>
-          </a:p>
-          <a:p>
-            <a:r>
-              <a:rPr lang="es-CL" dirty="0"/>
-              <a:t>Ir al directorio donde se copiaron o clonaron los datos de </a:t>
-            </a:r>
-            <a:r>
-              <a:rPr lang="es-CL" dirty="0" err="1"/>
-              <a:t>github</a:t>
-            </a:r>
-            <a:r>
-              <a:rPr lang="es-CL" dirty="0"/>
-              <a:t>.</a:t>
-            </a:r>
-          </a:p>
-          <a:p>
-            <a:r>
-              <a:rPr lang="es-CL" dirty="0"/>
+              <a:rPr lang="es-CL" dirty="0"/>
+              <a:t>Crear un Git Alias:</a:t>
+            </a:r>
+          </a:p>
+          <a:p>
+            <a:pPr lvl="1"/>
+            <a:r>
+              <a:rPr lang="es-CL" i="1" dirty="0"/>
               <a:t>$ </a:t>
             </a:r>
             <a:r>
-              <a:rPr lang="es-CL" dirty="0" err="1"/>
+              <a:rPr lang="es-CL" i="1" dirty="0" err="1"/>
               <a:t>git</a:t>
             </a:r>
             <a:r>
-              <a:rPr lang="es-CL" dirty="0"/>
+              <a:rPr lang="es-CL" i="1" dirty="0"/>
               <a:t> </a:t>
             </a:r>
             <a:r>
-              <a:rPr lang="es-CL" dirty="0" err="1"/>
-              <a:t>fetch</a:t>
-            </a:r>
-            <a:r>
-              <a:rPr lang="es-CL" dirty="0"/>
-              <a:t> </a:t>
-            </a:r>
-            <a:r>
-              <a:rPr lang="es-CL" dirty="0" err="1"/>
-              <a:t>upstream</a:t>
-            </a:r>
-            <a:endParaRPr lang="es-CL" dirty="0"/>
-          </a:p>
-          <a:p>
-            <a:r>
-              <a:rPr lang="es-CL" dirty="0"/>
-              <a:t>$ </a:t>
-            </a:r>
-            <a:r>
-              <a:rPr lang="es-CL" dirty="0" err="1"/>
-              <a:t>git</a:t>
-            </a:r>
-            <a:r>
-              <a:rPr lang="es-CL" dirty="0"/>
-              <a:t> </a:t>
-            </a:r>
-            <a:r>
-              <a:rPr lang="es-CL" dirty="0" err="1"/>
-              <a:t>checkout</a:t>
-            </a:r>
-            <a:r>
-              <a:rPr lang="es-CL" dirty="0"/>
-              <a:t> –b new-Branch</a:t>
-            </a:r>
-          </a:p>
-          <a:p>
-            <a:r>
-              <a:rPr lang="es-CL" dirty="0"/>
-              <a:t>$ </a:t>
-            </a:r>
-            <a:r>
-              <a:rPr lang="es-CL" dirty="0" err="1"/>
-              <a:t>git</a:t>
-            </a:r>
-            <a:r>
-              <a:rPr lang="es-CL" dirty="0"/>
-              <a:t> </a:t>
-            </a:r>
-            <a:r>
-              <a:rPr lang="es-CL" dirty="0" err="1"/>
-              <a:t>merge</a:t>
-            </a:r>
-            <a:r>
-              <a:rPr lang="es-CL" dirty="0"/>
-              <a:t> </a:t>
-            </a:r>
-            <a:r>
-              <a:rPr lang="es-CL" dirty="0" err="1"/>
-              <a:t>upstream</a:t>
-            </a:r>
-            <a:r>
-              <a:rPr lang="es-CL" dirty="0"/>
-              <a:t>/master</a:t>
+              <a:rPr lang="es-CL" i="1" dirty="0" err="1"/>
+              <a:t>config</a:t>
+            </a:r>
+            <a:r>
+              <a:rPr lang="es-CL" i="1" dirty="0"/>
+              <a:t> –global alias.st status </a:t>
+            </a:r>
+            <a:r>
+              <a:rPr lang="es-CL" dirty="0"/>
+              <a:t>// crea comando </a:t>
+            </a:r>
+            <a:r>
+              <a:rPr lang="es-CL" dirty="0" err="1"/>
+              <a:t>st</a:t>
+            </a:r>
+            <a:r>
+              <a:rPr lang="es-CL" dirty="0"/>
+              <a:t> para abreviar status</a:t>
             </a:r>
           </a:p>
           <a:p>
@@ -8701,54 +8798,139 @@
               <a:buNone/>
             </a:pPr>
             <a:r>
-              <a:rPr lang="es-CL" dirty="0" err="1"/>
-              <a:t>Cloning</a:t>
-            </a:r>
-            <a:r>
-              <a:rPr lang="es-CL" dirty="0"/>
-              <a:t> en Git:</a:t>
-            </a:r>
-          </a:p>
-          <a:p>
-            <a:r>
-              <a:rPr lang="es-CL" dirty="0"/>
-              <a:t>$ </a:t>
-            </a:r>
-            <a:r>
-              <a:rPr lang="es-CL" dirty="0" err="1"/>
+              <a:rPr lang="es-CL" dirty="0"/>
+              <a:t>Alias para migrar </a:t>
+            </a:r>
+            <a:r>
+              <a:rPr lang="es-CL" dirty="0" err="1"/>
+              <a:t>commits</a:t>
+            </a:r>
+            <a:r>
+              <a:rPr lang="es-CL" dirty="0"/>
+              <a:t> de una rama a otra (cuando tengas problemas con un repo clonado no </a:t>
+            </a:r>
+            <a:r>
+              <a:rPr lang="es-CL" dirty="0" err="1"/>
+              <a:t>fork</a:t>
+            </a:r>
+            <a:r>
+              <a:rPr lang="es-CL" dirty="0"/>
+              <a:t>):</a:t>
+            </a:r>
+          </a:p>
+          <a:p>
+            <a:pPr lvl="1"/>
+            <a:r>
+              <a:rPr lang="es-CL" i="1" dirty="0"/>
+              <a:t>$ open ~/.</a:t>
+            </a:r>
+            <a:r>
+              <a:rPr lang="es-CL" i="1" dirty="0" err="1"/>
+              <a:t>gitconfig</a:t>
+            </a:r>
+            <a:endParaRPr lang="es-CL" i="1" dirty="0"/>
+          </a:p>
+          <a:p>
+            <a:pPr lvl="1"/>
+            <a:r>
+              <a:rPr lang="es-CL" dirty="0"/>
+              <a:t>Añadir siguiente línea al fondo del archivo:</a:t>
+            </a:r>
+          </a:p>
+          <a:p>
+            <a:pPr marL="914400" lvl="2" indent="0">
+              <a:buNone/>
+            </a:pPr>
+            <a:r>
+              <a:rPr lang="es-CL" i="1" dirty="0"/>
+              <a:t>[alias]</a:t>
+            </a:r>
+          </a:p>
+          <a:p>
+            <a:pPr marL="914400" lvl="2" indent="0">
+              <a:buNone/>
+            </a:pPr>
+            <a:r>
+              <a:rPr lang="en-US" i="1" dirty="0"/>
+              <a:t>migrate = "!f(){ CURRENT=$(git symbolic-ref --short HEAD);</a:t>
+            </a:r>
+          </a:p>
+          <a:p>
+            <a:pPr marL="914400" lvl="2" indent="0">
+              <a:buNone/>
+            </a:pPr>
+            <a:r>
+              <a:rPr lang="es-CL" i="1" dirty="0" err="1"/>
               <a:t>git</a:t>
             </a:r>
             <a:r>
-              <a:rPr lang="es-CL" dirty="0"/>
-              <a:t> clone https://github.com/usuario/repositorio</a:t>
-            </a:r>
-          </a:p>
-          <a:p>
-            <a:r>
-              <a:rPr lang="es-CL" dirty="0"/>
-              <a:t>$ cd repositorio</a:t>
-            </a:r>
-          </a:p>
-          <a:p>
-            <a:r>
-              <a:rPr lang="es-CL" dirty="0"/>
-              <a:t>$ </a:t>
-            </a:r>
-            <a:r>
-              <a:rPr lang="es-CL" dirty="0" err="1"/>
+              <a:rPr lang="es-CL" i="1" dirty="0"/>
+              <a:t> </a:t>
+            </a:r>
+            <a:r>
+              <a:rPr lang="es-CL" i="1" dirty="0" err="1"/>
+              <a:t>checkout</a:t>
+            </a:r>
+            <a:r>
+              <a:rPr lang="es-CL" i="1" dirty="0"/>
+              <a:t> -b $1 &amp;&amp; </a:t>
+            </a:r>
+            <a:r>
+              <a:rPr lang="es-CL" i="1" dirty="0" err="1"/>
               <a:t>git</a:t>
             </a:r>
             <a:r>
-              <a:rPr lang="es-CL" dirty="0"/>
+              <a:rPr lang="es-CL" i="1" dirty="0"/>
               <a:t> </a:t>
             </a:r>
             <a:r>
-              <a:rPr lang="es-CL" dirty="0" err="1"/>
-              <a:t>remote</a:t>
-            </a:r>
-            <a:r>
-              <a:rPr lang="es-CL" dirty="0"/>
-              <a:t> -v</a:t>
+              <a:rPr lang="es-CL" i="1" dirty="0" err="1"/>
+              <a:t>branch</a:t>
+            </a:r>
+            <a:r>
+              <a:rPr lang="es-CL" i="1" dirty="0"/>
+              <a:t> --</a:t>
+            </a:r>
+            <a:r>
+              <a:rPr lang="es-CL" i="1" dirty="0" err="1"/>
+              <a:t>force</a:t>
+            </a:r>
+            <a:r>
+              <a:rPr lang="es-CL" i="1" dirty="0"/>
+              <a:t> $CURRENT</a:t>
+            </a:r>
+          </a:p>
+          <a:p>
+            <a:pPr marL="914400" lvl="2" indent="0">
+              <a:buNone/>
+            </a:pPr>
+            <a:r>
+              <a:rPr lang="es-CL" i="1" dirty="0"/>
+              <a:t>${3-$CURRENT@{u}} &amp;&amp; </a:t>
+            </a:r>
+            <a:r>
+              <a:rPr lang="es-CL" i="1" dirty="0" err="1"/>
+              <a:t>git</a:t>
+            </a:r>
+            <a:r>
+              <a:rPr lang="es-CL" i="1" dirty="0"/>
+              <a:t> rebase --onto ${2-master} $CURRENT;</a:t>
+            </a:r>
+          </a:p>
+          <a:p>
+            <a:pPr marL="914400" lvl="2" indent="0">
+              <a:buNone/>
+            </a:pPr>
+            <a:r>
+              <a:rPr lang="es-CL" i="1" dirty="0"/>
+              <a:t>}; f“</a:t>
+            </a:r>
+          </a:p>
+          <a:p>
+            <a:pPr lvl="1"/>
+            <a:r>
+              <a:rPr lang="es-CL" dirty="0"/>
+              <a:t>Guarda cambios y cierra.</a:t>
             </a:r>
           </a:p>
         </p:txBody>
@@ -8756,7 +8938,7 @@
     </p:spTree>
     <p:extLst>
       <p:ext uri="{BB962C8B-B14F-4D97-AF65-F5344CB8AC3E}">
-        <p14:creationId xmlns:p14="http://schemas.microsoft.com/office/powerpoint/2010/main" val="3416937362"/>
+        <p14:creationId xmlns:p14="http://schemas.microsoft.com/office/powerpoint/2010/main" val="2582780840"/>
       </p:ext>
     </p:extLst>
   </p:cSld>
@@ -8933,7 +9115,7 @@
           <p:cNvPr id="2" name="Título 1">
             <a:extLst>
               <a:ext uri="{FF2B5EF4-FFF2-40B4-BE49-F238E27FC236}">
-                <a16:creationId xmlns:a16="http://schemas.microsoft.com/office/drawing/2014/main" id="{54B5AB5C-6AB3-4481-A4CC-3E7CA01AF769}"/>
+                <a16:creationId xmlns:a16="http://schemas.microsoft.com/office/drawing/2014/main" id="{764A380A-B44A-4828-9CE4-759D12735576}"/>
               </a:ext>
             </a:extLst>
           </p:cNvPr>
@@ -8970,7 +9152,7 @@
           <p:cNvPr id="3" name="Marcador de contenido 2">
             <a:extLst>
               <a:ext uri="{FF2B5EF4-FFF2-40B4-BE49-F238E27FC236}">
-                <a16:creationId xmlns:a16="http://schemas.microsoft.com/office/drawing/2014/main" id="{FF5F421F-79D1-41B8-866A-C1FCDA37B491}"/>
+                <a16:creationId xmlns:a16="http://schemas.microsoft.com/office/drawing/2014/main" id="{E8589028-0B2E-481F-95E6-221E56F8E03A}"/>
               </a:ext>
             </a:extLst>
           </p:cNvPr>
@@ -8983,9 +9165,7 @@
         </p:nvSpPr>
         <p:spPr/>
         <p:txBody>
-          <a:bodyPr>
-            <a:normAutofit lnSpcReduction="10000"/>
-          </a:bodyPr>
+          <a:bodyPr/>
           <a:lstStyle/>
           <a:p>
             <a:pPr marL="0" indent="0">
@@ -8993,38 +9173,21 @@
             </a:pPr>
             <a:r>
               <a:rPr lang="es-CL" dirty="0"/>
-              <a:t>Crear un Git Alias:</a:t>
-            </a:r>
-          </a:p>
-          <a:p>
-            <a:pPr lvl="1"/>
-            <a:r>
-              <a:rPr lang="es-CL" dirty="0"/>
-              <a:t>$ </a:t>
-            </a:r>
-            <a:r>
-              <a:rPr lang="es-CL" dirty="0" err="1"/>
-              <a:t>git</a:t>
-            </a:r>
-            <a:r>
-              <a:rPr lang="es-CL" dirty="0"/>
-              <a:t> </a:t>
-            </a:r>
-            <a:r>
-              <a:rPr lang="es-CL" dirty="0" err="1"/>
-              <a:t>config</a:t>
-            </a:r>
-            <a:r>
-              <a:rPr lang="es-CL" dirty="0"/>
-              <a:t> –global alias.st status // crea comando </a:t>
-            </a:r>
-            <a:r>
-              <a:rPr lang="es-CL" dirty="0" err="1"/>
-              <a:t>st</a:t>
-            </a:r>
-            <a:r>
-              <a:rPr lang="es-CL" dirty="0"/>
-              <a:t> para abreviar status</a:t>
+              <a:t>Parámetros nuevo alias </a:t>
+            </a:r>
+            <a:r>
+              <a:rPr lang="es-CL" dirty="0" err="1"/>
+              <a:t>migrate</a:t>
+            </a:r>
+            <a:r>
+              <a:rPr lang="es-CL" dirty="0"/>
+              <a:t>:</a:t>
+            </a:r>
+          </a:p>
+          <a:p>
+            <a:r>
+              <a:rPr lang="en-US" i="1" dirty="0"/>
+              <a:t>$ git migrate &lt;new-branch-name&gt; &lt;target-branch&gt; &lt;commit-range&gt;</a:t>
             </a:r>
           </a:p>
           <a:p>
@@ -9033,7 +9196,7 @@
             </a:pPr>
             <a:r>
               <a:rPr lang="es-CL" dirty="0"/>
-              <a:t>Alias para migrar </a:t>
+              <a:t>Migrar </a:t>
             </a:r>
             <a:r>
               <a:rPr lang="es-CL" dirty="0" err="1"/>
@@ -9041,138 +9204,66 @@
             </a:r>
             <a:r>
               <a:rPr lang="es-CL" dirty="0"/>
-              <a:t> de una rama a otra (cuando tengas problemas con un repo clonado no </a:t>
-            </a:r>
-            <a:r>
-              <a:rPr lang="es-CL" dirty="0" err="1"/>
-              <a:t>fork</a:t>
-            </a:r>
-            <a:r>
-              <a:rPr lang="es-CL" dirty="0"/>
-              <a:t>):</a:t>
-            </a:r>
-          </a:p>
-          <a:p>
-            <a:pPr lvl="1"/>
-            <a:r>
-              <a:rPr lang="es-CL" dirty="0"/>
-              <a:t>$ open ~/.</a:t>
-            </a:r>
-            <a:r>
-              <a:rPr lang="es-CL" dirty="0" err="1"/>
-              <a:t>gitconfig</a:t>
-            </a:r>
+              <a:t> a nueva rama:</a:t>
+            </a:r>
+          </a:p>
+          <a:p>
+            <a:r>
+              <a:rPr lang="es-CL" i="1" dirty="0"/>
+              <a:t>$ </a:t>
+            </a:r>
+            <a:r>
+              <a:rPr lang="es-CL" i="1" dirty="0" err="1"/>
+              <a:t>git</a:t>
+            </a:r>
+            <a:r>
+              <a:rPr lang="es-CL" i="1" dirty="0"/>
+              <a:t> </a:t>
+            </a:r>
+            <a:r>
+              <a:rPr lang="es-CL" i="1" dirty="0" err="1"/>
+              <a:t>migrate</a:t>
+            </a:r>
+            <a:r>
+              <a:rPr lang="es-CL" i="1" dirty="0"/>
+              <a:t> new-Branch</a:t>
+            </a:r>
+          </a:p>
+          <a:p>
+            <a:r>
+              <a:rPr lang="es-CL" i="1" dirty="0"/>
+              <a:t>$ </a:t>
+            </a:r>
+            <a:r>
+              <a:rPr lang="es-CL" i="1" dirty="0" err="1"/>
+              <a:t>git</a:t>
+            </a:r>
+            <a:r>
+              <a:rPr lang="es-CL" i="1" dirty="0"/>
+              <a:t> log master..</a:t>
+            </a:r>
+            <a:r>
+              <a:rPr lang="es-CL" i="1" dirty="0" err="1"/>
+              <a:t>new-br</a:t>
+            </a:r>
+            <a:r>
+              <a:rPr lang="es-CL" i="1" dirty="0"/>
+              <a:t>anch –oneline</a:t>
+            </a:r>
+            <a:r>
+              <a:rPr lang="es-CL" dirty="0"/>
+              <a:t> // compara commits de ambas versiones</a:t>
+            </a:r>
+          </a:p>
+          <a:p>
             <a:endParaRPr lang="es-CL" dirty="0"/>
-          </a:p>
-          <a:p>
-            <a:pPr lvl="1"/>
-            <a:r>
-              <a:rPr lang="es-CL" dirty="0"/>
-              <a:t>Añadir siguiente línea al fondo del archivo:</a:t>
-            </a:r>
-          </a:p>
-          <a:p>
-            <a:pPr marL="914400" lvl="2" indent="0">
-              <a:buNone/>
-            </a:pPr>
-            <a:r>
-              <a:rPr lang="es-CL" dirty="0"/>
-              <a:t>[alias]</a:t>
-            </a:r>
-          </a:p>
-          <a:p>
-            <a:pPr marL="914400" lvl="2" indent="0">
-              <a:buNone/>
-            </a:pPr>
-            <a:r>
-              <a:rPr lang="en-US" dirty="0"/>
-              <a:t>migrate = "!f(){ CURRENT=$(git symbolic-ref --short HEAD);</a:t>
-            </a:r>
-          </a:p>
-          <a:p>
-            <a:pPr marL="914400" lvl="2" indent="0">
-              <a:buNone/>
-            </a:pPr>
-            <a:r>
-              <a:rPr lang="es-CL" dirty="0" err="1"/>
-              <a:t>git</a:t>
-            </a:r>
-            <a:r>
-              <a:rPr lang="es-CL" dirty="0"/>
-              <a:t> </a:t>
-            </a:r>
-            <a:r>
-              <a:rPr lang="es-CL" dirty="0" err="1"/>
-              <a:t>checkout</a:t>
-            </a:r>
-            <a:r>
-              <a:rPr lang="es-CL" dirty="0"/>
-              <a:t> -b $1 &amp;&amp; </a:t>
-            </a:r>
-            <a:r>
-              <a:rPr lang="es-CL" dirty="0" err="1"/>
-              <a:t>git</a:t>
-            </a:r>
-            <a:r>
-              <a:rPr lang="es-CL" dirty="0"/>
-              <a:t> </a:t>
-            </a:r>
-            <a:r>
-              <a:rPr lang="es-CL" dirty="0" err="1"/>
-              <a:t>branch</a:t>
-            </a:r>
-            <a:r>
-              <a:rPr lang="es-CL" dirty="0"/>
-              <a:t> --</a:t>
-            </a:r>
-            <a:r>
-              <a:rPr lang="es-CL" dirty="0" err="1"/>
-              <a:t>force</a:t>
-            </a:r>
-            <a:r>
-              <a:rPr lang="es-CL" dirty="0"/>
-              <a:t> $CURRENT</a:t>
-            </a:r>
-          </a:p>
-          <a:p>
-            <a:pPr marL="914400" lvl="2" indent="0">
-              <a:buNone/>
-            </a:pPr>
-            <a:r>
-              <a:rPr lang="es-CL" dirty="0"/>
-              <a:t>${3-$CURRENT@{u}} &amp;&amp; </a:t>
-            </a:r>
-            <a:r>
-              <a:rPr lang="es-CL" dirty="0" err="1"/>
-              <a:t>git</a:t>
-            </a:r>
-            <a:r>
-              <a:rPr lang="es-CL" dirty="0"/>
-              <a:t> rebase --onto ${2-master} $CURRENT;</a:t>
-            </a:r>
-          </a:p>
-          <a:p>
-            <a:pPr marL="914400" lvl="2" indent="0">
-              <a:buNone/>
-            </a:pPr>
-            <a:r>
-              <a:rPr lang="es-CL" dirty="0"/>
-              <a:t>}; f“</a:t>
-            </a:r>
-          </a:p>
-          <a:p>
-            <a:pPr lvl="1"/>
-            <a:r>
-              <a:rPr lang="es-CL" dirty="0"/>
-              <a:t>Guarda cambios y cierra.</a:t>
-            </a:r>
           </a:p>
         </p:txBody>
       </p:sp>
     </p:spTree>
     <p:extLst>
       <p:ext uri="{BB962C8B-B14F-4D97-AF65-F5344CB8AC3E}">
-        <p14:creationId xmlns:p14="http://schemas.microsoft.com/office/powerpoint/2010/main" val="2582780840"/>
+        <p14:creationId xmlns:p14="http://schemas.microsoft.com/office/powerpoint/2010/main" val="2418268589"/>
       </p:ext>
     </p:extLst>
   </p:cSld>
@@ -9204,7 +9295,7 @@
           <p:cNvPr id="2" name="Título 1">
             <a:extLst>
               <a:ext uri="{FF2B5EF4-FFF2-40B4-BE49-F238E27FC236}">
-                <a16:creationId xmlns:a16="http://schemas.microsoft.com/office/drawing/2014/main" id="{764A380A-B44A-4828-9CE4-759D12735576}"/>
+                <a16:creationId xmlns:a16="http://schemas.microsoft.com/office/drawing/2014/main" id="{259EAF05-4B9D-4DF3-936B-B8EA8FDEBB6C}"/>
               </a:ext>
             </a:extLst>
           </p:cNvPr>
@@ -9241,7 +9332,7 @@
           <p:cNvPr id="3" name="Marcador de contenido 2">
             <a:extLst>
               <a:ext uri="{FF2B5EF4-FFF2-40B4-BE49-F238E27FC236}">
-                <a16:creationId xmlns:a16="http://schemas.microsoft.com/office/drawing/2014/main" id="{E8589028-0B2E-481F-95E6-221E56F8E03A}"/>
+                <a16:creationId xmlns:a16="http://schemas.microsoft.com/office/drawing/2014/main" id="{95277262-0B5E-4303-8BDF-4FBF9798C977}"/>
               </a:ext>
             </a:extLst>
           </p:cNvPr>
@@ -9261,26 +9352,67 @@
               <a:buNone/>
             </a:pPr>
             <a:r>
-              <a:rPr lang="es-CL" dirty="0" err="1"/>
-              <a:t>Parametros</a:t>
-            </a:r>
-            <a:r>
-              <a:rPr lang="es-CL" dirty="0"/>
-              <a:t> nuevo alias </a:t>
-            </a:r>
-            <a:r>
-              <a:rPr lang="es-CL" dirty="0" err="1"/>
-              <a:t>migrate</a:t>
-            </a:r>
-            <a:r>
-              <a:rPr lang="es-CL" dirty="0"/>
-              <a:t>:</a:t>
-            </a:r>
-          </a:p>
-          <a:p>
-            <a:r>
-              <a:rPr lang="en-US" dirty="0"/>
-              <a:t>git migrate &lt;new-branch-name&gt; &lt;target-branch&gt; &lt;commit-range&gt;</a:t>
+              <a:rPr lang="es-CL" dirty="0"/>
+              <a:t>Añadir repo </a:t>
+            </a:r>
+            <a:r>
+              <a:rPr lang="es-CL" dirty="0" err="1"/>
+              <a:t>usptream</a:t>
+            </a:r>
+            <a:r>
+              <a:rPr lang="es-CL" dirty="0"/>
+              <a:t> a directorio:</a:t>
+            </a:r>
+          </a:p>
+          <a:p>
+            <a:r>
+              <a:rPr lang="es-CL" i="1" dirty="0"/>
+              <a:t>$ </a:t>
+            </a:r>
+            <a:r>
+              <a:rPr lang="en-US" i="1" dirty="0"/>
+              <a:t>git remote add upstream </a:t>
+            </a:r>
+            <a:r>
+              <a:rPr lang="en-US" i="1" dirty="0">
+                <a:hlinkClick r:id="rId2"/>
+              </a:rPr>
+              <a:t>https://github.com/</a:t>
+            </a:r>
+            <a:r>
+              <a:rPr lang="es-CL" i="1" dirty="0">
+                <a:hlinkClick r:id="rId2"/>
+              </a:rPr>
+              <a:t>usuario/</a:t>
+            </a:r>
+            <a:r>
+              <a:rPr lang="es-CL" i="1" dirty="0" err="1">
+                <a:hlinkClick r:id="rId2"/>
+              </a:rPr>
+              <a:t>repositorio.git</a:t>
+            </a:r>
+            <a:endParaRPr lang="es-CL" i="1" dirty="0"/>
+          </a:p>
+          <a:p>
+            <a:r>
+              <a:rPr lang="es-CL" i="1" dirty="0"/>
+              <a:t>$ </a:t>
+            </a:r>
+            <a:r>
+              <a:rPr lang="es-CL" i="1" dirty="0" err="1"/>
+              <a:t>git</a:t>
+            </a:r>
+            <a:r>
+              <a:rPr lang="es-CL" i="1" dirty="0"/>
+              <a:t> </a:t>
+            </a:r>
+            <a:r>
+              <a:rPr lang="es-CL" i="1" dirty="0" err="1"/>
+              <a:t>remote</a:t>
+            </a:r>
+            <a:r>
+              <a:rPr lang="es-CL" i="1" dirty="0"/>
+              <a:t> –v</a:t>
             </a:r>
           </a:p>
           <a:p>
@@ -9289,59 +9421,94 @@
             </a:pPr>
             <a:r>
               <a:rPr lang="es-CL" dirty="0"/>
-              <a:t>Migrar </a:t>
-            </a:r>
-            <a:r>
-              <a:rPr lang="es-CL" dirty="0" err="1"/>
-              <a:t>commits</a:t>
-            </a:r>
-            <a:r>
-              <a:rPr lang="es-CL" dirty="0"/>
-              <a:t> a nueva rama:</a:t>
-            </a:r>
-          </a:p>
-          <a:p>
-            <a:r>
-              <a:rPr lang="es-CL" dirty="0"/>
+              <a:t>Cambiar origen remoto una vez hecho </a:t>
+            </a:r>
+            <a:r>
+              <a:rPr lang="es-CL" dirty="0" err="1"/>
+              <a:t>fork</a:t>
+            </a:r>
+            <a:r>
+              <a:rPr lang="es-CL" dirty="0"/>
+              <a:t> al repositorio:</a:t>
+            </a:r>
+          </a:p>
+          <a:p>
+            <a:r>
+              <a:rPr lang="es-CL" i="1" dirty="0"/>
               <a:t>$ </a:t>
             </a:r>
             <a:r>
-              <a:rPr lang="es-CL" dirty="0" err="1"/>
+              <a:rPr lang="es-CL" i="1" dirty="0" err="1"/>
               <a:t>git</a:t>
             </a:r>
             <a:r>
-              <a:rPr lang="es-CL" dirty="0"/>
+              <a:rPr lang="es-CL" i="1" dirty="0"/>
               <a:t> </a:t>
             </a:r>
             <a:r>
-              <a:rPr lang="es-CL" dirty="0" err="1"/>
-              <a:t>migrate</a:t>
-            </a:r>
-            <a:r>
-              <a:rPr lang="es-CL" dirty="0"/>
-              <a:t> new-Branch</a:t>
-            </a:r>
-          </a:p>
-          <a:p>
-            <a:r>
-              <a:rPr lang="es-CL" dirty="0"/>
+              <a:rPr lang="es-CL" i="1" dirty="0" err="1"/>
+              <a:t>remote</a:t>
+            </a:r>
+            <a:r>
+              <a:rPr lang="es-CL" i="1" dirty="0"/>
+              <a:t> set-</a:t>
+            </a:r>
+            <a:r>
+              <a:rPr lang="es-CL" i="1" dirty="0" err="1"/>
+              <a:t>url</a:t>
+            </a:r>
+            <a:r>
+              <a:rPr lang="es-CL" i="1" dirty="0"/>
+              <a:t> </a:t>
+            </a:r>
+            <a:r>
+              <a:rPr lang="es-CL" i="1" dirty="0" err="1"/>
+              <a:t>origin</a:t>
+            </a:r>
+            <a:r>
+              <a:rPr lang="es-CL" i="1" dirty="0"/>
+              <a:t> </a:t>
+            </a:r>
+            <a:r>
+              <a:rPr lang="en-US" i="1" dirty="0">
+                <a:hlinkClick r:id="rId2"/>
+              </a:rPr>
+              <a:t>https://github.com/</a:t>
+            </a:r>
+            <a:r>
+              <a:rPr lang="es-CL" i="1" dirty="0">
+                <a:hlinkClick r:id="rId2"/>
+              </a:rPr>
+              <a:t>usuario/</a:t>
+            </a:r>
+            <a:r>
+              <a:rPr lang="es-CL" i="1" dirty="0" err="1">
+                <a:hlinkClick r:id="rId2"/>
+              </a:rPr>
+              <a:t>repositorio.git</a:t>
+            </a:r>
+            <a:endParaRPr lang="es-CL" i="1" dirty="0"/>
+          </a:p>
+          <a:p>
+            <a:r>
+              <a:rPr lang="es-CL" i="1" dirty="0"/>
               <a:t>$ </a:t>
             </a:r>
             <a:r>
-              <a:rPr lang="es-CL" dirty="0" err="1"/>
+              <a:rPr lang="es-CL" i="1" dirty="0" err="1"/>
               <a:t>git</a:t>
             </a:r>
             <a:r>
-              <a:rPr lang="es-CL" dirty="0"/>
-              <a:t> log master..</a:t>
-            </a:r>
-            <a:r>
-              <a:rPr lang="es-CL" dirty="0" err="1"/>
-              <a:t>new-br</a:t>
-            </a:r>
-            <a:r>
-              <a:rPr lang="es-CL" dirty="0"/>
-              <a:t>anch –oneline // compara commits de ambas versiones</a:t>
+              <a:rPr lang="es-CL" i="1" dirty="0"/>
+              <a:t> </a:t>
+            </a:r>
+            <a:r>
+              <a:rPr lang="es-CL" i="1" dirty="0" err="1"/>
+              <a:t>remote</a:t>
+            </a:r>
+            <a:r>
+              <a:rPr lang="es-CL" i="1" dirty="0"/>
+              <a:t> –v</a:t>
             </a:r>
           </a:p>
           <a:p>
@@ -9352,7 +9519,7 @@
     </p:spTree>
     <p:extLst>
       <p:ext uri="{BB962C8B-B14F-4D97-AF65-F5344CB8AC3E}">
-        <p14:creationId xmlns:p14="http://schemas.microsoft.com/office/powerpoint/2010/main" val="2418268589"/>
+        <p14:creationId xmlns:p14="http://schemas.microsoft.com/office/powerpoint/2010/main" val="632723813"/>
       </p:ext>
     </p:extLst>
   </p:cSld>
@@ -9384,7 +9551,7 @@
           <p:cNvPr id="2" name="Título 1">
             <a:extLst>
               <a:ext uri="{FF2B5EF4-FFF2-40B4-BE49-F238E27FC236}">
-                <a16:creationId xmlns:a16="http://schemas.microsoft.com/office/drawing/2014/main" id="{259EAF05-4B9D-4DF3-936B-B8EA8FDEBB6C}"/>
+                <a16:creationId xmlns:a16="http://schemas.microsoft.com/office/drawing/2014/main" id="{F5D549F0-679B-4563-B78C-E08A5A202CCE}"/>
               </a:ext>
             </a:extLst>
           </p:cNvPr>
@@ -9421,7 +9588,7 @@
           <p:cNvPr id="3" name="Marcador de contenido 2">
             <a:extLst>
               <a:ext uri="{FF2B5EF4-FFF2-40B4-BE49-F238E27FC236}">
-                <a16:creationId xmlns:a16="http://schemas.microsoft.com/office/drawing/2014/main" id="{95277262-0B5E-4303-8BDF-4FBF9798C977}"/>
+                <a16:creationId xmlns:a16="http://schemas.microsoft.com/office/drawing/2014/main" id="{3B7F41ED-B1FA-4475-B85A-4A7088D8FFB4}"/>
               </a:ext>
             </a:extLst>
           </p:cNvPr>
@@ -9442,325 +9609,69 @@
             </a:pPr>
             <a:r>
               <a:rPr lang="es-CL" dirty="0"/>
-              <a:t>Añadir repo </a:t>
-            </a:r>
-            <a:r>
-              <a:rPr lang="es-CL" dirty="0" err="1"/>
-              <a:t>usptream</a:t>
-            </a:r>
-            <a:r>
-              <a:rPr lang="es-CL" dirty="0"/>
-              <a:t> a directorio:</a:t>
-            </a:r>
-          </a:p>
-          <a:p>
-            <a:r>
-              <a:rPr lang="es-CL" dirty="0"/>
+              <a:t>Crear archivos:</a:t>
+            </a:r>
+          </a:p>
+          <a:p>
+            <a:r>
+              <a:rPr lang="es-CL" i="1" dirty="0"/>
               <a:t>$ </a:t>
             </a:r>
             <a:r>
-              <a:rPr lang="en-US" dirty="0"/>
-              <a:t>git remote add upstream </a:t>
-            </a:r>
-            <a:r>
-              <a:rPr lang="en-US" dirty="0">
-                <a:hlinkClick r:id="rId2"/>
-              </a:rPr>
-              <a:t>https://github.com/</a:t>
-            </a:r>
-            <a:r>
-              <a:rPr lang="es-CL" dirty="0">
-                <a:hlinkClick r:id="rId2"/>
-              </a:rPr>
-              <a:t>usuario/</a:t>
-            </a:r>
-            <a:r>
-              <a:rPr lang="es-CL" dirty="0" err="1">
-                <a:hlinkClick r:id="rId2"/>
-              </a:rPr>
-              <a:t>repositorio.git</a:t>
-            </a:r>
-            <a:endParaRPr lang="es-CL" dirty="0"/>
-          </a:p>
-          <a:p>
-            <a:r>
-              <a:rPr lang="es-CL" dirty="0"/>
+              <a:rPr lang="es-CL" i="1" dirty="0" err="1"/>
+              <a:t>touch</a:t>
+            </a:r>
+            <a:r>
+              <a:rPr lang="es-CL" i="1" dirty="0"/>
+              <a:t> README.md</a:t>
+            </a:r>
+          </a:p>
+          <a:p>
+            <a:r>
+              <a:rPr lang="es-CL" i="1" dirty="0"/>
               <a:t>$ </a:t>
             </a:r>
             <a:r>
-              <a:rPr lang="es-CL" dirty="0" err="1"/>
-              <a:t>git</a:t>
-            </a:r>
-            <a:r>
-              <a:rPr lang="es-CL" dirty="0"/>
-              <a:t> </a:t>
-            </a:r>
-            <a:r>
-              <a:rPr lang="es-CL" dirty="0" err="1"/>
-              <a:t>remote</a:t>
-            </a:r>
-            <a:r>
-              <a:rPr lang="es-CL" dirty="0"/>
-              <a:t> –v</a:t>
-            </a:r>
-          </a:p>
-          <a:p>
-            <a:pPr marL="0" indent="0">
-              <a:buNone/>
-            </a:pPr>
-            <a:r>
-              <a:rPr lang="es-CL" dirty="0"/>
-              <a:t>Cambiar origen remoto una vez hecho </a:t>
-            </a:r>
-            <a:r>
-              <a:rPr lang="es-CL" dirty="0" err="1"/>
-              <a:t>fork</a:t>
-            </a:r>
-            <a:r>
-              <a:rPr lang="es-CL" dirty="0"/>
-              <a:t> al repositorio:</a:t>
-            </a:r>
-          </a:p>
-          <a:p>
-            <a:r>
-              <a:rPr lang="es-CL" dirty="0"/>
+              <a:rPr lang="es-CL" i="1" dirty="0" err="1"/>
+              <a:t>touch</a:t>
+            </a:r>
+            <a:r>
+              <a:rPr lang="es-CL" i="1" dirty="0"/>
+              <a:t> index.html</a:t>
+            </a:r>
+          </a:p>
+          <a:p>
+            <a:r>
+              <a:rPr lang="es-CL" i="1" dirty="0"/>
               <a:t>$ </a:t>
             </a:r>
             <a:r>
-              <a:rPr lang="es-CL" dirty="0" err="1"/>
-              <a:t>git</a:t>
-            </a:r>
-            <a:r>
-              <a:rPr lang="es-CL" dirty="0"/>
-              <a:t> </a:t>
-            </a:r>
-            <a:r>
-              <a:rPr lang="es-CL" dirty="0" err="1"/>
-              <a:t>remote</a:t>
-            </a:r>
-            <a:r>
-              <a:rPr lang="es-CL" dirty="0"/>
-              <a:t> set-</a:t>
-            </a:r>
-            <a:r>
-              <a:rPr lang="es-CL" dirty="0" err="1"/>
-              <a:t>url</a:t>
-            </a:r>
-            <a:r>
-              <a:rPr lang="es-CL" dirty="0"/>
-              <a:t> </a:t>
-            </a:r>
-            <a:r>
-              <a:rPr lang="es-CL" dirty="0" err="1"/>
-              <a:t>origin</a:t>
-            </a:r>
-            <a:r>
-              <a:rPr lang="es-CL" dirty="0"/>
-              <a:t> </a:t>
-            </a:r>
-            <a:r>
-              <a:rPr lang="en-US" dirty="0">
-                <a:hlinkClick r:id="rId2"/>
-              </a:rPr>
-              <a:t>https://github.com/</a:t>
-            </a:r>
-            <a:r>
-              <a:rPr lang="es-CL" dirty="0">
-                <a:hlinkClick r:id="rId2"/>
-              </a:rPr>
-              <a:t>usuario/</a:t>
-            </a:r>
-            <a:r>
-              <a:rPr lang="es-CL" dirty="0" err="1">
-                <a:hlinkClick r:id="rId2"/>
-              </a:rPr>
-              <a:t>repositorio.git</a:t>
-            </a:r>
-            <a:endParaRPr lang="es-CL" dirty="0"/>
-          </a:p>
-          <a:p>
-            <a:r>
-              <a:rPr lang="es-CL" dirty="0"/>
+              <a:rPr lang="es-CL" i="1" dirty="0" err="1"/>
+              <a:t>mkdir</a:t>
+            </a:r>
+            <a:r>
+              <a:rPr lang="es-CL" i="1" dirty="0"/>
+              <a:t> R</a:t>
+            </a:r>
+          </a:p>
+          <a:p>
+            <a:r>
+              <a:rPr lang="es-CL" i="1" dirty="0"/>
               <a:t>$ </a:t>
             </a:r>
             <a:r>
-              <a:rPr lang="es-CL" dirty="0" err="1"/>
-              <a:t>git</a:t>
-            </a:r>
-            <a:r>
-              <a:rPr lang="es-CL" dirty="0"/>
-              <a:t> </a:t>
-            </a:r>
-            <a:r>
-              <a:rPr lang="es-CL" dirty="0" err="1"/>
-              <a:t>remote</a:t>
-            </a:r>
-            <a:r>
-              <a:rPr lang="es-CL" dirty="0"/>
-              <a:t> –v</a:t>
-            </a:r>
-          </a:p>
-          <a:p>
-            <a:endParaRPr lang="es-CL" dirty="0"/>
-          </a:p>
-        </p:txBody>
-      </p:sp>
-    </p:spTree>
-    <p:extLst>
-      <p:ext uri="{BB962C8B-B14F-4D97-AF65-F5344CB8AC3E}">
-        <p14:creationId xmlns:p14="http://schemas.microsoft.com/office/powerpoint/2010/main" val="632723813"/>
-      </p:ext>
-    </p:extLst>
-  </p:cSld>
-  <p:clrMapOvr>
-    <a:masterClrMapping/>
-  </p:clrMapOvr>
-</p:sld>
-</file>
-
-<file path=ppt/slides/slide33.xml><?xml version="1.0" encoding="utf-8"?>
-<p:sld xmlns:a="http://schemas.openxmlformats.org/drawingml/2006/main" xmlns:r="http://schemas.openxmlformats.org/officeDocument/2006/relationships" xmlns:p="http://schemas.openxmlformats.org/presentationml/2006/main">
-  <p:cSld>
-    <p:spTree>
-      <p:nvGrpSpPr>
-        <p:cNvPr id="1" name=""/>
-        <p:cNvGrpSpPr/>
-        <p:nvPr/>
-      </p:nvGrpSpPr>
-      <p:grpSpPr>
-        <a:xfrm>
-          <a:off x="0" y="0"/>
-          <a:ext cx="0" cy="0"/>
-          <a:chOff x="0" y="0"/>
-          <a:chExt cx="0" cy="0"/>
-        </a:xfrm>
-      </p:grpSpPr>
-      <p:sp>
-        <p:nvSpPr>
-          <p:cNvPr id="2" name="Título 1">
-            <a:extLst>
-              <a:ext uri="{FF2B5EF4-FFF2-40B4-BE49-F238E27FC236}">
-                <a16:creationId xmlns:a16="http://schemas.microsoft.com/office/drawing/2014/main" id="{F5D549F0-679B-4563-B78C-E08A5A202CCE}"/>
-              </a:ext>
-            </a:extLst>
-          </p:cNvPr>
-          <p:cNvSpPr>
-            <a:spLocks noGrp="1"/>
-          </p:cNvSpPr>
-          <p:nvPr>
-            <p:ph type="title"/>
-          </p:nvPr>
-        </p:nvSpPr>
-        <p:spPr/>
-        <p:txBody>
-          <a:bodyPr/>
-          <a:lstStyle/>
-          <a:p>
-            <a:pPr algn="ctr"/>
-            <a:r>
-              <a:rPr lang="es-CL" dirty="0"/>
-              <a:t>Proyecto </a:t>
-            </a:r>
-            <a:r>
-              <a:rPr lang="es-CL" dirty="0" err="1"/>
-              <a:t>Github</a:t>
-            </a:r>
-            <a:r>
-              <a:rPr lang="es-CL" dirty="0"/>
-              <a:t> Existente</a:t>
-            </a:r>
-          </a:p>
-        </p:txBody>
-      </p:sp>
-      <p:sp>
-        <p:nvSpPr>
-          <p:cNvPr id="3" name="Marcador de contenido 2">
-            <a:extLst>
-              <a:ext uri="{FF2B5EF4-FFF2-40B4-BE49-F238E27FC236}">
-                <a16:creationId xmlns:a16="http://schemas.microsoft.com/office/drawing/2014/main" id="{3B7F41ED-B1FA-4475-B85A-4A7088D8FFB4}"/>
-              </a:ext>
-            </a:extLst>
-          </p:cNvPr>
-          <p:cNvSpPr>
-            <a:spLocks noGrp="1"/>
-          </p:cNvSpPr>
-          <p:nvPr>
-            <p:ph idx="1"/>
-          </p:nvPr>
-        </p:nvSpPr>
-        <p:spPr/>
-        <p:txBody>
-          <a:bodyPr/>
-          <a:lstStyle/>
-          <a:p>
-            <a:pPr marL="0" indent="0">
-              <a:buNone/>
-            </a:pPr>
-            <a:r>
-              <a:rPr lang="es-CL" dirty="0"/>
-              <a:t>Crear archivos:</a:t>
-            </a:r>
-          </a:p>
-          <a:p>
-            <a:r>
-              <a:rPr lang="es-CL" dirty="0"/>
-              <a:t>$ </a:t>
-            </a:r>
-            <a:r>
-              <a:rPr lang="es-CL" dirty="0" err="1"/>
+              <a:rPr lang="es-CL" i="1" dirty="0" err="1"/>
               <a:t>touch</a:t>
             </a:r>
             <a:r>
-              <a:rPr lang="es-CL" dirty="0"/>
-              <a:t> README.md</a:t>
-            </a:r>
-          </a:p>
-          <a:p>
-            <a:r>
-              <a:rPr lang="es-CL" dirty="0"/>
-              <a:t>$ </a:t>
-            </a:r>
-            <a:r>
-              <a:rPr lang="es-CL" dirty="0" err="1"/>
-              <a:t>touch</a:t>
-            </a:r>
-            <a:r>
-              <a:rPr lang="es-CL" dirty="0"/>
-              <a:t> index.html</a:t>
-            </a:r>
-          </a:p>
-          <a:p>
-            <a:r>
-              <a:rPr lang="es-CL" dirty="0"/>
-              <a:t>$ </a:t>
-            </a:r>
-            <a:r>
-              <a:rPr lang="es-CL" dirty="0" err="1"/>
-              <a:t>mkdir</a:t>
-            </a:r>
-            <a:r>
-              <a:rPr lang="es-CL" dirty="0"/>
-              <a:t> R</a:t>
-            </a:r>
-          </a:p>
-          <a:p>
-            <a:r>
-              <a:rPr lang="es-CL" dirty="0"/>
-              <a:t>$ </a:t>
-            </a:r>
-            <a:r>
-              <a:rPr lang="es-CL" dirty="0" err="1"/>
-              <a:t>touch</a:t>
-            </a:r>
-            <a:r>
-              <a:rPr lang="es-CL" dirty="0"/>
+              <a:rPr lang="es-CL" i="1" dirty="0"/>
               <a:t> R/</a:t>
             </a:r>
             <a:r>
-              <a:rPr lang="es-CL" dirty="0" err="1"/>
+              <a:rPr lang="es-CL" i="1" dirty="0" err="1"/>
               <a:t>script.R</a:t>
             </a:r>
-            <a:endParaRPr lang="es-CL" dirty="0"/>
+            <a:endParaRPr lang="es-CL" i="1" dirty="0"/>
           </a:p>
           <a:p>
             <a:endParaRPr lang="es-CL" dirty="0"/>
@@ -10785,7 +10696,7 @@
             </a:r>
             <a:r>
               <a:rPr lang="es-CL" dirty="0"/>
-              <a:t> se debe reemplazar por la               				          dirección del servidor remoto</a:t>
+              <a:t> se debe reemplazar por 						la dirección del servidor remoto.</a:t>
             </a:r>
           </a:p>
         </p:txBody>
@@ -10900,7 +10811,7 @@
           <a:p>
             <a:r>
               <a:rPr lang="es-CL" dirty="0"/>
-              <a:t>Luego de desarrollar funcionalidades en las ramas, los cambios se deben unir a la rama master si contener errores, este proceso es conocido como </a:t>
+              <a:t>Luego de desarrollar funcionalidades en las ramas, los cambios se deben unir a la rama master sin contener errores, este proceso es conocido como </a:t>
             </a:r>
             <a:r>
               <a:rPr lang="es-CL" i="1" dirty="0" err="1"/>

</xml_diff>

<commit_message>
este es el segundo commit
</commit_message>
<xml_diff>
--- a/github.pptx
+++ b/github.pptx
@@ -151,12 +151,12 @@
   <pc:docChgLst>
     <pc:chgData name="daniel arredondo" userId="45f93b1d35ec6ed3" providerId="LiveId" clId="{92A94257-D0AF-4DD3-8E65-51A1BB107D17}"/>
     <pc:docChg chg="undo custSel addSld delSld modSld sldOrd">
-      <pc:chgData name="daniel arredondo" userId="45f93b1d35ec6ed3" providerId="LiveId" clId="{92A94257-D0AF-4DD3-8E65-51A1BB107D17}" dt="2020-10-19T21:12:30.750" v="14070" actId="20577"/>
+      <pc:chgData name="daniel arredondo" userId="45f93b1d35ec6ed3" providerId="LiveId" clId="{92A94257-D0AF-4DD3-8E65-51A1BB107D17}" dt="2020-10-19T22:28:36.040" v="14073" actId="20577"/>
       <pc:docMkLst>
         <pc:docMk/>
       </pc:docMkLst>
       <pc:sldChg chg="addSp delSp modSp add">
-        <pc:chgData name="daniel arredondo" userId="45f93b1d35ec6ed3" providerId="LiveId" clId="{92A94257-D0AF-4DD3-8E65-51A1BB107D17}" dt="2020-10-19T21:12:30.750" v="14070" actId="20577"/>
+        <pc:chgData name="daniel arredondo" userId="45f93b1d35ec6ed3" providerId="LiveId" clId="{92A94257-D0AF-4DD3-8E65-51A1BB107D17}" dt="2020-10-19T22:28:36.040" v="14073" actId="20577"/>
         <pc:sldMkLst>
           <pc:docMk/>
           <pc:sldMk cId="2704176080" sldId="256"/>
@@ -178,7 +178,7 @@
           </ac:spMkLst>
         </pc:spChg>
         <pc:spChg chg="add mod">
-          <ac:chgData name="daniel arredondo" userId="45f93b1d35ec6ed3" providerId="LiveId" clId="{92A94257-D0AF-4DD3-8E65-51A1BB107D17}" dt="2020-10-09T20:14:48.336" v="73" actId="1076"/>
+          <ac:chgData name="daniel arredondo" userId="45f93b1d35ec6ed3" providerId="LiveId" clId="{92A94257-D0AF-4DD3-8E65-51A1BB107D17}" dt="2020-10-19T22:28:36.040" v="14073" actId="20577"/>
           <ac:spMkLst>
             <pc:docMk/>
             <pc:sldMk cId="2704176080" sldId="256"/>
@@ -403,7 +403,7 @@
         </pc:spChg>
       </pc:sldChg>
       <pc:sldChg chg="addSp delSp modSp add">
-        <pc:chgData name="daniel arredondo" userId="45f93b1d35ec6ed3" providerId="LiveId" clId="{92A94257-D0AF-4DD3-8E65-51A1BB107D17}" dt="2020-10-09T20:33:37.853" v="1925"/>
+        <pc:chgData name="daniel arredondo" userId="45f93b1d35ec6ed3" providerId="LiveId" clId="{92A94257-D0AF-4DD3-8E65-51A1BB107D17}" dt="2020-10-19T22:28:31.587" v="14072" actId="20577"/>
         <pc:sldMkLst>
           <pc:docMk/>
           <pc:sldMk cId="2728449854" sldId="265"/>
@@ -425,7 +425,7 @@
           </ac:spMkLst>
         </pc:spChg>
         <pc:spChg chg="add mod">
-          <ac:chgData name="daniel arredondo" userId="45f93b1d35ec6ed3" providerId="LiveId" clId="{92A94257-D0AF-4DD3-8E65-51A1BB107D17}" dt="2020-10-09T20:33:37.853" v="1925"/>
+          <ac:chgData name="daniel arredondo" userId="45f93b1d35ec6ed3" providerId="LiveId" clId="{92A94257-D0AF-4DD3-8E65-51A1BB107D17}" dt="2020-10-19T22:28:31.587" v="14072" actId="20577"/>
           <ac:spMkLst>
             <pc:docMk/>
             <pc:sldMk cId="2728449854" sldId="265"/>
@@ -4821,15 +4821,7 @@
           <a:p>
             <a:r>
               <a:rPr lang="es-CL" sz="4400" dirty="0"/>
-              <a:t>Parte 3: Git, GitHub </a:t>
-            </a:r>
-            <a:r>
-              <a:rPr lang="es-CL" sz="4400"/>
-              <a:t>y Control </a:t>
-            </a:r>
-            <a:r>
-              <a:rPr lang="es-CL" sz="4400" dirty="0"/>
-              <a:t>de versiones</a:t>
+              <a:t>Parte 3: Git, GitHub y Control de versiones</a:t>
             </a:r>
           </a:p>
         </p:txBody>
@@ -4866,51 +4858,6 @@
               <a:buNone/>
             </a:pPr>
             <a:endParaRPr lang="es-CL" dirty="0">
-              <a:solidFill>
-                <a:schemeClr val="tx1">
-                  <a:lumMod val="50000"/>
-                  <a:lumOff val="50000"/>
-                </a:schemeClr>
-              </a:solidFill>
-            </a:endParaRPr>
-          </a:p>
-          <a:p>
-            <a:pPr marL="0" lvl="0" indent="0">
-              <a:buNone/>
-            </a:pPr>
-            <a:br>
-              <a:rPr dirty="0">
-                <a:solidFill>
-                  <a:schemeClr val="tx1">
-                    <a:lumMod val="50000"/>
-                    <a:lumOff val="50000"/>
-                  </a:schemeClr>
-                </a:solidFill>
-              </a:rPr>
-            </a:br>
-            <a:r>
-              <a:rPr sz="3200" dirty="0">
-                <a:solidFill>
-                  <a:schemeClr val="tx1">
-                    <a:lumMod val="50000"/>
-                    <a:lumOff val="50000"/>
-                  </a:schemeClr>
-                </a:solidFill>
-              </a:rPr>
-              <a:t>Daniel Arredondo </a:t>
-            </a:r>
-            <a:r>
-              <a:rPr sz="3200" dirty="0" err="1">
-                <a:solidFill>
-                  <a:schemeClr val="tx1">
-                    <a:lumMod val="50000"/>
-                    <a:lumOff val="50000"/>
-                  </a:schemeClr>
-                </a:solidFill>
-              </a:rPr>
-              <a:t>Carro</a:t>
-            </a:r>
-            <a:endParaRPr sz="3200" dirty="0">
               <a:solidFill>
                 <a:schemeClr val="tx1">
                   <a:lumMod val="50000"/>
@@ -6734,7 +6681,7 @@
           <a:p>
             <a:r>
               <a:rPr lang="es-CL" dirty="0"/>
-              <a:t>Control de versiones</a:t>
+              <a:t>Control de Versiones</a:t>
             </a:r>
           </a:p>
         </p:txBody>

</xml_diff>